<commit_message>
Presentacion actualizada, añadido a ejemplos el codigo mostrado en la presentación.
</commit_message>
<xml_diff>
--- a/doc/Presentacion.pptx
+++ b/doc/Presentacion.pptx
@@ -5,20 +5,37 @@
     <p:sldMasterId id="2147483648" r:id="rId1"/>
   </p:sldMasterIdLst>
   <p:notesMasterIdLst>
-    <p:notesMasterId r:id="rId13"/>
+    <p:notesMasterId r:id="rId30"/>
   </p:notesMasterIdLst>
   <p:sldIdLst>
     <p:sldId id="256" r:id="rId2"/>
     <p:sldId id="257" r:id="rId3"/>
-    <p:sldId id="258" r:id="rId4"/>
-    <p:sldId id="259" r:id="rId5"/>
+    <p:sldId id="259" r:id="rId4"/>
+    <p:sldId id="258" r:id="rId5"/>
     <p:sldId id="260" r:id="rId6"/>
     <p:sldId id="267" r:id="rId7"/>
-    <p:sldId id="261" r:id="rId8"/>
-    <p:sldId id="263" r:id="rId9"/>
-    <p:sldId id="264" r:id="rId10"/>
-    <p:sldId id="265" r:id="rId11"/>
-    <p:sldId id="266" r:id="rId12"/>
+    <p:sldId id="268" r:id="rId8"/>
+    <p:sldId id="269" r:id="rId9"/>
+    <p:sldId id="270" r:id="rId10"/>
+    <p:sldId id="271" r:id="rId11"/>
+    <p:sldId id="261" r:id="rId12"/>
+    <p:sldId id="272" r:id="rId13"/>
+    <p:sldId id="273" r:id="rId14"/>
+    <p:sldId id="274" r:id="rId15"/>
+    <p:sldId id="275" r:id="rId16"/>
+    <p:sldId id="276" r:id="rId17"/>
+    <p:sldId id="266" r:id="rId18"/>
+    <p:sldId id="277" r:id="rId19"/>
+    <p:sldId id="281" r:id="rId20"/>
+    <p:sldId id="278" r:id="rId21"/>
+    <p:sldId id="279" r:id="rId22"/>
+    <p:sldId id="280" r:id="rId23"/>
+    <p:sldId id="283" r:id="rId24"/>
+    <p:sldId id="284" r:id="rId25"/>
+    <p:sldId id="282" r:id="rId26"/>
+    <p:sldId id="285" r:id="rId27"/>
+    <p:sldId id="264" r:id="rId28"/>
+    <p:sldId id="265" r:id="rId29"/>
   </p:sldIdLst>
   <p:sldSz cx="12192000" cy="6858000"/>
   <p:notesSz cx="6858000" cy="9144000"/>
@@ -207,7 +224,7 @@
           <a:p>
             <a:fld id="{C050F663-5086-4E39-9826-D7C6E1DB3D57}" type="datetimeFigureOut">
               <a:rPr lang="es-ES" smtClean="0"/>
-              <a:t>15/07/2016</a:t>
+              <a:t>17/07/2016</a:t>
             </a:fld>
             <a:endParaRPr lang="es-ES"/>
           </a:p>
@@ -976,7 +993,7 @@
           <a:p>
             <a:fld id="{7C41326C-D4E0-4FF2-BE25-FFB86F82BB4F}" type="datetime1">
               <a:rPr lang="en-US" smtClean="0"/>
-              <a:t>7/15/2016</a:t>
+              <a:t>7/17/2016</a:t>
             </a:fld>
             <a:endParaRPr lang="en-US" dirty="0"/>
           </a:p>
@@ -1272,7 +1289,7 @@
           <a:p>
             <a:fld id="{8C412564-EA2E-419F-9751-2C16FE949658}" type="datetime1">
               <a:rPr lang="en-US" smtClean="0"/>
-              <a:t>7/15/2016</a:t>
+              <a:t>7/17/2016</a:t>
             </a:fld>
             <a:endParaRPr lang="en-US" dirty="0"/>
           </a:p>
@@ -1520,7 +1537,7 @@
           <a:p>
             <a:fld id="{4814D2AE-2120-4254-AA55-F1866FEA8026}" type="datetime1">
               <a:rPr lang="en-US" smtClean="0"/>
-              <a:t>7/15/2016</a:t>
+              <a:t>7/17/2016</a:t>
             </a:fld>
             <a:endParaRPr lang="en-US" dirty="0"/>
           </a:p>
@@ -2060,7 +2077,7 @@
           <a:p>
             <a:fld id="{27DE6ADE-A95F-470A-AAEF-2C0EF39C5D65}" type="datetime1">
               <a:rPr lang="en-US" smtClean="0"/>
-              <a:t>7/15/2016</a:t>
+              <a:t>7/17/2016</a:t>
             </a:fld>
             <a:endParaRPr lang="en-US" dirty="0"/>
           </a:p>
@@ -2308,7 +2325,7 @@
           <a:p>
             <a:fld id="{BE025187-CA2F-4F61-A1FB-A6E21DE97F4F}" type="datetime1">
               <a:rPr lang="en-US" smtClean="0"/>
-              <a:t>7/15/2016</a:t>
+              <a:t>7/17/2016</a:t>
             </a:fld>
             <a:endParaRPr lang="en-US" dirty="0"/>
           </a:p>
@@ -2840,7 +2857,7 @@
           <a:p>
             <a:fld id="{061914C6-7DD0-4C0B-AFD1-155929352D7E}" type="datetime1">
               <a:rPr lang="en-US" smtClean="0"/>
-              <a:t>7/15/2016</a:t>
+              <a:t>7/17/2016</a:t>
             </a:fld>
             <a:endParaRPr lang="en-US" dirty="0"/>
           </a:p>
@@ -3137,7 +3154,7 @@
           <a:p>
             <a:fld id="{F603C00C-2D03-4EF5-83ED-91FF8AA0099B}" type="datetime1">
               <a:rPr lang="en-US" smtClean="0"/>
-              <a:t>7/15/2016</a:t>
+              <a:t>7/17/2016</a:t>
             </a:fld>
             <a:endParaRPr lang="en-US" dirty="0"/>
           </a:p>
@@ -3311,7 +3328,7 @@
           <a:p>
             <a:fld id="{26C6CC50-35E5-4485-9E9D-1106FC53FB32}" type="datetime1">
               <a:rPr lang="en-US" smtClean="0"/>
-              <a:t>7/15/2016</a:t>
+              <a:t>7/17/2016</a:t>
             </a:fld>
             <a:endParaRPr lang="en-US" dirty="0"/>
           </a:p>
@@ -3491,7 +3508,7 @@
           <a:p>
             <a:fld id="{219A9AD5-7E51-4F4D-A7E8-AA5D85EBB50A}" type="datetime1">
               <a:rPr lang="en-US" smtClean="0"/>
-              <a:t>7/15/2016</a:t>
+              <a:t>7/17/2016</a:t>
             </a:fld>
             <a:endParaRPr lang="en-US" dirty="0"/>
           </a:p>
@@ -3661,7 +3678,7 @@
           <a:p>
             <a:fld id="{2F7827E7-A69F-49F2-A59A-A9543F42666B}" type="datetime1">
               <a:rPr lang="en-US" smtClean="0"/>
-              <a:t>7/15/2016</a:t>
+              <a:t>7/17/2016</a:t>
             </a:fld>
             <a:endParaRPr lang="en-US" dirty="0"/>
           </a:p>
@@ -3912,7 +3929,7 @@
           <a:p>
             <a:fld id="{AFC5F1FF-6ABF-4078-96D0-3A27E09551EA}" type="datetime1">
               <a:rPr lang="en-US" smtClean="0"/>
-              <a:t>7/15/2016</a:t>
+              <a:t>7/17/2016</a:t>
             </a:fld>
             <a:endParaRPr lang="en-US" dirty="0"/>
           </a:p>
@@ -4209,7 +4226,7 @@
           <a:p>
             <a:fld id="{8CEA4913-3991-4E1E-B015-839F7FBDA270}" type="datetime1">
               <a:rPr lang="en-US" smtClean="0"/>
-              <a:t>7/15/2016</a:t>
+              <a:t>7/17/2016</a:t>
             </a:fld>
             <a:endParaRPr lang="en-US" dirty="0"/>
           </a:p>
@@ -4651,7 +4668,7 @@
           <a:p>
             <a:fld id="{E02DC85B-7D16-4A29-A657-FEA73E695E07}" type="datetime1">
               <a:rPr lang="en-US" smtClean="0"/>
-              <a:t>7/15/2016</a:t>
+              <a:t>7/17/2016</a:t>
             </a:fld>
             <a:endParaRPr lang="en-US" dirty="0"/>
           </a:p>
@@ -4769,7 +4786,7 @@
           <a:p>
             <a:fld id="{9C02F5C0-313B-4EA8-AD51-9C65343ED5AC}" type="datetime1">
               <a:rPr lang="en-US" smtClean="0"/>
-              <a:t>7/15/2016</a:t>
+              <a:t>7/17/2016</a:t>
             </a:fld>
             <a:endParaRPr lang="en-US" dirty="0"/>
           </a:p>
@@ -4864,7 +4881,7 @@
           <a:p>
             <a:fld id="{0743B5D3-B772-4F21-871D-4E8B1C62B640}" type="datetime1">
               <a:rPr lang="en-US" smtClean="0"/>
-              <a:t>7/15/2016</a:t>
+              <a:t>7/17/2016</a:t>
             </a:fld>
             <a:endParaRPr lang="en-US" dirty="0"/>
           </a:p>
@@ -5147,7 +5164,7 @@
           <a:p>
             <a:fld id="{84113CC3-71B9-4CFE-B9F1-EBA936A22224}" type="datetime1">
               <a:rPr lang="en-US" smtClean="0"/>
-              <a:t>7/15/2016</a:t>
+              <a:t>7/17/2016</a:t>
             </a:fld>
             <a:endParaRPr lang="en-US" dirty="0"/>
           </a:p>
@@ -5438,7 +5455,7 @@
           <a:p>
             <a:fld id="{2D76E9C1-D474-4CF4-B9A9-8B1C85643E85}" type="datetime1">
               <a:rPr lang="en-US" smtClean="0"/>
-              <a:t>7/15/2016</a:t>
+              <a:t>7/17/2016</a:t>
             </a:fld>
             <a:endParaRPr lang="en-US" dirty="0"/>
           </a:p>
@@ -5968,7 +5985,7 @@
           <a:p>
             <a:fld id="{F9A37B9F-C454-4B10-97BB-D02914E79D82}" type="datetime1">
               <a:rPr lang="en-US" smtClean="0"/>
-              <a:t>7/15/2016</a:t>
+              <a:t>7/17/2016</a:t>
             </a:fld>
             <a:endParaRPr lang="en-US" dirty="0"/>
           </a:p>
@@ -7491,7 +7508,7 @@
                   <a:schemeClr val="bg1"/>
                 </a:solidFill>
               </a:rPr>
-              <a:t>Conocimiento Adquirido</a:t>
+              <a:t>Gestión del proyecto</a:t>
             </a:r>
           </a:p>
         </p:txBody>
@@ -7508,8 +7525,8 @@
         </p:nvSpPr>
         <p:spPr>
           <a:xfrm>
-            <a:off x="1427160" y="1047751"/>
-            <a:ext cx="10455278" cy="4848225"/>
+            <a:off x="1427160" y="1797934"/>
+            <a:ext cx="10455278" cy="3653742"/>
           </a:xfrm>
         </p:spPr>
         <p:txBody>
@@ -7518,35 +7535,14 @@
           <a:p>
             <a:r>
               <a:rPr lang="es-ES" dirty="0"/>
-              <a:t>Conocimiento y soltura con Python y Perl</a:t>
+              <a:t>7 Riegos identificados y clasificados</a:t>
             </a:r>
           </a:p>
           <a:p>
             <a:r>
               <a:rPr lang="es-ES" dirty="0"/>
-              <a:t>Manejo mas profundo de la creación de gramáticas</a:t>
-            </a:r>
-          </a:p>
-          <a:p>
-            <a:r>
-              <a:rPr lang="es-ES" dirty="0"/>
-              <a:t>Diseño de un compilador con todas sus fases</a:t>
-            </a:r>
-          </a:p>
-          <a:p>
-            <a:r>
-              <a:rPr lang="es-ES" dirty="0"/>
-              <a:t>Experiencia en tecnologías Big Data con Hadoop</a:t>
-            </a:r>
-          </a:p>
-          <a:p>
-            <a:endParaRPr lang="es-ES" dirty="0"/>
-          </a:p>
-          <a:p>
-            <a:endParaRPr lang="es-ES" dirty="0"/>
-          </a:p>
-          <a:p>
-            <a:endParaRPr lang="es-ES" dirty="0"/>
+              <a:t>Planes de  prevención y continencia</a:t>
+            </a:r>
           </a:p>
         </p:txBody>
       </p:sp>
@@ -7586,10 +7582,116 @@
           </a:p>
         </p:txBody>
       </p:sp>
+      <p:sp>
+        <p:nvSpPr>
+          <p:cNvPr id="6" name="Título 1"/>
+          <p:cNvSpPr txBox="1">
+            <a:spLocks/>
+          </p:cNvSpPr>
+          <p:nvPr/>
+        </p:nvSpPr>
+        <p:spPr>
+          <a:xfrm>
+            <a:off x="0" y="823913"/>
+            <a:ext cx="12192000" cy="823914"/>
+          </a:xfrm>
+          <a:prstGeom prst="rect">
+            <a:avLst/>
+          </a:prstGeom>
+          <a:effectLst/>
+        </p:spPr>
+        <p:txBody>
+          <a:bodyPr vert="horz" lIns="91440" tIns="45720" rIns="91440" bIns="45720" rtlCol="0" anchor="ctr">
+            <a:normAutofit/>
+          </a:bodyPr>
+          <a:lstStyle>
+            <a:lvl1pPr algn="ctr" defTabSz="457200" rtl="0" eaLnBrk="1" latinLnBrk="0" hangingPunct="1">
+              <a:spcBef>
+                <a:spcPct val="0"/>
+              </a:spcBef>
+              <a:buNone/>
+              <a:defRPr sz="4000" kern="1200" cap="none">
+                <a:ln w="3175" cmpd="sng">
+                  <a:noFill/>
+                </a:ln>
+                <a:solidFill>
+                  <a:schemeClr val="tx1"/>
+                </a:solidFill>
+                <a:effectLst/>
+                <a:latin typeface="+mj-lt"/>
+                <a:ea typeface="+mj-ea"/>
+                <a:cs typeface="+mj-cs"/>
+              </a:defRPr>
+            </a:lvl1pPr>
+            <a:lvl2pPr eaLnBrk="1" hangingPunct="1">
+              <a:defRPr>
+                <a:solidFill>
+                  <a:schemeClr val="tx2"/>
+                </a:solidFill>
+              </a:defRPr>
+            </a:lvl2pPr>
+            <a:lvl3pPr eaLnBrk="1" hangingPunct="1">
+              <a:defRPr>
+                <a:solidFill>
+                  <a:schemeClr val="tx2"/>
+                </a:solidFill>
+              </a:defRPr>
+            </a:lvl3pPr>
+            <a:lvl4pPr eaLnBrk="1" hangingPunct="1">
+              <a:defRPr>
+                <a:solidFill>
+                  <a:schemeClr val="tx2"/>
+                </a:solidFill>
+              </a:defRPr>
+            </a:lvl4pPr>
+            <a:lvl5pPr eaLnBrk="1" hangingPunct="1">
+              <a:defRPr>
+                <a:solidFill>
+                  <a:schemeClr val="tx2"/>
+                </a:solidFill>
+              </a:defRPr>
+            </a:lvl5pPr>
+            <a:lvl6pPr eaLnBrk="1" hangingPunct="1">
+              <a:defRPr>
+                <a:solidFill>
+                  <a:schemeClr val="tx2"/>
+                </a:solidFill>
+              </a:defRPr>
+            </a:lvl6pPr>
+            <a:lvl7pPr eaLnBrk="1" hangingPunct="1">
+              <a:defRPr>
+                <a:solidFill>
+                  <a:schemeClr val="tx2"/>
+                </a:solidFill>
+              </a:defRPr>
+            </a:lvl7pPr>
+            <a:lvl8pPr eaLnBrk="1" hangingPunct="1">
+              <a:defRPr>
+                <a:solidFill>
+                  <a:schemeClr val="tx2"/>
+                </a:solidFill>
+              </a:defRPr>
+            </a:lvl8pPr>
+            <a:lvl9pPr eaLnBrk="1" hangingPunct="1">
+              <a:defRPr>
+                <a:solidFill>
+                  <a:schemeClr val="tx2"/>
+                </a:solidFill>
+              </a:defRPr>
+            </a:lvl9pPr>
+          </a:lstStyle>
+          <a:p>
+            <a:r>
+              <a:rPr lang="es-ES" sz="3600" dirty="0"/>
+              <a:t>Gestión de Riesgos</a:t>
+            </a:r>
+          </a:p>
+        </p:txBody>
+      </p:sp>
     </p:spTree>
     <p:extLst>
       <p:ext uri="{BB962C8B-B14F-4D97-AF65-F5344CB8AC3E}">
-        <p14:creationId xmlns:p14="http://schemas.microsoft.com/office/powerpoint/2010/main" val="4078897029"/>
+        <p14:creationId xmlns:p14="http://schemas.microsoft.com/office/powerpoint/2010/main" val="981504825"/>
       </p:ext>
     </p:extLst>
   </p:cSld>
@@ -7658,7 +7760,7 @@
                   <a:schemeClr val="bg1"/>
                 </a:solidFill>
               </a:rPr>
-              <a:t>Demostración en video</a:t>
+              <a:t>Gestión del proyecto</a:t>
             </a:r>
           </a:p>
         </p:txBody>
@@ -7675,15 +7777,45 @@
         </p:nvSpPr>
         <p:spPr>
           <a:xfrm>
-            <a:off x="1427160" y="1047751"/>
-            <a:ext cx="10455278" cy="4848225"/>
+            <a:off x="1427160" y="1797934"/>
+            <a:ext cx="10455278" cy="3653742"/>
           </a:xfrm>
         </p:spPr>
         <p:txBody>
           <a:bodyPr/>
           <a:lstStyle/>
           <a:p>
-            <a:endParaRPr lang="es-ES" dirty="0"/>
+            <a:r>
+              <a:rPr lang="es-ES" dirty="0"/>
+              <a:t>Características del proyecto</a:t>
+            </a:r>
+          </a:p>
+          <a:p>
+            <a:pPr lvl="1"/>
+            <a:r>
+              <a:rPr lang="es-ES" dirty="0"/>
+              <a:t>Proyecto individual</a:t>
+            </a:r>
+          </a:p>
+          <a:p>
+            <a:pPr lvl="1"/>
+            <a:r>
+              <a:rPr lang="es-ES" dirty="0"/>
+              <a:t>Componente de investigación</a:t>
+            </a:r>
+          </a:p>
+          <a:p>
+            <a:pPr lvl="1"/>
+            <a:r>
+              <a:rPr lang="es-ES" dirty="0"/>
+              <a:t>Requisitos Fijos</a:t>
+            </a:r>
+          </a:p>
+          <a:p>
+            <a:r>
+              <a:rPr lang="es-ES" dirty="0"/>
+              <a:t>Programación Extrema</a:t>
+            </a:r>
           </a:p>
         </p:txBody>
       </p:sp>
@@ -7723,10 +7855,1734 @@
           </a:p>
         </p:txBody>
       </p:sp>
+      <p:sp>
+        <p:nvSpPr>
+          <p:cNvPr id="6" name="Título 1"/>
+          <p:cNvSpPr txBox="1">
+            <a:spLocks/>
+          </p:cNvSpPr>
+          <p:nvPr/>
+        </p:nvSpPr>
+        <p:spPr>
+          <a:xfrm>
+            <a:off x="0" y="823913"/>
+            <a:ext cx="12192000" cy="823914"/>
+          </a:xfrm>
+          <a:prstGeom prst="rect">
+            <a:avLst/>
+          </a:prstGeom>
+          <a:effectLst/>
+        </p:spPr>
+        <p:txBody>
+          <a:bodyPr vert="horz" lIns="91440" tIns="45720" rIns="91440" bIns="45720" rtlCol="0" anchor="ctr">
+            <a:normAutofit/>
+          </a:bodyPr>
+          <a:lstStyle>
+            <a:lvl1pPr algn="ctr" defTabSz="457200" rtl="0" eaLnBrk="1" latinLnBrk="0" hangingPunct="1">
+              <a:spcBef>
+                <a:spcPct val="0"/>
+              </a:spcBef>
+              <a:buNone/>
+              <a:defRPr sz="4000" kern="1200" cap="none">
+                <a:ln w="3175" cmpd="sng">
+                  <a:noFill/>
+                </a:ln>
+                <a:solidFill>
+                  <a:schemeClr val="tx1"/>
+                </a:solidFill>
+                <a:effectLst/>
+                <a:latin typeface="+mj-lt"/>
+                <a:ea typeface="+mj-ea"/>
+                <a:cs typeface="+mj-cs"/>
+              </a:defRPr>
+            </a:lvl1pPr>
+            <a:lvl2pPr eaLnBrk="1" hangingPunct="1">
+              <a:defRPr>
+                <a:solidFill>
+                  <a:schemeClr val="tx2"/>
+                </a:solidFill>
+              </a:defRPr>
+            </a:lvl2pPr>
+            <a:lvl3pPr eaLnBrk="1" hangingPunct="1">
+              <a:defRPr>
+                <a:solidFill>
+                  <a:schemeClr val="tx2"/>
+                </a:solidFill>
+              </a:defRPr>
+            </a:lvl3pPr>
+            <a:lvl4pPr eaLnBrk="1" hangingPunct="1">
+              <a:defRPr>
+                <a:solidFill>
+                  <a:schemeClr val="tx2"/>
+                </a:solidFill>
+              </a:defRPr>
+            </a:lvl4pPr>
+            <a:lvl5pPr eaLnBrk="1" hangingPunct="1">
+              <a:defRPr>
+                <a:solidFill>
+                  <a:schemeClr val="tx2"/>
+                </a:solidFill>
+              </a:defRPr>
+            </a:lvl5pPr>
+            <a:lvl6pPr eaLnBrk="1" hangingPunct="1">
+              <a:defRPr>
+                <a:solidFill>
+                  <a:schemeClr val="tx2"/>
+                </a:solidFill>
+              </a:defRPr>
+            </a:lvl6pPr>
+            <a:lvl7pPr eaLnBrk="1" hangingPunct="1">
+              <a:defRPr>
+                <a:solidFill>
+                  <a:schemeClr val="tx2"/>
+                </a:solidFill>
+              </a:defRPr>
+            </a:lvl7pPr>
+            <a:lvl8pPr eaLnBrk="1" hangingPunct="1">
+              <a:defRPr>
+                <a:solidFill>
+                  <a:schemeClr val="tx2"/>
+                </a:solidFill>
+              </a:defRPr>
+            </a:lvl8pPr>
+            <a:lvl9pPr eaLnBrk="1" hangingPunct="1">
+              <a:defRPr>
+                <a:solidFill>
+                  <a:schemeClr val="tx2"/>
+                </a:solidFill>
+              </a:defRPr>
+            </a:lvl9pPr>
+          </a:lstStyle>
+          <a:p>
+            <a:r>
+              <a:rPr lang="es-ES" sz="3600" dirty="0"/>
+              <a:t>Metodología</a:t>
+            </a:r>
+          </a:p>
+        </p:txBody>
+      </p:sp>
+    </p:spTree>
+    <p:extLst>
+      <p:ext uri="{BB962C8B-B14F-4D97-AF65-F5344CB8AC3E}">
+        <p14:creationId xmlns:p14="http://schemas.microsoft.com/office/powerpoint/2010/main" val="3571979615"/>
+      </p:ext>
+    </p:extLst>
+  </p:cSld>
+  <p:clrMapOvr>
+    <a:masterClrMapping/>
+  </p:clrMapOvr>
+</p:sld>
+</file>
+
+<file path=ppt/slides/slide12.xml><?xml version="1.0" encoding="utf-8"?>
+<p:sld xmlns:a="http://schemas.openxmlformats.org/drawingml/2006/main" xmlns:r="http://schemas.openxmlformats.org/officeDocument/2006/relationships" xmlns:p="http://schemas.openxmlformats.org/presentationml/2006/main" showMasterSp="0">
+  <p:cSld>
+    <p:bg>
+      <p:bgPr>
+        <a:blipFill dpi="0" rotWithShape="1">
+          <a:blip r:embed="rId2">
+            <a:lum/>
+          </a:blip>
+          <a:srcRect/>
+          <a:stretch>
+            <a:fillRect/>
+          </a:stretch>
+        </a:blipFill>
+        <a:effectLst/>
+      </p:bgPr>
+    </p:bg>
+    <p:spTree>
+      <p:nvGrpSpPr>
+        <p:cNvPr id="1" name=""/>
+        <p:cNvGrpSpPr/>
+        <p:nvPr/>
+      </p:nvGrpSpPr>
+      <p:grpSpPr>
+        <a:xfrm>
+          <a:off x="0" y="0"/>
+          <a:ext cx="0" cy="0"/>
+          <a:chOff x="0" y="0"/>
+          <a:chExt cx="0" cy="0"/>
+        </a:xfrm>
+      </p:grpSpPr>
+      <p:sp>
+        <p:nvSpPr>
+          <p:cNvPr id="2" name="Título 1"/>
+          <p:cNvSpPr>
+            <a:spLocks noGrp="1"/>
+          </p:cNvSpPr>
+          <p:nvPr>
+            <p:ph type="title"/>
+          </p:nvPr>
+        </p:nvSpPr>
+        <p:spPr>
+          <a:xfrm>
+            <a:off x="0" y="-1"/>
+            <a:ext cx="12192000" cy="823914"/>
+          </a:xfrm>
+        </p:spPr>
+        <p:txBody>
+          <a:bodyPr>
+            <a:normAutofit/>
+          </a:bodyPr>
+          <a:lstStyle/>
+          <a:p>
+            <a:r>
+              <a:rPr lang="es-ES" dirty="0">
+                <a:solidFill>
+                  <a:schemeClr val="bg1"/>
+                </a:solidFill>
+              </a:rPr>
+              <a:t>Gestión del proyecto</a:t>
+            </a:r>
+          </a:p>
+        </p:txBody>
+      </p:sp>
+      <p:sp>
+        <p:nvSpPr>
+          <p:cNvPr id="3" name="Marcador de contenido 2"/>
+          <p:cNvSpPr>
+            <a:spLocks noGrp="1"/>
+          </p:cNvSpPr>
+          <p:nvPr>
+            <p:ph idx="1"/>
+          </p:nvPr>
+        </p:nvSpPr>
+        <p:spPr>
+          <a:xfrm>
+            <a:off x="1427160" y="1797934"/>
+            <a:ext cx="10455278" cy="3653742"/>
+          </a:xfrm>
+        </p:spPr>
+        <p:txBody>
+          <a:bodyPr/>
+          <a:lstStyle/>
+          <a:p>
+            <a:r>
+              <a:rPr lang="es-ES" dirty="0"/>
+              <a:t>Tareas</a:t>
+            </a:r>
+          </a:p>
+          <a:p>
+            <a:pPr lvl="1"/>
+            <a:r>
+              <a:rPr lang="es-ES" dirty="0"/>
+              <a:t>Estructura descomposición de tareas (EDT)</a:t>
+            </a:r>
+          </a:p>
+          <a:p>
+            <a:r>
+              <a:rPr lang="es-ES" dirty="0"/>
+              <a:t>Temporal</a:t>
+            </a:r>
+          </a:p>
+          <a:p>
+            <a:pPr lvl="1"/>
+            <a:r>
+              <a:rPr lang="es-ES" dirty="0"/>
+              <a:t>Cronograma</a:t>
+            </a:r>
+          </a:p>
+          <a:p>
+            <a:pPr lvl="1"/>
+            <a:r>
+              <a:rPr lang="es-ES" dirty="0"/>
+              <a:t>Diagrama Gantt</a:t>
+            </a:r>
+          </a:p>
+          <a:p>
+            <a:pPr lvl="1"/>
+            <a:endParaRPr lang="es-ES" dirty="0"/>
+          </a:p>
+        </p:txBody>
+      </p:sp>
+      <p:sp>
+        <p:nvSpPr>
+          <p:cNvPr id="5" name="Marcador de pie de página 4"/>
+          <p:cNvSpPr>
+            <a:spLocks noGrp="1"/>
+          </p:cNvSpPr>
+          <p:nvPr>
+            <p:ph type="ftr" sz="quarter" idx="11"/>
+          </p:nvPr>
+        </p:nvSpPr>
+        <p:spPr>
+          <a:xfrm>
+            <a:off x="2079585" y="6605588"/>
+            <a:ext cx="10112415" cy="252412"/>
+          </a:xfrm>
+        </p:spPr>
+        <p:txBody>
+          <a:bodyPr/>
+          <a:lstStyle/>
+          <a:p>
+            <a:r>
+              <a:rPr lang="es-ES" dirty="0">
+                <a:solidFill>
+                  <a:schemeClr val="bg1"/>
+                </a:solidFill>
+              </a:rPr>
+              <a:t>Autor: César Piñeiro Pomar                                                                                                                                                                                  Perldoop 2.0: Un compilador fuente-a-fuente</a:t>
+            </a:r>
+            <a:endParaRPr lang="en-US" dirty="0">
+              <a:solidFill>
+                <a:schemeClr val="bg1"/>
+              </a:solidFill>
+            </a:endParaRPr>
+          </a:p>
+        </p:txBody>
+      </p:sp>
+      <p:sp>
+        <p:nvSpPr>
+          <p:cNvPr id="6" name="Título 1"/>
+          <p:cNvSpPr txBox="1">
+            <a:spLocks/>
+          </p:cNvSpPr>
+          <p:nvPr/>
+        </p:nvSpPr>
+        <p:spPr>
+          <a:xfrm>
+            <a:off x="0" y="823913"/>
+            <a:ext cx="12192000" cy="823914"/>
+          </a:xfrm>
+          <a:prstGeom prst="rect">
+            <a:avLst/>
+          </a:prstGeom>
+          <a:effectLst/>
+        </p:spPr>
+        <p:txBody>
+          <a:bodyPr vert="horz" lIns="91440" tIns="45720" rIns="91440" bIns="45720" rtlCol="0" anchor="ctr">
+            <a:normAutofit/>
+          </a:bodyPr>
+          <a:lstStyle>
+            <a:lvl1pPr algn="ctr" defTabSz="457200" rtl="0" eaLnBrk="1" latinLnBrk="0" hangingPunct="1">
+              <a:spcBef>
+                <a:spcPct val="0"/>
+              </a:spcBef>
+              <a:buNone/>
+              <a:defRPr sz="4000" kern="1200" cap="none">
+                <a:ln w="3175" cmpd="sng">
+                  <a:noFill/>
+                </a:ln>
+                <a:solidFill>
+                  <a:schemeClr val="tx1"/>
+                </a:solidFill>
+                <a:effectLst/>
+                <a:latin typeface="+mj-lt"/>
+                <a:ea typeface="+mj-ea"/>
+                <a:cs typeface="+mj-cs"/>
+              </a:defRPr>
+            </a:lvl1pPr>
+            <a:lvl2pPr eaLnBrk="1" hangingPunct="1">
+              <a:defRPr>
+                <a:solidFill>
+                  <a:schemeClr val="tx2"/>
+                </a:solidFill>
+              </a:defRPr>
+            </a:lvl2pPr>
+            <a:lvl3pPr eaLnBrk="1" hangingPunct="1">
+              <a:defRPr>
+                <a:solidFill>
+                  <a:schemeClr val="tx2"/>
+                </a:solidFill>
+              </a:defRPr>
+            </a:lvl3pPr>
+            <a:lvl4pPr eaLnBrk="1" hangingPunct="1">
+              <a:defRPr>
+                <a:solidFill>
+                  <a:schemeClr val="tx2"/>
+                </a:solidFill>
+              </a:defRPr>
+            </a:lvl4pPr>
+            <a:lvl5pPr eaLnBrk="1" hangingPunct="1">
+              <a:defRPr>
+                <a:solidFill>
+                  <a:schemeClr val="tx2"/>
+                </a:solidFill>
+              </a:defRPr>
+            </a:lvl5pPr>
+            <a:lvl6pPr eaLnBrk="1" hangingPunct="1">
+              <a:defRPr>
+                <a:solidFill>
+                  <a:schemeClr val="tx2"/>
+                </a:solidFill>
+              </a:defRPr>
+            </a:lvl6pPr>
+            <a:lvl7pPr eaLnBrk="1" hangingPunct="1">
+              <a:defRPr>
+                <a:solidFill>
+                  <a:schemeClr val="tx2"/>
+                </a:solidFill>
+              </a:defRPr>
+            </a:lvl7pPr>
+            <a:lvl8pPr eaLnBrk="1" hangingPunct="1">
+              <a:defRPr>
+                <a:solidFill>
+                  <a:schemeClr val="tx2"/>
+                </a:solidFill>
+              </a:defRPr>
+            </a:lvl8pPr>
+            <a:lvl9pPr eaLnBrk="1" hangingPunct="1">
+              <a:defRPr>
+                <a:solidFill>
+                  <a:schemeClr val="tx2"/>
+                </a:solidFill>
+              </a:defRPr>
+            </a:lvl9pPr>
+          </a:lstStyle>
+          <a:p>
+            <a:r>
+              <a:rPr lang="es-ES" sz="3600" dirty="0"/>
+              <a:t>Planificación</a:t>
+            </a:r>
+          </a:p>
+        </p:txBody>
+      </p:sp>
+    </p:spTree>
+    <p:extLst>
+      <p:ext uri="{BB962C8B-B14F-4D97-AF65-F5344CB8AC3E}">
+        <p14:creationId xmlns:p14="http://schemas.microsoft.com/office/powerpoint/2010/main" val="4048517418"/>
+      </p:ext>
+    </p:extLst>
+  </p:cSld>
+  <p:clrMapOvr>
+    <a:masterClrMapping/>
+  </p:clrMapOvr>
+</p:sld>
+</file>
+
+<file path=ppt/slides/slide13.xml><?xml version="1.0" encoding="utf-8"?>
+<p:sld xmlns:a="http://schemas.openxmlformats.org/drawingml/2006/main" xmlns:r="http://schemas.openxmlformats.org/officeDocument/2006/relationships" xmlns:p="http://schemas.openxmlformats.org/presentationml/2006/main" showMasterSp="0">
+  <p:cSld>
+    <p:bg>
+      <p:bgPr>
+        <a:blipFill dpi="0" rotWithShape="1">
+          <a:blip r:embed="rId2">
+            <a:lum/>
+          </a:blip>
+          <a:srcRect/>
+          <a:stretch>
+            <a:fillRect/>
+          </a:stretch>
+        </a:blipFill>
+        <a:effectLst/>
+      </p:bgPr>
+    </p:bg>
+    <p:spTree>
+      <p:nvGrpSpPr>
+        <p:cNvPr id="1" name=""/>
+        <p:cNvGrpSpPr/>
+        <p:nvPr/>
+      </p:nvGrpSpPr>
+      <p:grpSpPr>
+        <a:xfrm>
+          <a:off x="0" y="0"/>
+          <a:ext cx="0" cy="0"/>
+          <a:chOff x="0" y="0"/>
+          <a:chExt cx="0" cy="0"/>
+        </a:xfrm>
+      </p:grpSpPr>
+      <p:sp>
+        <p:nvSpPr>
+          <p:cNvPr id="2" name="Título 1"/>
+          <p:cNvSpPr>
+            <a:spLocks noGrp="1"/>
+          </p:cNvSpPr>
+          <p:nvPr>
+            <p:ph type="title"/>
+          </p:nvPr>
+        </p:nvSpPr>
+        <p:spPr>
+          <a:xfrm>
+            <a:off x="0" y="-1"/>
+            <a:ext cx="12192000" cy="823914"/>
+          </a:xfrm>
+        </p:spPr>
+        <p:txBody>
+          <a:bodyPr>
+            <a:normAutofit/>
+          </a:bodyPr>
+          <a:lstStyle/>
+          <a:p>
+            <a:r>
+              <a:rPr lang="es-ES" dirty="0">
+                <a:solidFill>
+                  <a:schemeClr val="bg1"/>
+                </a:solidFill>
+              </a:rPr>
+              <a:t>Diseño</a:t>
+            </a:r>
+          </a:p>
+        </p:txBody>
+      </p:sp>
+      <p:sp>
+        <p:nvSpPr>
+          <p:cNvPr id="3" name="Marcador de contenido 2"/>
+          <p:cNvSpPr>
+            <a:spLocks noGrp="1"/>
+          </p:cNvSpPr>
+          <p:nvPr>
+            <p:ph idx="1"/>
+          </p:nvPr>
+        </p:nvSpPr>
+        <p:spPr>
+          <a:xfrm>
+            <a:off x="1427160" y="1797934"/>
+            <a:ext cx="10455278" cy="3653742"/>
+          </a:xfrm>
+        </p:spPr>
+        <p:txBody>
+          <a:bodyPr/>
+          <a:lstStyle/>
+          <a:p>
+            <a:r>
+              <a:rPr lang="es-ES" dirty="0"/>
+              <a:t>Importancia</a:t>
+            </a:r>
+          </a:p>
+          <a:p>
+            <a:r>
+              <a:rPr lang="es-ES" dirty="0"/>
+              <a:t>Definición</a:t>
+            </a:r>
+          </a:p>
+          <a:p>
+            <a:r>
+              <a:rPr lang="es-ES" dirty="0"/>
+              <a:t>Uso</a:t>
+            </a:r>
+          </a:p>
+          <a:p>
+            <a:endParaRPr lang="es-ES" dirty="0"/>
+          </a:p>
+          <a:p>
+            <a:endParaRPr lang="es-ES" dirty="0"/>
+          </a:p>
+        </p:txBody>
+      </p:sp>
+      <p:sp>
+        <p:nvSpPr>
+          <p:cNvPr id="5" name="Marcador de pie de página 4"/>
+          <p:cNvSpPr>
+            <a:spLocks noGrp="1"/>
+          </p:cNvSpPr>
+          <p:nvPr>
+            <p:ph type="ftr" sz="quarter" idx="11"/>
+          </p:nvPr>
+        </p:nvSpPr>
+        <p:spPr>
+          <a:xfrm>
+            <a:off x="2079585" y="6605588"/>
+            <a:ext cx="10112415" cy="252412"/>
+          </a:xfrm>
+        </p:spPr>
+        <p:txBody>
+          <a:bodyPr/>
+          <a:lstStyle/>
+          <a:p>
+            <a:r>
+              <a:rPr lang="es-ES" dirty="0">
+                <a:solidFill>
+                  <a:schemeClr val="bg1"/>
+                </a:solidFill>
+              </a:rPr>
+              <a:t>Autor: César Piñeiro Pomar                                                                                                                                                                                  Perldoop 2.0: Un compilador fuente-a-fuente</a:t>
+            </a:r>
+            <a:endParaRPr lang="en-US" dirty="0">
+              <a:solidFill>
+                <a:schemeClr val="bg1"/>
+              </a:solidFill>
+            </a:endParaRPr>
+          </a:p>
+        </p:txBody>
+      </p:sp>
+      <p:sp>
+        <p:nvSpPr>
+          <p:cNvPr id="6" name="Título 1"/>
+          <p:cNvSpPr txBox="1">
+            <a:spLocks/>
+          </p:cNvSpPr>
+          <p:nvPr/>
+        </p:nvSpPr>
+        <p:spPr>
+          <a:xfrm>
+            <a:off x="0" y="823913"/>
+            <a:ext cx="12192000" cy="823914"/>
+          </a:xfrm>
+          <a:prstGeom prst="rect">
+            <a:avLst/>
+          </a:prstGeom>
+          <a:effectLst/>
+        </p:spPr>
+        <p:txBody>
+          <a:bodyPr vert="horz" lIns="91440" tIns="45720" rIns="91440" bIns="45720" rtlCol="0" anchor="ctr">
+            <a:normAutofit/>
+          </a:bodyPr>
+          <a:lstStyle>
+            <a:lvl1pPr algn="ctr" defTabSz="457200" rtl="0" eaLnBrk="1" latinLnBrk="0" hangingPunct="1">
+              <a:spcBef>
+                <a:spcPct val="0"/>
+              </a:spcBef>
+              <a:buNone/>
+              <a:defRPr sz="4000" kern="1200" cap="none">
+                <a:ln w="3175" cmpd="sng">
+                  <a:noFill/>
+                </a:ln>
+                <a:solidFill>
+                  <a:schemeClr val="tx1"/>
+                </a:solidFill>
+                <a:effectLst/>
+                <a:latin typeface="+mj-lt"/>
+                <a:ea typeface="+mj-ea"/>
+                <a:cs typeface="+mj-cs"/>
+              </a:defRPr>
+            </a:lvl1pPr>
+            <a:lvl2pPr eaLnBrk="1" hangingPunct="1">
+              <a:defRPr>
+                <a:solidFill>
+                  <a:schemeClr val="tx2"/>
+                </a:solidFill>
+              </a:defRPr>
+            </a:lvl2pPr>
+            <a:lvl3pPr eaLnBrk="1" hangingPunct="1">
+              <a:defRPr>
+                <a:solidFill>
+                  <a:schemeClr val="tx2"/>
+                </a:solidFill>
+              </a:defRPr>
+            </a:lvl3pPr>
+            <a:lvl4pPr eaLnBrk="1" hangingPunct="1">
+              <a:defRPr>
+                <a:solidFill>
+                  <a:schemeClr val="tx2"/>
+                </a:solidFill>
+              </a:defRPr>
+            </a:lvl4pPr>
+            <a:lvl5pPr eaLnBrk="1" hangingPunct="1">
+              <a:defRPr>
+                <a:solidFill>
+                  <a:schemeClr val="tx2"/>
+                </a:solidFill>
+              </a:defRPr>
+            </a:lvl5pPr>
+            <a:lvl6pPr eaLnBrk="1" hangingPunct="1">
+              <a:defRPr>
+                <a:solidFill>
+                  <a:schemeClr val="tx2"/>
+                </a:solidFill>
+              </a:defRPr>
+            </a:lvl6pPr>
+            <a:lvl7pPr eaLnBrk="1" hangingPunct="1">
+              <a:defRPr>
+                <a:solidFill>
+                  <a:schemeClr val="tx2"/>
+                </a:solidFill>
+              </a:defRPr>
+            </a:lvl7pPr>
+            <a:lvl8pPr eaLnBrk="1" hangingPunct="1">
+              <a:defRPr>
+                <a:solidFill>
+                  <a:schemeClr val="tx2"/>
+                </a:solidFill>
+              </a:defRPr>
+            </a:lvl8pPr>
+            <a:lvl9pPr eaLnBrk="1" hangingPunct="1">
+              <a:defRPr>
+                <a:solidFill>
+                  <a:schemeClr val="tx2"/>
+                </a:solidFill>
+              </a:defRPr>
+            </a:lvl9pPr>
+          </a:lstStyle>
+          <a:p>
+            <a:r>
+              <a:rPr lang="es-ES" sz="3600" dirty="0"/>
+              <a:t>Etiquetas</a:t>
+            </a:r>
+          </a:p>
+        </p:txBody>
+      </p:sp>
+    </p:spTree>
+    <p:extLst>
+      <p:ext uri="{BB962C8B-B14F-4D97-AF65-F5344CB8AC3E}">
+        <p14:creationId xmlns:p14="http://schemas.microsoft.com/office/powerpoint/2010/main" val="3919469227"/>
+      </p:ext>
+    </p:extLst>
+  </p:cSld>
+  <p:clrMapOvr>
+    <a:masterClrMapping/>
+  </p:clrMapOvr>
+</p:sld>
+</file>
+
+<file path=ppt/slides/slide14.xml><?xml version="1.0" encoding="utf-8"?>
+<p:sld xmlns:a="http://schemas.openxmlformats.org/drawingml/2006/main" xmlns:r="http://schemas.openxmlformats.org/officeDocument/2006/relationships" xmlns:p="http://schemas.openxmlformats.org/presentationml/2006/main" showMasterSp="0">
+  <p:cSld>
+    <p:bg>
+      <p:bgPr>
+        <a:blipFill dpi="0" rotWithShape="1">
+          <a:blip r:embed="rId2">
+            <a:lum/>
+          </a:blip>
+          <a:srcRect/>
+          <a:stretch>
+            <a:fillRect/>
+          </a:stretch>
+        </a:blipFill>
+        <a:effectLst/>
+      </p:bgPr>
+    </p:bg>
+    <p:spTree>
+      <p:nvGrpSpPr>
+        <p:cNvPr id="1" name=""/>
+        <p:cNvGrpSpPr/>
+        <p:nvPr/>
+      </p:nvGrpSpPr>
+      <p:grpSpPr>
+        <a:xfrm>
+          <a:off x="0" y="0"/>
+          <a:ext cx="0" cy="0"/>
+          <a:chOff x="0" y="0"/>
+          <a:chExt cx="0" cy="0"/>
+        </a:xfrm>
+      </p:grpSpPr>
+      <p:sp>
+        <p:nvSpPr>
+          <p:cNvPr id="2" name="Título 1"/>
+          <p:cNvSpPr>
+            <a:spLocks noGrp="1"/>
+          </p:cNvSpPr>
+          <p:nvPr>
+            <p:ph type="title"/>
+          </p:nvPr>
+        </p:nvSpPr>
+        <p:spPr>
+          <a:xfrm>
+            <a:off x="0" y="-1"/>
+            <a:ext cx="12192000" cy="823914"/>
+          </a:xfrm>
+        </p:spPr>
+        <p:txBody>
+          <a:bodyPr>
+            <a:normAutofit/>
+          </a:bodyPr>
+          <a:lstStyle/>
+          <a:p>
+            <a:r>
+              <a:rPr lang="es-ES" dirty="0">
+                <a:solidFill>
+                  <a:schemeClr val="bg1"/>
+                </a:solidFill>
+              </a:rPr>
+              <a:t>Diseño</a:t>
+            </a:r>
+          </a:p>
+        </p:txBody>
+      </p:sp>
+      <p:sp>
+        <p:nvSpPr>
+          <p:cNvPr id="3" name="Marcador de contenido 2"/>
+          <p:cNvSpPr>
+            <a:spLocks noGrp="1"/>
+          </p:cNvSpPr>
+          <p:nvPr>
+            <p:ph idx="1"/>
+          </p:nvPr>
+        </p:nvSpPr>
+        <p:spPr>
+          <a:xfrm>
+            <a:off x="1427160" y="1797934"/>
+            <a:ext cx="10455278" cy="3653742"/>
+          </a:xfrm>
+        </p:spPr>
+        <p:txBody>
+          <a:bodyPr/>
+          <a:lstStyle/>
+          <a:p>
+            <a:r>
+              <a:rPr lang="es-ES" dirty="0"/>
+              <a:t>Léxico</a:t>
+            </a:r>
+          </a:p>
+          <a:p>
+            <a:pPr lvl="1"/>
+            <a:r>
+              <a:rPr lang="es-ES" dirty="0"/>
+              <a:t>Definición de </a:t>
+            </a:r>
+            <a:r>
+              <a:rPr lang="es-ES" dirty="0" err="1"/>
+              <a:t>tokens</a:t>
+            </a:r>
+            <a:endParaRPr lang="es-ES" dirty="0"/>
+          </a:p>
+          <a:p>
+            <a:pPr lvl="1"/>
+            <a:r>
+              <a:rPr lang="es-ES" dirty="0"/>
+              <a:t>Validación y ordenador de etiquetas</a:t>
+            </a:r>
+          </a:p>
+          <a:p>
+            <a:r>
+              <a:rPr lang="es-ES" dirty="0"/>
+              <a:t>Sintáctico</a:t>
+            </a:r>
+          </a:p>
+          <a:p>
+            <a:pPr lvl="1"/>
+            <a:r>
+              <a:rPr lang="es-ES" dirty="0"/>
+              <a:t>Ascendente</a:t>
+            </a:r>
+          </a:p>
+          <a:p>
+            <a:pPr lvl="1"/>
+            <a:r>
+              <a:rPr lang="es-ES" dirty="0"/>
+              <a:t>Gramática LALR(1)</a:t>
+            </a:r>
+          </a:p>
+          <a:p>
+            <a:pPr lvl="1"/>
+            <a:endParaRPr lang="es-ES" dirty="0"/>
+          </a:p>
+          <a:p>
+            <a:endParaRPr lang="es-ES" dirty="0"/>
+          </a:p>
+        </p:txBody>
+      </p:sp>
+      <p:sp>
+        <p:nvSpPr>
+          <p:cNvPr id="5" name="Marcador de pie de página 4"/>
+          <p:cNvSpPr>
+            <a:spLocks noGrp="1"/>
+          </p:cNvSpPr>
+          <p:nvPr>
+            <p:ph type="ftr" sz="quarter" idx="11"/>
+          </p:nvPr>
+        </p:nvSpPr>
+        <p:spPr>
+          <a:xfrm>
+            <a:off x="2079585" y="6605588"/>
+            <a:ext cx="10112415" cy="252412"/>
+          </a:xfrm>
+        </p:spPr>
+        <p:txBody>
+          <a:bodyPr/>
+          <a:lstStyle/>
+          <a:p>
+            <a:r>
+              <a:rPr lang="es-ES" dirty="0">
+                <a:solidFill>
+                  <a:schemeClr val="bg1"/>
+                </a:solidFill>
+              </a:rPr>
+              <a:t>Autor: César Piñeiro Pomar                                                                                                                                                                                  Perldoop 2.0: Un compilador fuente-a-fuente</a:t>
+            </a:r>
+            <a:endParaRPr lang="en-US" dirty="0">
+              <a:solidFill>
+                <a:schemeClr val="bg1"/>
+              </a:solidFill>
+            </a:endParaRPr>
+          </a:p>
+        </p:txBody>
+      </p:sp>
+      <p:sp>
+        <p:nvSpPr>
+          <p:cNvPr id="6" name="Título 1"/>
+          <p:cNvSpPr txBox="1">
+            <a:spLocks/>
+          </p:cNvSpPr>
+          <p:nvPr/>
+        </p:nvSpPr>
+        <p:spPr>
+          <a:xfrm>
+            <a:off x="0" y="823913"/>
+            <a:ext cx="12192000" cy="823914"/>
+          </a:xfrm>
+          <a:prstGeom prst="rect">
+            <a:avLst/>
+          </a:prstGeom>
+          <a:effectLst/>
+        </p:spPr>
+        <p:txBody>
+          <a:bodyPr vert="horz" lIns="91440" tIns="45720" rIns="91440" bIns="45720" rtlCol="0" anchor="ctr">
+            <a:normAutofit/>
+          </a:bodyPr>
+          <a:lstStyle>
+            <a:lvl1pPr algn="ctr" defTabSz="457200" rtl="0" eaLnBrk="1" latinLnBrk="0" hangingPunct="1">
+              <a:spcBef>
+                <a:spcPct val="0"/>
+              </a:spcBef>
+              <a:buNone/>
+              <a:defRPr sz="4000" kern="1200" cap="none">
+                <a:ln w="3175" cmpd="sng">
+                  <a:noFill/>
+                </a:ln>
+                <a:solidFill>
+                  <a:schemeClr val="tx1"/>
+                </a:solidFill>
+                <a:effectLst/>
+                <a:latin typeface="+mj-lt"/>
+                <a:ea typeface="+mj-ea"/>
+                <a:cs typeface="+mj-cs"/>
+              </a:defRPr>
+            </a:lvl1pPr>
+            <a:lvl2pPr eaLnBrk="1" hangingPunct="1">
+              <a:defRPr>
+                <a:solidFill>
+                  <a:schemeClr val="tx2"/>
+                </a:solidFill>
+              </a:defRPr>
+            </a:lvl2pPr>
+            <a:lvl3pPr eaLnBrk="1" hangingPunct="1">
+              <a:defRPr>
+                <a:solidFill>
+                  <a:schemeClr val="tx2"/>
+                </a:solidFill>
+              </a:defRPr>
+            </a:lvl3pPr>
+            <a:lvl4pPr eaLnBrk="1" hangingPunct="1">
+              <a:defRPr>
+                <a:solidFill>
+                  <a:schemeClr val="tx2"/>
+                </a:solidFill>
+              </a:defRPr>
+            </a:lvl4pPr>
+            <a:lvl5pPr eaLnBrk="1" hangingPunct="1">
+              <a:defRPr>
+                <a:solidFill>
+                  <a:schemeClr val="tx2"/>
+                </a:solidFill>
+              </a:defRPr>
+            </a:lvl5pPr>
+            <a:lvl6pPr eaLnBrk="1" hangingPunct="1">
+              <a:defRPr>
+                <a:solidFill>
+                  <a:schemeClr val="tx2"/>
+                </a:solidFill>
+              </a:defRPr>
+            </a:lvl6pPr>
+            <a:lvl7pPr eaLnBrk="1" hangingPunct="1">
+              <a:defRPr>
+                <a:solidFill>
+                  <a:schemeClr val="tx2"/>
+                </a:solidFill>
+              </a:defRPr>
+            </a:lvl7pPr>
+            <a:lvl8pPr eaLnBrk="1" hangingPunct="1">
+              <a:defRPr>
+                <a:solidFill>
+                  <a:schemeClr val="tx2"/>
+                </a:solidFill>
+              </a:defRPr>
+            </a:lvl8pPr>
+            <a:lvl9pPr eaLnBrk="1" hangingPunct="1">
+              <a:defRPr>
+                <a:solidFill>
+                  <a:schemeClr val="tx2"/>
+                </a:solidFill>
+              </a:defRPr>
+            </a:lvl9pPr>
+          </a:lstStyle>
+          <a:p>
+            <a:r>
+              <a:rPr lang="es-ES" sz="3600" dirty="0"/>
+              <a:t>Analizador Léxico y Sintáctico</a:t>
+            </a:r>
+          </a:p>
+        </p:txBody>
+      </p:sp>
+    </p:spTree>
+    <p:extLst>
+      <p:ext uri="{BB962C8B-B14F-4D97-AF65-F5344CB8AC3E}">
+        <p14:creationId xmlns:p14="http://schemas.microsoft.com/office/powerpoint/2010/main" val="1743927632"/>
+      </p:ext>
+    </p:extLst>
+  </p:cSld>
+  <p:clrMapOvr>
+    <a:masterClrMapping/>
+  </p:clrMapOvr>
+</p:sld>
+</file>
+
+<file path=ppt/slides/slide15.xml><?xml version="1.0" encoding="utf-8"?>
+<p:sld xmlns:a="http://schemas.openxmlformats.org/drawingml/2006/main" xmlns:r="http://schemas.openxmlformats.org/officeDocument/2006/relationships" xmlns:p="http://schemas.openxmlformats.org/presentationml/2006/main" showMasterSp="0">
+  <p:cSld>
+    <p:bg>
+      <p:bgPr>
+        <a:blipFill dpi="0" rotWithShape="1">
+          <a:blip r:embed="rId2">
+            <a:lum/>
+          </a:blip>
+          <a:srcRect/>
+          <a:stretch>
+            <a:fillRect/>
+          </a:stretch>
+        </a:blipFill>
+        <a:effectLst/>
+      </p:bgPr>
+    </p:bg>
+    <p:spTree>
+      <p:nvGrpSpPr>
+        <p:cNvPr id="1" name=""/>
+        <p:cNvGrpSpPr/>
+        <p:nvPr/>
+      </p:nvGrpSpPr>
+      <p:grpSpPr>
+        <a:xfrm>
+          <a:off x="0" y="0"/>
+          <a:ext cx="0" cy="0"/>
+          <a:chOff x="0" y="0"/>
+          <a:chExt cx="0" cy="0"/>
+        </a:xfrm>
+      </p:grpSpPr>
+      <p:sp>
+        <p:nvSpPr>
+          <p:cNvPr id="2" name="Título 1"/>
+          <p:cNvSpPr>
+            <a:spLocks noGrp="1"/>
+          </p:cNvSpPr>
+          <p:nvPr>
+            <p:ph type="title"/>
+          </p:nvPr>
+        </p:nvSpPr>
+        <p:spPr>
+          <a:xfrm>
+            <a:off x="0" y="-1"/>
+            <a:ext cx="12192000" cy="823914"/>
+          </a:xfrm>
+        </p:spPr>
+        <p:txBody>
+          <a:bodyPr>
+            <a:normAutofit/>
+          </a:bodyPr>
+          <a:lstStyle/>
+          <a:p>
+            <a:r>
+              <a:rPr lang="es-ES" dirty="0">
+                <a:solidFill>
+                  <a:schemeClr val="bg1"/>
+                </a:solidFill>
+              </a:rPr>
+              <a:t>Diseño</a:t>
+            </a:r>
+          </a:p>
+        </p:txBody>
+      </p:sp>
+      <p:sp>
+        <p:nvSpPr>
+          <p:cNvPr id="3" name="Marcador de contenido 2"/>
+          <p:cNvSpPr>
+            <a:spLocks noGrp="1"/>
+          </p:cNvSpPr>
+          <p:nvPr>
+            <p:ph idx="1"/>
+          </p:nvPr>
+        </p:nvSpPr>
+        <p:spPr>
+          <a:xfrm>
+            <a:off x="1427160" y="1797934"/>
+            <a:ext cx="10455278" cy="3653742"/>
+          </a:xfrm>
+        </p:spPr>
+        <p:txBody>
+          <a:bodyPr/>
+          <a:lstStyle/>
+          <a:p>
+            <a:r>
+              <a:rPr lang="es-ES" dirty="0"/>
+              <a:t>Comprobación y generación de código</a:t>
+            </a:r>
+          </a:p>
+          <a:p>
+            <a:r>
+              <a:rPr lang="es-ES" dirty="0"/>
+              <a:t>Utilidades</a:t>
+            </a:r>
+          </a:p>
+          <a:p>
+            <a:r>
+              <a:rPr lang="es-ES" dirty="0"/>
+              <a:t>Sistema de gestión de errores</a:t>
+            </a:r>
+          </a:p>
+          <a:p>
+            <a:endParaRPr lang="es-ES" dirty="0"/>
+          </a:p>
+        </p:txBody>
+      </p:sp>
+      <p:sp>
+        <p:nvSpPr>
+          <p:cNvPr id="5" name="Marcador de pie de página 4"/>
+          <p:cNvSpPr>
+            <a:spLocks noGrp="1"/>
+          </p:cNvSpPr>
+          <p:nvPr>
+            <p:ph type="ftr" sz="quarter" idx="11"/>
+          </p:nvPr>
+        </p:nvSpPr>
+        <p:spPr>
+          <a:xfrm>
+            <a:off x="2079585" y="6605588"/>
+            <a:ext cx="10112415" cy="252412"/>
+          </a:xfrm>
+        </p:spPr>
+        <p:txBody>
+          <a:bodyPr/>
+          <a:lstStyle/>
+          <a:p>
+            <a:r>
+              <a:rPr lang="es-ES" dirty="0">
+                <a:solidFill>
+                  <a:schemeClr val="bg1"/>
+                </a:solidFill>
+              </a:rPr>
+              <a:t>Autor: César Piñeiro Pomar                                                                                                                                                                                  Perldoop 2.0: Un compilador fuente-a-fuente</a:t>
+            </a:r>
+            <a:endParaRPr lang="en-US" dirty="0">
+              <a:solidFill>
+                <a:schemeClr val="bg1"/>
+              </a:solidFill>
+            </a:endParaRPr>
+          </a:p>
+        </p:txBody>
+      </p:sp>
+      <p:sp>
+        <p:nvSpPr>
+          <p:cNvPr id="6" name="Título 1"/>
+          <p:cNvSpPr txBox="1">
+            <a:spLocks/>
+          </p:cNvSpPr>
+          <p:nvPr/>
+        </p:nvSpPr>
+        <p:spPr>
+          <a:xfrm>
+            <a:off x="0" y="823913"/>
+            <a:ext cx="12192000" cy="823914"/>
+          </a:xfrm>
+          <a:prstGeom prst="rect">
+            <a:avLst/>
+          </a:prstGeom>
+          <a:effectLst/>
+        </p:spPr>
+        <p:txBody>
+          <a:bodyPr vert="horz" lIns="91440" tIns="45720" rIns="91440" bIns="45720" rtlCol="0" anchor="ctr">
+            <a:normAutofit/>
+          </a:bodyPr>
+          <a:lstStyle>
+            <a:lvl1pPr algn="ctr" defTabSz="457200" rtl="0" eaLnBrk="1" latinLnBrk="0" hangingPunct="1">
+              <a:spcBef>
+                <a:spcPct val="0"/>
+              </a:spcBef>
+              <a:buNone/>
+              <a:defRPr sz="4000" kern="1200" cap="none">
+                <a:ln w="3175" cmpd="sng">
+                  <a:noFill/>
+                </a:ln>
+                <a:solidFill>
+                  <a:schemeClr val="tx1"/>
+                </a:solidFill>
+                <a:effectLst/>
+                <a:latin typeface="+mj-lt"/>
+                <a:ea typeface="+mj-ea"/>
+                <a:cs typeface="+mj-cs"/>
+              </a:defRPr>
+            </a:lvl1pPr>
+            <a:lvl2pPr eaLnBrk="1" hangingPunct="1">
+              <a:defRPr>
+                <a:solidFill>
+                  <a:schemeClr val="tx2"/>
+                </a:solidFill>
+              </a:defRPr>
+            </a:lvl2pPr>
+            <a:lvl3pPr eaLnBrk="1" hangingPunct="1">
+              <a:defRPr>
+                <a:solidFill>
+                  <a:schemeClr val="tx2"/>
+                </a:solidFill>
+              </a:defRPr>
+            </a:lvl3pPr>
+            <a:lvl4pPr eaLnBrk="1" hangingPunct="1">
+              <a:defRPr>
+                <a:solidFill>
+                  <a:schemeClr val="tx2"/>
+                </a:solidFill>
+              </a:defRPr>
+            </a:lvl4pPr>
+            <a:lvl5pPr eaLnBrk="1" hangingPunct="1">
+              <a:defRPr>
+                <a:solidFill>
+                  <a:schemeClr val="tx2"/>
+                </a:solidFill>
+              </a:defRPr>
+            </a:lvl5pPr>
+            <a:lvl6pPr eaLnBrk="1" hangingPunct="1">
+              <a:defRPr>
+                <a:solidFill>
+                  <a:schemeClr val="tx2"/>
+                </a:solidFill>
+              </a:defRPr>
+            </a:lvl6pPr>
+            <a:lvl7pPr eaLnBrk="1" hangingPunct="1">
+              <a:defRPr>
+                <a:solidFill>
+                  <a:schemeClr val="tx2"/>
+                </a:solidFill>
+              </a:defRPr>
+            </a:lvl7pPr>
+            <a:lvl8pPr eaLnBrk="1" hangingPunct="1">
+              <a:defRPr>
+                <a:solidFill>
+                  <a:schemeClr val="tx2"/>
+                </a:solidFill>
+              </a:defRPr>
+            </a:lvl8pPr>
+            <a:lvl9pPr eaLnBrk="1" hangingPunct="1">
+              <a:defRPr>
+                <a:solidFill>
+                  <a:schemeClr val="tx2"/>
+                </a:solidFill>
+              </a:defRPr>
+            </a:lvl9pPr>
+          </a:lstStyle>
+          <a:p>
+            <a:r>
+              <a:rPr lang="es-ES" sz="3600" dirty="0"/>
+              <a:t>Módulos</a:t>
+            </a:r>
+          </a:p>
+        </p:txBody>
+      </p:sp>
+    </p:spTree>
+    <p:extLst>
+      <p:ext uri="{BB962C8B-B14F-4D97-AF65-F5344CB8AC3E}">
+        <p14:creationId xmlns:p14="http://schemas.microsoft.com/office/powerpoint/2010/main" val="515090135"/>
+      </p:ext>
+    </p:extLst>
+  </p:cSld>
+  <p:clrMapOvr>
+    <a:masterClrMapping/>
+  </p:clrMapOvr>
+</p:sld>
+</file>
+
+<file path=ppt/slides/slide16.xml><?xml version="1.0" encoding="utf-8"?>
+<p:sld xmlns:a="http://schemas.openxmlformats.org/drawingml/2006/main" xmlns:r="http://schemas.openxmlformats.org/officeDocument/2006/relationships" xmlns:p="http://schemas.openxmlformats.org/presentationml/2006/main" showMasterSp="0">
+  <p:cSld>
+    <p:bg>
+      <p:bgPr>
+        <a:blipFill dpi="0" rotWithShape="1">
+          <a:blip r:embed="rId2">
+            <a:lum/>
+          </a:blip>
+          <a:srcRect/>
+          <a:stretch>
+            <a:fillRect/>
+          </a:stretch>
+        </a:blipFill>
+        <a:effectLst/>
+      </p:bgPr>
+    </p:bg>
+    <p:spTree>
+      <p:nvGrpSpPr>
+        <p:cNvPr id="1" name=""/>
+        <p:cNvGrpSpPr/>
+        <p:nvPr/>
+      </p:nvGrpSpPr>
+      <p:grpSpPr>
+        <a:xfrm>
+          <a:off x="0" y="0"/>
+          <a:ext cx="0" cy="0"/>
+          <a:chOff x="0" y="0"/>
+          <a:chExt cx="0" cy="0"/>
+        </a:xfrm>
+      </p:grpSpPr>
+      <p:sp>
+        <p:nvSpPr>
+          <p:cNvPr id="2" name="Título 1"/>
+          <p:cNvSpPr>
+            <a:spLocks noGrp="1"/>
+          </p:cNvSpPr>
+          <p:nvPr>
+            <p:ph type="title"/>
+          </p:nvPr>
+        </p:nvSpPr>
+        <p:spPr>
+          <a:xfrm>
+            <a:off x="0" y="-1"/>
+            <a:ext cx="12192000" cy="823914"/>
+          </a:xfrm>
+        </p:spPr>
+        <p:txBody>
+          <a:bodyPr>
+            <a:normAutofit/>
+          </a:bodyPr>
+          <a:lstStyle/>
+          <a:p>
+            <a:r>
+              <a:rPr lang="es-ES" dirty="0">
+                <a:solidFill>
+                  <a:schemeClr val="bg1"/>
+                </a:solidFill>
+              </a:rPr>
+              <a:t>Diseño</a:t>
+            </a:r>
+          </a:p>
+        </p:txBody>
+      </p:sp>
+      <p:sp>
+        <p:nvSpPr>
+          <p:cNvPr id="3" name="Marcador de contenido 2"/>
+          <p:cNvSpPr>
+            <a:spLocks noGrp="1"/>
+          </p:cNvSpPr>
+          <p:nvPr>
+            <p:ph idx="1"/>
+          </p:nvPr>
+        </p:nvSpPr>
+        <p:spPr>
+          <a:xfrm>
+            <a:off x="1427160" y="1797934"/>
+            <a:ext cx="10455278" cy="3653742"/>
+          </a:xfrm>
+        </p:spPr>
+        <p:txBody>
+          <a:bodyPr/>
+          <a:lstStyle/>
+          <a:p>
+            <a:r>
+              <a:rPr lang="es-ES" dirty="0"/>
+              <a:t>Nivel de abstracción</a:t>
+            </a:r>
+          </a:p>
+          <a:p>
+            <a:r>
+              <a:rPr lang="es-ES" dirty="0"/>
+              <a:t>Simplificar traducción</a:t>
+            </a:r>
+          </a:p>
+          <a:p>
+            <a:r>
+              <a:rPr lang="es-ES" dirty="0"/>
+              <a:t>Tareas en tiempo de ejecución</a:t>
+            </a:r>
+          </a:p>
+          <a:p>
+            <a:r>
+              <a:rPr lang="es-ES" dirty="0"/>
+              <a:t>Funciones nativas</a:t>
+            </a:r>
+          </a:p>
+          <a:p>
+            <a:endParaRPr lang="es-ES" dirty="0"/>
+          </a:p>
+        </p:txBody>
+      </p:sp>
+      <p:sp>
+        <p:nvSpPr>
+          <p:cNvPr id="5" name="Marcador de pie de página 4"/>
+          <p:cNvSpPr>
+            <a:spLocks noGrp="1"/>
+          </p:cNvSpPr>
+          <p:nvPr>
+            <p:ph type="ftr" sz="quarter" idx="11"/>
+          </p:nvPr>
+        </p:nvSpPr>
+        <p:spPr>
+          <a:xfrm>
+            <a:off x="2079585" y="6605588"/>
+            <a:ext cx="10112415" cy="252412"/>
+          </a:xfrm>
+        </p:spPr>
+        <p:txBody>
+          <a:bodyPr/>
+          <a:lstStyle/>
+          <a:p>
+            <a:r>
+              <a:rPr lang="es-ES" dirty="0">
+                <a:solidFill>
+                  <a:schemeClr val="bg1"/>
+                </a:solidFill>
+              </a:rPr>
+              <a:t>Autor: César Piñeiro Pomar                                                                                                                                                                                  Perldoop 2.0: Un compilador fuente-a-fuente</a:t>
+            </a:r>
+            <a:endParaRPr lang="en-US" dirty="0">
+              <a:solidFill>
+                <a:schemeClr val="bg1"/>
+              </a:solidFill>
+            </a:endParaRPr>
+          </a:p>
+        </p:txBody>
+      </p:sp>
+      <p:sp>
+        <p:nvSpPr>
+          <p:cNvPr id="6" name="Título 1"/>
+          <p:cNvSpPr txBox="1">
+            <a:spLocks/>
+          </p:cNvSpPr>
+          <p:nvPr/>
+        </p:nvSpPr>
+        <p:spPr>
+          <a:xfrm>
+            <a:off x="0" y="823913"/>
+            <a:ext cx="12192000" cy="823914"/>
+          </a:xfrm>
+          <a:prstGeom prst="rect">
+            <a:avLst/>
+          </a:prstGeom>
+          <a:effectLst/>
+        </p:spPr>
+        <p:txBody>
+          <a:bodyPr vert="horz" lIns="91440" tIns="45720" rIns="91440" bIns="45720" rtlCol="0" anchor="ctr">
+            <a:normAutofit/>
+          </a:bodyPr>
+          <a:lstStyle>
+            <a:lvl1pPr algn="ctr" defTabSz="457200" rtl="0" eaLnBrk="1" latinLnBrk="0" hangingPunct="1">
+              <a:spcBef>
+                <a:spcPct val="0"/>
+              </a:spcBef>
+              <a:buNone/>
+              <a:defRPr sz="4000" kern="1200" cap="none">
+                <a:ln w="3175" cmpd="sng">
+                  <a:noFill/>
+                </a:ln>
+                <a:solidFill>
+                  <a:schemeClr val="tx1"/>
+                </a:solidFill>
+                <a:effectLst/>
+                <a:latin typeface="+mj-lt"/>
+                <a:ea typeface="+mj-ea"/>
+                <a:cs typeface="+mj-cs"/>
+              </a:defRPr>
+            </a:lvl1pPr>
+            <a:lvl2pPr eaLnBrk="1" hangingPunct="1">
+              <a:defRPr>
+                <a:solidFill>
+                  <a:schemeClr val="tx2"/>
+                </a:solidFill>
+              </a:defRPr>
+            </a:lvl2pPr>
+            <a:lvl3pPr eaLnBrk="1" hangingPunct="1">
+              <a:defRPr>
+                <a:solidFill>
+                  <a:schemeClr val="tx2"/>
+                </a:solidFill>
+              </a:defRPr>
+            </a:lvl3pPr>
+            <a:lvl4pPr eaLnBrk="1" hangingPunct="1">
+              <a:defRPr>
+                <a:solidFill>
+                  <a:schemeClr val="tx2"/>
+                </a:solidFill>
+              </a:defRPr>
+            </a:lvl4pPr>
+            <a:lvl5pPr eaLnBrk="1" hangingPunct="1">
+              <a:defRPr>
+                <a:solidFill>
+                  <a:schemeClr val="tx2"/>
+                </a:solidFill>
+              </a:defRPr>
+            </a:lvl5pPr>
+            <a:lvl6pPr eaLnBrk="1" hangingPunct="1">
+              <a:defRPr>
+                <a:solidFill>
+                  <a:schemeClr val="tx2"/>
+                </a:solidFill>
+              </a:defRPr>
+            </a:lvl6pPr>
+            <a:lvl7pPr eaLnBrk="1" hangingPunct="1">
+              <a:defRPr>
+                <a:solidFill>
+                  <a:schemeClr val="tx2"/>
+                </a:solidFill>
+              </a:defRPr>
+            </a:lvl7pPr>
+            <a:lvl8pPr eaLnBrk="1" hangingPunct="1">
+              <a:defRPr>
+                <a:solidFill>
+                  <a:schemeClr val="tx2"/>
+                </a:solidFill>
+              </a:defRPr>
+            </a:lvl8pPr>
+            <a:lvl9pPr eaLnBrk="1" hangingPunct="1">
+              <a:defRPr>
+                <a:solidFill>
+                  <a:schemeClr val="tx2"/>
+                </a:solidFill>
+              </a:defRPr>
+            </a:lvl9pPr>
+          </a:lstStyle>
+          <a:p>
+            <a:r>
+              <a:rPr lang="es-ES" sz="3600" dirty="0"/>
+              <a:t>Librería java</a:t>
+            </a:r>
+          </a:p>
+        </p:txBody>
+      </p:sp>
+    </p:spTree>
+    <p:extLst>
+      <p:ext uri="{BB962C8B-B14F-4D97-AF65-F5344CB8AC3E}">
+        <p14:creationId xmlns:p14="http://schemas.microsoft.com/office/powerpoint/2010/main" val="1193518467"/>
+      </p:ext>
+    </p:extLst>
+  </p:cSld>
+  <p:clrMapOvr>
+    <a:masterClrMapping/>
+  </p:clrMapOvr>
+</p:sld>
+</file>
+
+<file path=ppt/slides/slide17.xml><?xml version="1.0" encoding="utf-8"?>
+<p:sld xmlns:a="http://schemas.openxmlformats.org/drawingml/2006/main" xmlns:r="http://schemas.openxmlformats.org/officeDocument/2006/relationships" xmlns:p="http://schemas.openxmlformats.org/presentationml/2006/main" showMasterSp="0">
+  <p:cSld>
+    <p:bg>
+      <p:bgPr>
+        <a:blipFill dpi="0" rotWithShape="1">
+          <a:blip r:embed="rId2">
+            <a:lum/>
+          </a:blip>
+          <a:srcRect/>
+          <a:stretch>
+            <a:fillRect/>
+          </a:stretch>
+        </a:blipFill>
+        <a:effectLst/>
+      </p:bgPr>
+    </p:bg>
+    <p:spTree>
+      <p:nvGrpSpPr>
+        <p:cNvPr id="1" name=""/>
+        <p:cNvGrpSpPr/>
+        <p:nvPr/>
+      </p:nvGrpSpPr>
+      <p:grpSpPr>
+        <a:xfrm>
+          <a:off x="0" y="0"/>
+          <a:ext cx="0" cy="0"/>
+          <a:chOff x="0" y="0"/>
+          <a:chExt cx="0" cy="0"/>
+        </a:xfrm>
+      </p:grpSpPr>
+      <p:sp>
+        <p:nvSpPr>
+          <p:cNvPr id="2" name="Título 1"/>
+          <p:cNvSpPr>
+            <a:spLocks noGrp="1"/>
+          </p:cNvSpPr>
+          <p:nvPr>
+            <p:ph type="title"/>
+          </p:nvPr>
+        </p:nvSpPr>
+        <p:spPr>
+          <a:xfrm>
+            <a:off x="0" y="-1"/>
+            <a:ext cx="12192000" cy="823914"/>
+          </a:xfrm>
+        </p:spPr>
+        <p:txBody>
+          <a:bodyPr>
+            <a:normAutofit/>
+          </a:bodyPr>
+          <a:lstStyle/>
+          <a:p>
+            <a:r>
+              <a:rPr lang="es-ES" dirty="0">
+                <a:solidFill>
+                  <a:schemeClr val="bg1"/>
+                </a:solidFill>
+              </a:rPr>
+              <a:t>Demostración</a:t>
+            </a:r>
+          </a:p>
+        </p:txBody>
+      </p:sp>
+      <p:sp>
+        <p:nvSpPr>
+          <p:cNvPr id="3" name="Marcador de contenido 2"/>
+          <p:cNvSpPr>
+            <a:spLocks noGrp="1"/>
+          </p:cNvSpPr>
+          <p:nvPr>
+            <p:ph idx="1"/>
+          </p:nvPr>
+        </p:nvSpPr>
+        <p:spPr>
+          <a:xfrm>
+            <a:off x="1427160" y="1047751"/>
+            <a:ext cx="10455278" cy="4848225"/>
+          </a:xfrm>
+        </p:spPr>
+        <p:txBody>
+          <a:bodyPr/>
+          <a:lstStyle/>
+          <a:p>
+            <a:r>
+              <a:rPr lang="es-ES" dirty="0"/>
+              <a:t>Interfaz consola</a:t>
+            </a:r>
+          </a:p>
+          <a:p>
+            <a:r>
+              <a:rPr lang="es-ES" dirty="0"/>
+              <a:t>Código Sumatorio</a:t>
+            </a:r>
+          </a:p>
+          <a:p>
+            <a:endParaRPr lang="es-ES" dirty="0"/>
+          </a:p>
+        </p:txBody>
+      </p:sp>
+      <p:sp>
+        <p:nvSpPr>
+          <p:cNvPr id="5" name="Marcador de pie de página 4"/>
+          <p:cNvSpPr>
+            <a:spLocks noGrp="1"/>
+          </p:cNvSpPr>
+          <p:nvPr>
+            <p:ph type="ftr" sz="quarter" idx="11"/>
+          </p:nvPr>
+        </p:nvSpPr>
+        <p:spPr>
+          <a:xfrm>
+            <a:off x="2079585" y="6605588"/>
+            <a:ext cx="10112415" cy="252412"/>
+          </a:xfrm>
+        </p:spPr>
+        <p:txBody>
+          <a:bodyPr/>
+          <a:lstStyle/>
+          <a:p>
+            <a:r>
+              <a:rPr lang="es-ES" dirty="0">
+                <a:solidFill>
+                  <a:schemeClr val="bg1"/>
+                </a:solidFill>
+              </a:rPr>
+              <a:t>Autor: César Piñeiro Pomar                                                                                                                                                                                  Perldoop 2.0: Un compilador fuente-a-fuente</a:t>
+            </a:r>
+            <a:endParaRPr lang="en-US" dirty="0">
+              <a:solidFill>
+                <a:schemeClr val="bg1"/>
+              </a:solidFill>
+            </a:endParaRPr>
+          </a:p>
+        </p:txBody>
+      </p:sp>
     </p:spTree>
     <p:extLst>
       <p:ext uri="{BB962C8B-B14F-4D97-AF65-F5344CB8AC3E}">
         <p14:creationId xmlns:p14="http://schemas.microsoft.com/office/powerpoint/2010/main" val="2865075747"/>
+      </p:ext>
+    </p:extLst>
+  </p:cSld>
+  <p:clrMapOvr>
+    <a:masterClrMapping/>
+  </p:clrMapOvr>
+</p:sld>
+</file>
+
+<file path=ppt/slides/slide18.xml><?xml version="1.0" encoding="utf-8"?>
+<p:sld xmlns:a="http://schemas.openxmlformats.org/drawingml/2006/main" xmlns:r="http://schemas.openxmlformats.org/officeDocument/2006/relationships" xmlns:p="http://schemas.openxmlformats.org/presentationml/2006/main">
+  <p:cSld>
+    <p:spTree>
+      <p:nvGrpSpPr>
+        <p:cNvPr id="1" name=""/>
+        <p:cNvGrpSpPr/>
+        <p:nvPr/>
+      </p:nvGrpSpPr>
+      <p:grpSpPr>
+        <a:xfrm>
+          <a:off x="0" y="0"/>
+          <a:ext cx="0" cy="0"/>
+          <a:chOff x="0" y="0"/>
+          <a:chExt cx="0" cy="0"/>
+        </a:xfrm>
+      </p:grpSpPr>
+      <p:pic>
+        <p:nvPicPr>
+          <p:cNvPr id="6" name="Imagen 5"/>
+          <p:cNvPicPr>
+            <a:picLocks noChangeAspect="1"/>
+          </p:cNvPicPr>
+          <p:nvPr/>
+        </p:nvPicPr>
+        <p:blipFill>
+          <a:blip r:embed="rId2"/>
+          <a:stretch>
+            <a:fillRect/>
+          </a:stretch>
+        </p:blipFill>
+        <p:spPr>
+          <a:xfrm>
+            <a:off x="0" y="0"/>
+            <a:ext cx="12192000" cy="6858000"/>
+          </a:xfrm>
+          <a:prstGeom prst="rect">
+            <a:avLst/>
+          </a:prstGeom>
+        </p:spPr>
+      </p:pic>
+    </p:spTree>
+    <p:extLst>
+      <p:ext uri="{BB962C8B-B14F-4D97-AF65-F5344CB8AC3E}">
+        <p14:creationId xmlns:p14="http://schemas.microsoft.com/office/powerpoint/2010/main" val="3079231749"/>
+      </p:ext>
+    </p:extLst>
+  </p:cSld>
+  <p:clrMapOvr>
+    <a:masterClrMapping/>
+  </p:clrMapOvr>
+</p:sld>
+</file>
+
+<file path=ppt/slides/slide19.xml><?xml version="1.0" encoding="utf-8"?>
+<p:sld xmlns:a="http://schemas.openxmlformats.org/drawingml/2006/main" xmlns:r="http://schemas.openxmlformats.org/officeDocument/2006/relationships" xmlns:p="http://schemas.openxmlformats.org/presentationml/2006/main">
+  <p:cSld>
+    <p:spTree>
+      <p:nvGrpSpPr>
+        <p:cNvPr id="1" name=""/>
+        <p:cNvGrpSpPr/>
+        <p:nvPr/>
+      </p:nvGrpSpPr>
+      <p:grpSpPr>
+        <a:xfrm>
+          <a:off x="0" y="0"/>
+          <a:ext cx="0" cy="0"/>
+          <a:chOff x="0" y="0"/>
+          <a:chExt cx="0" cy="0"/>
+        </a:xfrm>
+      </p:grpSpPr>
+      <p:pic>
+        <p:nvPicPr>
+          <p:cNvPr id="2" name="Imagen 1"/>
+          <p:cNvPicPr>
+            <a:picLocks noChangeAspect="1"/>
+          </p:cNvPicPr>
+          <p:nvPr/>
+        </p:nvPicPr>
+        <p:blipFill>
+          <a:blip r:embed="rId2"/>
+          <a:stretch>
+            <a:fillRect/>
+          </a:stretch>
+        </p:blipFill>
+        <p:spPr>
+          <a:xfrm>
+            <a:off x="0" y="1"/>
+            <a:ext cx="12192000" cy="6858000"/>
+          </a:xfrm>
+          <a:prstGeom prst="rect">
+            <a:avLst/>
+          </a:prstGeom>
+        </p:spPr>
+      </p:pic>
+    </p:spTree>
+    <p:extLst>
+      <p:ext uri="{BB962C8B-B14F-4D97-AF65-F5344CB8AC3E}">
+        <p14:creationId xmlns:p14="http://schemas.microsoft.com/office/powerpoint/2010/main" val="1350742096"/>
       </p:ext>
     </p:extLst>
   </p:cSld>
@@ -7822,13 +9678,13 @@
           <a:p>
             <a:r>
               <a:rPr lang="es-ES" dirty="0"/>
+              <a:t>Motivación</a:t>
+            </a:r>
+          </a:p>
+          <a:p>
+            <a:r>
+              <a:rPr lang="es-ES" dirty="0"/>
               <a:t>Introducción</a:t>
-            </a:r>
-          </a:p>
-          <a:p>
-            <a:r>
-              <a:rPr lang="es-ES" dirty="0"/>
-              <a:t>Motivación</a:t>
             </a:r>
           </a:p>
           <a:p>
@@ -7846,13 +9702,13 @@
           <a:p>
             <a:r>
               <a:rPr lang="es-ES" dirty="0"/>
-              <a:t>Metodología</a:t>
+              <a:t>Gestión del proyecto</a:t>
             </a:r>
           </a:p>
           <a:p>
             <a:r>
               <a:rPr lang="es-ES" dirty="0"/>
-              <a:t>Desarrollo</a:t>
+              <a:t>Diseño</a:t>
             </a:r>
           </a:p>
           <a:p>
@@ -7870,7 +9726,7 @@
           <a:p>
             <a:r>
               <a:rPr lang="es-ES" dirty="0"/>
-              <a:t>Demostración en video</a:t>
+              <a:t>Demostración</a:t>
             </a:r>
           </a:p>
         </p:txBody>
@@ -7915,6 +9771,708 @@
     <p:extLst>
       <p:ext uri="{BB962C8B-B14F-4D97-AF65-F5344CB8AC3E}">
         <p14:creationId xmlns:p14="http://schemas.microsoft.com/office/powerpoint/2010/main" val="368080961"/>
+      </p:ext>
+    </p:extLst>
+  </p:cSld>
+  <p:clrMapOvr>
+    <a:masterClrMapping/>
+  </p:clrMapOvr>
+</p:sld>
+</file>
+
+<file path=ppt/slides/slide20.xml><?xml version="1.0" encoding="utf-8"?>
+<p:sld xmlns:a="http://schemas.openxmlformats.org/drawingml/2006/main" xmlns:r="http://schemas.openxmlformats.org/officeDocument/2006/relationships" xmlns:p="http://schemas.openxmlformats.org/presentationml/2006/main">
+  <p:cSld>
+    <p:spTree>
+      <p:nvGrpSpPr>
+        <p:cNvPr id="1" name=""/>
+        <p:cNvGrpSpPr/>
+        <p:nvPr/>
+      </p:nvGrpSpPr>
+      <p:grpSpPr>
+        <a:xfrm>
+          <a:off x="0" y="0"/>
+          <a:ext cx="0" cy="0"/>
+          <a:chOff x="0" y="0"/>
+          <a:chExt cx="0" cy="0"/>
+        </a:xfrm>
+      </p:grpSpPr>
+      <p:pic>
+        <p:nvPicPr>
+          <p:cNvPr id="2" name="Imagen 1"/>
+          <p:cNvPicPr>
+            <a:picLocks noChangeAspect="1"/>
+          </p:cNvPicPr>
+          <p:nvPr/>
+        </p:nvPicPr>
+        <p:blipFill>
+          <a:blip r:embed="rId2"/>
+          <a:stretch>
+            <a:fillRect/>
+          </a:stretch>
+        </p:blipFill>
+        <p:spPr>
+          <a:xfrm>
+            <a:off x="0" y="0"/>
+            <a:ext cx="12192000" cy="6858000"/>
+          </a:xfrm>
+          <a:prstGeom prst="rect">
+            <a:avLst/>
+          </a:prstGeom>
+        </p:spPr>
+      </p:pic>
+    </p:spTree>
+    <p:extLst>
+      <p:ext uri="{BB962C8B-B14F-4D97-AF65-F5344CB8AC3E}">
+        <p14:creationId xmlns:p14="http://schemas.microsoft.com/office/powerpoint/2010/main" val="2395445603"/>
+      </p:ext>
+    </p:extLst>
+  </p:cSld>
+  <p:clrMapOvr>
+    <a:masterClrMapping/>
+  </p:clrMapOvr>
+</p:sld>
+</file>
+
+<file path=ppt/slides/slide21.xml><?xml version="1.0" encoding="utf-8"?>
+<p:sld xmlns:a="http://schemas.openxmlformats.org/drawingml/2006/main" xmlns:r="http://schemas.openxmlformats.org/officeDocument/2006/relationships" xmlns:p="http://schemas.openxmlformats.org/presentationml/2006/main">
+  <p:cSld>
+    <p:spTree>
+      <p:nvGrpSpPr>
+        <p:cNvPr id="1" name=""/>
+        <p:cNvGrpSpPr/>
+        <p:nvPr/>
+      </p:nvGrpSpPr>
+      <p:grpSpPr>
+        <a:xfrm>
+          <a:off x="0" y="0"/>
+          <a:ext cx="0" cy="0"/>
+          <a:chOff x="0" y="0"/>
+          <a:chExt cx="0" cy="0"/>
+        </a:xfrm>
+      </p:grpSpPr>
+      <p:pic>
+        <p:nvPicPr>
+          <p:cNvPr id="3" name="Imagen 2"/>
+          <p:cNvPicPr>
+            <a:picLocks noChangeAspect="1"/>
+          </p:cNvPicPr>
+          <p:nvPr/>
+        </p:nvPicPr>
+        <p:blipFill>
+          <a:blip r:embed="rId2"/>
+          <a:stretch>
+            <a:fillRect/>
+          </a:stretch>
+        </p:blipFill>
+        <p:spPr>
+          <a:xfrm>
+            <a:off x="0" y="0"/>
+            <a:ext cx="12191999" cy="6858000"/>
+          </a:xfrm>
+          <a:prstGeom prst="rect">
+            <a:avLst/>
+          </a:prstGeom>
+        </p:spPr>
+      </p:pic>
+    </p:spTree>
+    <p:extLst>
+      <p:ext uri="{BB962C8B-B14F-4D97-AF65-F5344CB8AC3E}">
+        <p14:creationId xmlns:p14="http://schemas.microsoft.com/office/powerpoint/2010/main" val="996485059"/>
+      </p:ext>
+    </p:extLst>
+  </p:cSld>
+  <p:clrMapOvr>
+    <a:masterClrMapping/>
+  </p:clrMapOvr>
+</p:sld>
+</file>
+
+<file path=ppt/slides/slide22.xml><?xml version="1.0" encoding="utf-8"?>
+<p:sld xmlns:a="http://schemas.openxmlformats.org/drawingml/2006/main" xmlns:r="http://schemas.openxmlformats.org/officeDocument/2006/relationships" xmlns:p="http://schemas.openxmlformats.org/presentationml/2006/main">
+  <p:cSld>
+    <p:spTree>
+      <p:nvGrpSpPr>
+        <p:cNvPr id="1" name=""/>
+        <p:cNvGrpSpPr/>
+        <p:nvPr/>
+      </p:nvGrpSpPr>
+      <p:grpSpPr>
+        <a:xfrm>
+          <a:off x="0" y="0"/>
+          <a:ext cx="0" cy="0"/>
+          <a:chOff x="0" y="0"/>
+          <a:chExt cx="0" cy="0"/>
+        </a:xfrm>
+      </p:grpSpPr>
+      <p:pic>
+        <p:nvPicPr>
+          <p:cNvPr id="2" name="Imagen 1"/>
+          <p:cNvPicPr>
+            <a:picLocks noChangeAspect="1"/>
+          </p:cNvPicPr>
+          <p:nvPr/>
+        </p:nvPicPr>
+        <p:blipFill>
+          <a:blip r:embed="rId2"/>
+          <a:stretch>
+            <a:fillRect/>
+          </a:stretch>
+        </p:blipFill>
+        <p:spPr>
+          <a:xfrm>
+            <a:off x="0" y="0"/>
+            <a:ext cx="12192000" cy="6858000"/>
+          </a:xfrm>
+          <a:prstGeom prst="rect">
+            <a:avLst/>
+          </a:prstGeom>
+        </p:spPr>
+      </p:pic>
+    </p:spTree>
+    <p:extLst>
+      <p:ext uri="{BB962C8B-B14F-4D97-AF65-F5344CB8AC3E}">
+        <p14:creationId xmlns:p14="http://schemas.microsoft.com/office/powerpoint/2010/main" val="720213660"/>
+      </p:ext>
+    </p:extLst>
+  </p:cSld>
+  <p:clrMapOvr>
+    <a:masterClrMapping/>
+  </p:clrMapOvr>
+</p:sld>
+</file>
+
+<file path=ppt/slides/slide23.xml><?xml version="1.0" encoding="utf-8"?>
+<p:sld xmlns:a="http://schemas.openxmlformats.org/drawingml/2006/main" xmlns:r="http://schemas.openxmlformats.org/officeDocument/2006/relationships" xmlns:p="http://schemas.openxmlformats.org/presentationml/2006/main">
+  <p:cSld>
+    <p:spTree>
+      <p:nvGrpSpPr>
+        <p:cNvPr id="1" name=""/>
+        <p:cNvGrpSpPr/>
+        <p:nvPr/>
+      </p:nvGrpSpPr>
+      <p:grpSpPr>
+        <a:xfrm>
+          <a:off x="0" y="0"/>
+          <a:ext cx="0" cy="0"/>
+          <a:chOff x="0" y="0"/>
+          <a:chExt cx="0" cy="0"/>
+        </a:xfrm>
+      </p:grpSpPr>
+      <p:pic>
+        <p:nvPicPr>
+          <p:cNvPr id="2" name="Imagen 1"/>
+          <p:cNvPicPr>
+            <a:picLocks noChangeAspect="1"/>
+          </p:cNvPicPr>
+          <p:nvPr/>
+        </p:nvPicPr>
+        <p:blipFill>
+          <a:blip r:embed="rId2"/>
+          <a:stretch>
+            <a:fillRect/>
+          </a:stretch>
+        </p:blipFill>
+        <p:spPr>
+          <a:xfrm>
+            <a:off x="0" y="0"/>
+            <a:ext cx="12192001" cy="6858000"/>
+          </a:xfrm>
+          <a:prstGeom prst="rect">
+            <a:avLst/>
+          </a:prstGeom>
+        </p:spPr>
+      </p:pic>
+    </p:spTree>
+    <p:extLst>
+      <p:ext uri="{BB962C8B-B14F-4D97-AF65-F5344CB8AC3E}">
+        <p14:creationId xmlns:p14="http://schemas.microsoft.com/office/powerpoint/2010/main" val="2798500312"/>
+      </p:ext>
+    </p:extLst>
+  </p:cSld>
+  <p:clrMapOvr>
+    <a:masterClrMapping/>
+  </p:clrMapOvr>
+</p:sld>
+</file>
+
+<file path=ppt/slides/slide24.xml><?xml version="1.0" encoding="utf-8"?>
+<p:sld xmlns:a="http://schemas.openxmlformats.org/drawingml/2006/main" xmlns:r="http://schemas.openxmlformats.org/officeDocument/2006/relationships" xmlns:p="http://schemas.openxmlformats.org/presentationml/2006/main">
+  <p:cSld>
+    <p:spTree>
+      <p:nvGrpSpPr>
+        <p:cNvPr id="1" name=""/>
+        <p:cNvGrpSpPr/>
+        <p:nvPr/>
+      </p:nvGrpSpPr>
+      <p:grpSpPr>
+        <a:xfrm>
+          <a:off x="0" y="0"/>
+          <a:ext cx="0" cy="0"/>
+          <a:chOff x="0" y="0"/>
+          <a:chExt cx="0" cy="0"/>
+        </a:xfrm>
+      </p:grpSpPr>
+      <p:pic>
+        <p:nvPicPr>
+          <p:cNvPr id="2" name="Imagen 1"/>
+          <p:cNvPicPr>
+            <a:picLocks noChangeAspect="1"/>
+          </p:cNvPicPr>
+          <p:nvPr/>
+        </p:nvPicPr>
+        <p:blipFill>
+          <a:blip r:embed="rId2"/>
+          <a:stretch>
+            <a:fillRect/>
+          </a:stretch>
+        </p:blipFill>
+        <p:spPr>
+          <a:xfrm>
+            <a:off x="0" y="0"/>
+            <a:ext cx="12192000" cy="6858000"/>
+          </a:xfrm>
+          <a:prstGeom prst="rect">
+            <a:avLst/>
+          </a:prstGeom>
+        </p:spPr>
+      </p:pic>
+    </p:spTree>
+    <p:extLst>
+      <p:ext uri="{BB962C8B-B14F-4D97-AF65-F5344CB8AC3E}">
+        <p14:creationId xmlns:p14="http://schemas.microsoft.com/office/powerpoint/2010/main" val="2377187970"/>
+      </p:ext>
+    </p:extLst>
+  </p:cSld>
+  <p:clrMapOvr>
+    <a:masterClrMapping/>
+  </p:clrMapOvr>
+</p:sld>
+</file>
+
+<file path=ppt/slides/slide25.xml><?xml version="1.0" encoding="utf-8"?>
+<p:sld xmlns:a="http://schemas.openxmlformats.org/drawingml/2006/main" xmlns:r="http://schemas.openxmlformats.org/officeDocument/2006/relationships" xmlns:p="http://schemas.openxmlformats.org/presentationml/2006/main">
+  <p:cSld>
+    <p:spTree>
+      <p:nvGrpSpPr>
+        <p:cNvPr id="1" name=""/>
+        <p:cNvGrpSpPr/>
+        <p:nvPr/>
+      </p:nvGrpSpPr>
+      <p:grpSpPr>
+        <a:xfrm>
+          <a:off x="0" y="0"/>
+          <a:ext cx="0" cy="0"/>
+          <a:chOff x="0" y="0"/>
+          <a:chExt cx="0" cy="0"/>
+        </a:xfrm>
+      </p:grpSpPr>
+      <p:pic>
+        <p:nvPicPr>
+          <p:cNvPr id="2" name="Imagen 1"/>
+          <p:cNvPicPr>
+            <a:picLocks noChangeAspect="1"/>
+          </p:cNvPicPr>
+          <p:nvPr/>
+        </p:nvPicPr>
+        <p:blipFill>
+          <a:blip r:embed="rId2"/>
+          <a:stretch>
+            <a:fillRect/>
+          </a:stretch>
+        </p:blipFill>
+        <p:spPr>
+          <a:xfrm>
+            <a:off x="0" y="0"/>
+            <a:ext cx="12192000" cy="6858000"/>
+          </a:xfrm>
+          <a:prstGeom prst="rect">
+            <a:avLst/>
+          </a:prstGeom>
+        </p:spPr>
+      </p:pic>
+    </p:spTree>
+    <p:extLst>
+      <p:ext uri="{BB962C8B-B14F-4D97-AF65-F5344CB8AC3E}">
+        <p14:creationId xmlns:p14="http://schemas.microsoft.com/office/powerpoint/2010/main" val="540884787"/>
+      </p:ext>
+    </p:extLst>
+  </p:cSld>
+  <p:clrMapOvr>
+    <a:masterClrMapping/>
+  </p:clrMapOvr>
+</p:sld>
+</file>
+
+<file path=ppt/slides/slide26.xml><?xml version="1.0" encoding="utf-8"?>
+<p:sld xmlns:a="http://schemas.openxmlformats.org/drawingml/2006/main" xmlns:r="http://schemas.openxmlformats.org/officeDocument/2006/relationships" xmlns:p="http://schemas.openxmlformats.org/presentationml/2006/main">
+  <p:cSld>
+    <p:spTree>
+      <p:nvGrpSpPr>
+        <p:cNvPr id="1" name=""/>
+        <p:cNvGrpSpPr/>
+        <p:nvPr/>
+      </p:nvGrpSpPr>
+      <p:grpSpPr>
+        <a:xfrm>
+          <a:off x="0" y="0"/>
+          <a:ext cx="0" cy="0"/>
+          <a:chOff x="0" y="0"/>
+          <a:chExt cx="0" cy="0"/>
+        </a:xfrm>
+      </p:grpSpPr>
+      <p:pic>
+        <p:nvPicPr>
+          <p:cNvPr id="2" name="Imagen 1"/>
+          <p:cNvPicPr>
+            <a:picLocks noChangeAspect="1"/>
+          </p:cNvPicPr>
+          <p:nvPr/>
+        </p:nvPicPr>
+        <p:blipFill>
+          <a:blip r:embed="rId2"/>
+          <a:stretch>
+            <a:fillRect/>
+          </a:stretch>
+        </p:blipFill>
+        <p:spPr>
+          <a:xfrm>
+            <a:off x="0" y="0"/>
+            <a:ext cx="12435840" cy="6995160"/>
+          </a:xfrm>
+          <a:prstGeom prst="rect">
+            <a:avLst/>
+          </a:prstGeom>
+        </p:spPr>
+      </p:pic>
+    </p:spTree>
+    <p:extLst>
+      <p:ext uri="{BB962C8B-B14F-4D97-AF65-F5344CB8AC3E}">
+        <p14:creationId xmlns:p14="http://schemas.microsoft.com/office/powerpoint/2010/main" val="1681546175"/>
+      </p:ext>
+    </p:extLst>
+  </p:cSld>
+  <p:clrMapOvr>
+    <a:masterClrMapping/>
+  </p:clrMapOvr>
+</p:sld>
+</file>
+
+<file path=ppt/slides/slide27.xml><?xml version="1.0" encoding="utf-8"?>
+<p:sld xmlns:a="http://schemas.openxmlformats.org/drawingml/2006/main" xmlns:r="http://schemas.openxmlformats.org/officeDocument/2006/relationships" xmlns:p="http://schemas.openxmlformats.org/presentationml/2006/main" showMasterSp="0">
+  <p:cSld>
+    <p:bg>
+      <p:bgPr>
+        <a:blipFill dpi="0" rotWithShape="1">
+          <a:blip r:embed="rId2">
+            <a:lum/>
+          </a:blip>
+          <a:srcRect/>
+          <a:stretch>
+            <a:fillRect/>
+          </a:stretch>
+        </a:blipFill>
+        <a:effectLst/>
+      </p:bgPr>
+    </p:bg>
+    <p:spTree>
+      <p:nvGrpSpPr>
+        <p:cNvPr id="1" name=""/>
+        <p:cNvGrpSpPr/>
+        <p:nvPr/>
+      </p:nvGrpSpPr>
+      <p:grpSpPr>
+        <a:xfrm>
+          <a:off x="0" y="0"/>
+          <a:ext cx="0" cy="0"/>
+          <a:chOff x="0" y="0"/>
+          <a:chExt cx="0" cy="0"/>
+        </a:xfrm>
+      </p:grpSpPr>
+      <p:sp>
+        <p:nvSpPr>
+          <p:cNvPr id="2" name="Título 1"/>
+          <p:cNvSpPr>
+            <a:spLocks noGrp="1"/>
+          </p:cNvSpPr>
+          <p:nvPr>
+            <p:ph type="title"/>
+          </p:nvPr>
+        </p:nvSpPr>
+        <p:spPr>
+          <a:xfrm>
+            <a:off x="0" y="-1"/>
+            <a:ext cx="12192000" cy="823914"/>
+          </a:xfrm>
+        </p:spPr>
+        <p:txBody>
+          <a:bodyPr>
+            <a:normAutofit/>
+          </a:bodyPr>
+          <a:lstStyle/>
+          <a:p>
+            <a:r>
+              <a:rPr lang="es-ES" dirty="0">
+                <a:solidFill>
+                  <a:schemeClr val="bg1"/>
+                </a:solidFill>
+              </a:rPr>
+              <a:t>Conclusiones</a:t>
+            </a:r>
+          </a:p>
+        </p:txBody>
+      </p:sp>
+      <p:sp>
+        <p:nvSpPr>
+          <p:cNvPr id="3" name="Marcador de contenido 2"/>
+          <p:cNvSpPr>
+            <a:spLocks noGrp="1"/>
+          </p:cNvSpPr>
+          <p:nvPr>
+            <p:ph idx="1"/>
+          </p:nvPr>
+        </p:nvSpPr>
+        <p:spPr>
+          <a:xfrm>
+            <a:off x="1427160" y="1512425"/>
+            <a:ext cx="10455278" cy="3600433"/>
+          </a:xfrm>
+        </p:spPr>
+        <p:txBody>
+          <a:bodyPr>
+            <a:normAutofit/>
+          </a:bodyPr>
+          <a:lstStyle/>
+          <a:p>
+            <a:r>
+              <a:rPr lang="es-ES" dirty="0"/>
+              <a:t>La sintaxis de Perl es inmensa</a:t>
+            </a:r>
+          </a:p>
+          <a:p>
+            <a:r>
+              <a:rPr lang="es-ES" dirty="0"/>
+              <a:t>Su ambigüedad dificulta una traducción</a:t>
+            </a:r>
+          </a:p>
+          <a:p>
+            <a:r>
+              <a:rPr lang="es-ES" dirty="0"/>
+              <a:t>El tiempo es un limitante muy importante</a:t>
+            </a:r>
+          </a:p>
+          <a:p>
+            <a:endParaRPr lang="es-ES" dirty="0"/>
+          </a:p>
+        </p:txBody>
+      </p:sp>
+      <p:sp>
+        <p:nvSpPr>
+          <p:cNvPr id="5" name="Marcador de pie de página 4"/>
+          <p:cNvSpPr>
+            <a:spLocks noGrp="1"/>
+          </p:cNvSpPr>
+          <p:nvPr>
+            <p:ph type="ftr" sz="quarter" idx="11"/>
+          </p:nvPr>
+        </p:nvSpPr>
+        <p:spPr>
+          <a:xfrm>
+            <a:off x="2079585" y="6605588"/>
+            <a:ext cx="10112415" cy="252412"/>
+          </a:xfrm>
+        </p:spPr>
+        <p:txBody>
+          <a:bodyPr/>
+          <a:lstStyle/>
+          <a:p>
+            <a:r>
+              <a:rPr lang="es-ES" dirty="0">
+                <a:solidFill>
+                  <a:schemeClr val="bg1"/>
+                </a:solidFill>
+              </a:rPr>
+              <a:t>Autor: César Piñeiro Pomar                                                                                                                                                                                  Perldoop 2.0: Un compilador fuente-a-fuente</a:t>
+            </a:r>
+            <a:endParaRPr lang="en-US" dirty="0">
+              <a:solidFill>
+                <a:schemeClr val="bg1"/>
+              </a:solidFill>
+            </a:endParaRPr>
+          </a:p>
+        </p:txBody>
+      </p:sp>
+    </p:spTree>
+    <p:extLst>
+      <p:ext uri="{BB962C8B-B14F-4D97-AF65-F5344CB8AC3E}">
+        <p14:creationId xmlns:p14="http://schemas.microsoft.com/office/powerpoint/2010/main" val="1552365097"/>
+      </p:ext>
+    </p:extLst>
+  </p:cSld>
+  <p:clrMapOvr>
+    <a:masterClrMapping/>
+  </p:clrMapOvr>
+</p:sld>
+</file>
+
+<file path=ppt/slides/slide28.xml><?xml version="1.0" encoding="utf-8"?>
+<p:sld xmlns:a="http://schemas.openxmlformats.org/drawingml/2006/main" xmlns:r="http://schemas.openxmlformats.org/officeDocument/2006/relationships" xmlns:p="http://schemas.openxmlformats.org/presentationml/2006/main" showMasterSp="0">
+  <p:cSld>
+    <p:bg>
+      <p:bgPr>
+        <a:blipFill dpi="0" rotWithShape="1">
+          <a:blip r:embed="rId2">
+            <a:lum/>
+          </a:blip>
+          <a:srcRect/>
+          <a:stretch>
+            <a:fillRect/>
+          </a:stretch>
+        </a:blipFill>
+        <a:effectLst/>
+      </p:bgPr>
+    </p:bg>
+    <p:spTree>
+      <p:nvGrpSpPr>
+        <p:cNvPr id="1" name=""/>
+        <p:cNvGrpSpPr/>
+        <p:nvPr/>
+      </p:nvGrpSpPr>
+      <p:grpSpPr>
+        <a:xfrm>
+          <a:off x="0" y="0"/>
+          <a:ext cx="0" cy="0"/>
+          <a:chOff x="0" y="0"/>
+          <a:chExt cx="0" cy="0"/>
+        </a:xfrm>
+      </p:grpSpPr>
+      <p:sp>
+        <p:nvSpPr>
+          <p:cNvPr id="2" name="Título 1"/>
+          <p:cNvSpPr>
+            <a:spLocks noGrp="1"/>
+          </p:cNvSpPr>
+          <p:nvPr>
+            <p:ph type="title"/>
+          </p:nvPr>
+        </p:nvSpPr>
+        <p:spPr>
+          <a:xfrm>
+            <a:off x="0" y="-1"/>
+            <a:ext cx="12192000" cy="823914"/>
+          </a:xfrm>
+        </p:spPr>
+        <p:txBody>
+          <a:bodyPr>
+            <a:normAutofit/>
+          </a:bodyPr>
+          <a:lstStyle/>
+          <a:p>
+            <a:r>
+              <a:rPr lang="es-ES" dirty="0">
+                <a:solidFill>
+                  <a:schemeClr val="bg1"/>
+                </a:solidFill>
+              </a:rPr>
+              <a:t>Conocimiento Adquirido</a:t>
+            </a:r>
+          </a:p>
+        </p:txBody>
+      </p:sp>
+      <p:sp>
+        <p:nvSpPr>
+          <p:cNvPr id="3" name="Marcador de contenido 2"/>
+          <p:cNvSpPr>
+            <a:spLocks noGrp="1"/>
+          </p:cNvSpPr>
+          <p:nvPr>
+            <p:ph idx="1"/>
+          </p:nvPr>
+        </p:nvSpPr>
+        <p:spPr>
+          <a:xfrm>
+            <a:off x="1427160" y="1983129"/>
+            <a:ext cx="10455278" cy="3912847"/>
+          </a:xfrm>
+        </p:spPr>
+        <p:txBody>
+          <a:bodyPr/>
+          <a:lstStyle/>
+          <a:p>
+            <a:r>
+              <a:rPr lang="es-ES" dirty="0"/>
+              <a:t>Conocimiento y soltura con Python y Perl</a:t>
+            </a:r>
+          </a:p>
+          <a:p>
+            <a:r>
+              <a:rPr lang="es-ES" dirty="0"/>
+              <a:t>Manejo mas profundo de la creación de gramáticas</a:t>
+            </a:r>
+          </a:p>
+          <a:p>
+            <a:r>
+              <a:rPr lang="es-ES" dirty="0"/>
+              <a:t>Diseño de un compilador con todas sus fases</a:t>
+            </a:r>
+          </a:p>
+          <a:p>
+            <a:r>
+              <a:rPr lang="es-ES" dirty="0"/>
+              <a:t>Experiencia en tecnologías Big Data con Hadoop</a:t>
+            </a:r>
+          </a:p>
+          <a:p>
+            <a:endParaRPr lang="es-ES" dirty="0"/>
+          </a:p>
+          <a:p>
+            <a:endParaRPr lang="es-ES" dirty="0"/>
+          </a:p>
+          <a:p>
+            <a:endParaRPr lang="es-ES" dirty="0"/>
+          </a:p>
+        </p:txBody>
+      </p:sp>
+      <p:sp>
+        <p:nvSpPr>
+          <p:cNvPr id="5" name="Marcador de pie de página 4"/>
+          <p:cNvSpPr>
+            <a:spLocks noGrp="1"/>
+          </p:cNvSpPr>
+          <p:nvPr>
+            <p:ph type="ftr" sz="quarter" idx="11"/>
+          </p:nvPr>
+        </p:nvSpPr>
+        <p:spPr>
+          <a:xfrm>
+            <a:off x="2079585" y="6605588"/>
+            <a:ext cx="10112415" cy="252412"/>
+          </a:xfrm>
+        </p:spPr>
+        <p:txBody>
+          <a:bodyPr/>
+          <a:lstStyle/>
+          <a:p>
+            <a:r>
+              <a:rPr lang="es-ES" dirty="0">
+                <a:solidFill>
+                  <a:schemeClr val="bg1"/>
+                </a:solidFill>
+              </a:rPr>
+              <a:t>Autor: César Piñeiro Pomar                                                                                                                                                                                  Perldoop 2.0: Un compilador fuente-a-fuente</a:t>
+            </a:r>
+            <a:endParaRPr lang="en-US" dirty="0">
+              <a:solidFill>
+                <a:schemeClr val="bg1"/>
+              </a:solidFill>
+            </a:endParaRPr>
+          </a:p>
+        </p:txBody>
+      </p:sp>
+    </p:spTree>
+    <p:extLst>
+      <p:ext uri="{BB962C8B-B14F-4D97-AF65-F5344CB8AC3E}">
+        <p14:creationId xmlns:p14="http://schemas.microsoft.com/office/powerpoint/2010/main" val="4078897029"/>
       </p:ext>
     </p:extLst>
   </p:cSld>
@@ -7983,7 +10541,7 @@
                   <a:schemeClr val="bg1"/>
                 </a:solidFill>
               </a:rPr>
-              <a:t>Introducción</a:t>
+              <a:t>Motivación</a:t>
             </a:r>
           </a:p>
         </p:txBody>
@@ -8010,23 +10568,14 @@
           <a:p>
             <a:r>
               <a:rPr lang="es-ES" dirty="0"/>
-              <a:t>Perldoop como un compilador fuente-a-fuente Perl-Java</a:t>
+              <a:t>Desarrollar un proyecto con una alta complejidad</a:t>
             </a:r>
           </a:p>
           <a:p>
             <a:r>
               <a:rPr lang="es-ES" dirty="0"/>
-              <a:t>Mejoras de la versión 2.0</a:t>
-            </a:r>
-          </a:p>
-          <a:p>
-            <a:r>
-              <a:rPr lang="es-ES" dirty="0"/>
-              <a:t>Etiquetas y su funcionamiento</a:t>
-            </a:r>
-          </a:p>
-          <a:p>
-            <a:endParaRPr lang="es-ES" dirty="0"/>
+              <a:t>Complementar los conocimiento adquiridos en la asignatura de compiladores</a:t>
+            </a:r>
           </a:p>
           <a:p>
             <a:endParaRPr lang="es-ES" dirty="0"/>
@@ -8072,7 +10621,7 @@
     </p:spTree>
     <p:extLst>
       <p:ext uri="{BB962C8B-B14F-4D97-AF65-F5344CB8AC3E}">
-        <p14:creationId xmlns:p14="http://schemas.microsoft.com/office/powerpoint/2010/main" val="2041438776"/>
+        <p14:creationId xmlns:p14="http://schemas.microsoft.com/office/powerpoint/2010/main" val="2103857669"/>
       </p:ext>
     </p:extLst>
   </p:cSld>
@@ -8141,7 +10690,7 @@
                   <a:schemeClr val="bg1"/>
                 </a:solidFill>
               </a:rPr>
-              <a:t>Motivación</a:t>
+              <a:t>Introducción</a:t>
             </a:r>
           </a:p>
         </p:txBody>
@@ -8168,14 +10717,23 @@
           <a:p>
             <a:r>
               <a:rPr lang="es-ES" dirty="0"/>
-              <a:t>Desarrollar un proyecto con una alta complejidad</a:t>
+              <a:t>Perldoop como un compilador fuente-a-fuente Perl-Java</a:t>
             </a:r>
           </a:p>
           <a:p>
             <a:r>
               <a:rPr lang="es-ES" dirty="0"/>
-              <a:t>Complementar los conocimiento adquiridos en la asignatura de compiladores</a:t>
-            </a:r>
+              <a:t>Mejoras de la versión 2.0</a:t>
+            </a:r>
+          </a:p>
+          <a:p>
+            <a:r>
+              <a:rPr lang="es-ES" dirty="0"/>
+              <a:t>Etiquetas y como funcionan</a:t>
+            </a:r>
+          </a:p>
+          <a:p>
+            <a:endParaRPr lang="es-ES" dirty="0"/>
           </a:p>
           <a:p>
             <a:endParaRPr lang="es-ES" dirty="0"/>
@@ -8221,7 +10779,7 @@
     </p:spTree>
     <p:extLst>
       <p:ext uri="{BB962C8B-B14F-4D97-AF65-F5344CB8AC3E}">
-        <p14:creationId xmlns:p14="http://schemas.microsoft.com/office/powerpoint/2010/main" val="2103857669"/>
+        <p14:creationId xmlns:p14="http://schemas.microsoft.com/office/powerpoint/2010/main" val="2041438776"/>
       </p:ext>
     </p:extLst>
   </p:cSld>
@@ -8655,7 +11213,7 @@
                   <a:schemeClr val="bg1"/>
                 </a:solidFill>
               </a:rPr>
-              <a:t>Metodología</a:t>
+              <a:t>Gestión del proyecto</a:t>
             </a:r>
           </a:p>
         </p:txBody>
@@ -8672,8 +11230,8 @@
         </p:nvSpPr>
         <p:spPr>
           <a:xfrm>
-            <a:off x="1427160" y="1047751"/>
-            <a:ext cx="10455278" cy="4848225"/>
+            <a:off x="1427160" y="1797934"/>
+            <a:ext cx="10455278" cy="3653742"/>
           </a:xfrm>
         </p:spPr>
         <p:txBody>
@@ -8682,35 +11240,29 @@
           <a:p>
             <a:r>
               <a:rPr lang="es-ES" dirty="0"/>
-              <a:t>Características del proyecto</a:t>
-            </a:r>
-          </a:p>
-          <a:p>
-            <a:pPr lvl="1"/>
+              <a:t>Criterios de aceptación</a:t>
+            </a:r>
+          </a:p>
+          <a:p>
             <a:r>
               <a:rPr lang="es-ES" dirty="0"/>
-              <a:t>Proyecto individual</a:t>
-            </a:r>
-          </a:p>
-          <a:p>
-            <a:pPr lvl="1"/>
+              <a:t>Restricciones</a:t>
+            </a:r>
+          </a:p>
+          <a:p>
             <a:r>
               <a:rPr lang="es-ES" dirty="0"/>
-              <a:t>Componente de investigación</a:t>
-            </a:r>
-          </a:p>
-          <a:p>
-            <a:pPr lvl="1"/>
+              <a:t>Exclusiones</a:t>
+            </a:r>
+          </a:p>
+          <a:p>
             <a:r>
               <a:rPr lang="es-ES" dirty="0"/>
-              <a:t>Requisitos Fijos</a:t>
-            </a:r>
-          </a:p>
-          <a:p>
-            <a:r>
-              <a:rPr lang="es-ES" dirty="0"/>
-              <a:t>Programación Extrema</a:t>
-            </a:r>
+              <a:t>Supuestos</a:t>
+            </a:r>
+          </a:p>
+          <a:p>
+            <a:endParaRPr lang="es-ES" dirty="0"/>
           </a:p>
         </p:txBody>
       </p:sp>
@@ -8750,10 +11302,116 @@
           </a:p>
         </p:txBody>
       </p:sp>
+      <p:sp>
+        <p:nvSpPr>
+          <p:cNvPr id="6" name="Título 1"/>
+          <p:cNvSpPr txBox="1">
+            <a:spLocks/>
+          </p:cNvSpPr>
+          <p:nvPr/>
+        </p:nvSpPr>
+        <p:spPr>
+          <a:xfrm>
+            <a:off x="0" y="823913"/>
+            <a:ext cx="12192000" cy="823914"/>
+          </a:xfrm>
+          <a:prstGeom prst="rect">
+            <a:avLst/>
+          </a:prstGeom>
+          <a:effectLst/>
+        </p:spPr>
+        <p:txBody>
+          <a:bodyPr vert="horz" lIns="91440" tIns="45720" rIns="91440" bIns="45720" rtlCol="0" anchor="ctr">
+            <a:normAutofit/>
+          </a:bodyPr>
+          <a:lstStyle>
+            <a:lvl1pPr algn="ctr" defTabSz="457200" rtl="0" eaLnBrk="1" latinLnBrk="0" hangingPunct="1">
+              <a:spcBef>
+                <a:spcPct val="0"/>
+              </a:spcBef>
+              <a:buNone/>
+              <a:defRPr sz="4000" kern="1200" cap="none">
+                <a:ln w="3175" cmpd="sng">
+                  <a:noFill/>
+                </a:ln>
+                <a:solidFill>
+                  <a:schemeClr val="tx1"/>
+                </a:solidFill>
+                <a:effectLst/>
+                <a:latin typeface="+mj-lt"/>
+                <a:ea typeface="+mj-ea"/>
+                <a:cs typeface="+mj-cs"/>
+              </a:defRPr>
+            </a:lvl1pPr>
+            <a:lvl2pPr eaLnBrk="1" hangingPunct="1">
+              <a:defRPr>
+                <a:solidFill>
+                  <a:schemeClr val="tx2"/>
+                </a:solidFill>
+              </a:defRPr>
+            </a:lvl2pPr>
+            <a:lvl3pPr eaLnBrk="1" hangingPunct="1">
+              <a:defRPr>
+                <a:solidFill>
+                  <a:schemeClr val="tx2"/>
+                </a:solidFill>
+              </a:defRPr>
+            </a:lvl3pPr>
+            <a:lvl4pPr eaLnBrk="1" hangingPunct="1">
+              <a:defRPr>
+                <a:solidFill>
+                  <a:schemeClr val="tx2"/>
+                </a:solidFill>
+              </a:defRPr>
+            </a:lvl4pPr>
+            <a:lvl5pPr eaLnBrk="1" hangingPunct="1">
+              <a:defRPr>
+                <a:solidFill>
+                  <a:schemeClr val="tx2"/>
+                </a:solidFill>
+              </a:defRPr>
+            </a:lvl5pPr>
+            <a:lvl6pPr eaLnBrk="1" hangingPunct="1">
+              <a:defRPr>
+                <a:solidFill>
+                  <a:schemeClr val="tx2"/>
+                </a:solidFill>
+              </a:defRPr>
+            </a:lvl6pPr>
+            <a:lvl7pPr eaLnBrk="1" hangingPunct="1">
+              <a:defRPr>
+                <a:solidFill>
+                  <a:schemeClr val="tx2"/>
+                </a:solidFill>
+              </a:defRPr>
+            </a:lvl7pPr>
+            <a:lvl8pPr eaLnBrk="1" hangingPunct="1">
+              <a:defRPr>
+                <a:solidFill>
+                  <a:schemeClr val="tx2"/>
+                </a:solidFill>
+              </a:defRPr>
+            </a:lvl8pPr>
+            <a:lvl9pPr eaLnBrk="1" hangingPunct="1">
+              <a:defRPr>
+                <a:solidFill>
+                  <a:schemeClr val="tx2"/>
+                </a:solidFill>
+              </a:defRPr>
+            </a:lvl9pPr>
+          </a:lstStyle>
+          <a:p>
+            <a:r>
+              <a:rPr lang="es-ES" sz="3600" dirty="0"/>
+              <a:t>Gestión del Alcance</a:t>
+            </a:r>
+          </a:p>
+        </p:txBody>
+      </p:sp>
     </p:spTree>
     <p:extLst>
       <p:ext uri="{BB962C8B-B14F-4D97-AF65-F5344CB8AC3E}">
-        <p14:creationId xmlns:p14="http://schemas.microsoft.com/office/powerpoint/2010/main" val="3571979615"/>
+        <p14:creationId xmlns:p14="http://schemas.microsoft.com/office/powerpoint/2010/main" val="2021625253"/>
       </p:ext>
     </p:extLst>
   </p:cSld>
@@ -8822,52 +11480,7 @@
                   <a:schemeClr val="bg1"/>
                 </a:solidFill>
               </a:rPr>
-              <a:t>Desarrollo</a:t>
-            </a:r>
-          </a:p>
-        </p:txBody>
-      </p:sp>
-      <p:sp>
-        <p:nvSpPr>
-          <p:cNvPr id="3" name="Marcador de contenido 2"/>
-          <p:cNvSpPr>
-            <a:spLocks noGrp="1"/>
-          </p:cNvSpPr>
-          <p:nvPr>
-            <p:ph idx="1"/>
-          </p:nvPr>
-        </p:nvSpPr>
-        <p:spPr>
-          <a:xfrm>
-            <a:off x="1427160" y="1047751"/>
-            <a:ext cx="10455278" cy="4848225"/>
-          </a:xfrm>
-        </p:spPr>
-        <p:txBody>
-          <a:bodyPr/>
-          <a:lstStyle/>
-          <a:p>
-            <a:r>
-              <a:rPr lang="es-ES" dirty="0"/>
-              <a:t>Analizador léxico y sintáctico</a:t>
-            </a:r>
-          </a:p>
-          <a:p>
-            <a:r>
-              <a:rPr lang="es-ES" dirty="0"/>
-              <a:t>Comprobación semántica y generador de código</a:t>
-            </a:r>
-          </a:p>
-          <a:p>
-            <a:r>
-              <a:rPr lang="es-ES" dirty="0"/>
-              <a:t>Sistema de gestión y recuperación de errores</a:t>
-            </a:r>
-          </a:p>
-          <a:p>
-            <a:r>
-              <a:rPr lang="es-ES" dirty="0"/>
-              <a:t>Librería auxiliar java</a:t>
+              <a:t>Gestión del proyecto</a:t>
             </a:r>
           </a:p>
         </p:txBody>
@@ -8908,10 +11521,140 @@
           </a:p>
         </p:txBody>
       </p:sp>
+      <p:sp>
+        <p:nvSpPr>
+          <p:cNvPr id="6" name="Título 1"/>
+          <p:cNvSpPr txBox="1">
+            <a:spLocks/>
+          </p:cNvSpPr>
+          <p:nvPr/>
+        </p:nvSpPr>
+        <p:spPr>
+          <a:xfrm>
+            <a:off x="0" y="823913"/>
+            <a:ext cx="12192000" cy="823914"/>
+          </a:xfrm>
+          <a:prstGeom prst="rect">
+            <a:avLst/>
+          </a:prstGeom>
+          <a:effectLst/>
+        </p:spPr>
+        <p:txBody>
+          <a:bodyPr vert="horz" lIns="91440" tIns="45720" rIns="91440" bIns="45720" rtlCol="0" anchor="ctr">
+            <a:normAutofit/>
+          </a:bodyPr>
+          <a:lstStyle>
+            <a:lvl1pPr algn="ctr" defTabSz="457200" rtl="0" eaLnBrk="1" latinLnBrk="0" hangingPunct="1">
+              <a:spcBef>
+                <a:spcPct val="0"/>
+              </a:spcBef>
+              <a:buNone/>
+              <a:defRPr sz="4000" kern="1200" cap="none">
+                <a:ln w="3175" cmpd="sng">
+                  <a:noFill/>
+                </a:ln>
+                <a:solidFill>
+                  <a:schemeClr val="tx1"/>
+                </a:solidFill>
+                <a:effectLst/>
+                <a:latin typeface="+mj-lt"/>
+                <a:ea typeface="+mj-ea"/>
+                <a:cs typeface="+mj-cs"/>
+              </a:defRPr>
+            </a:lvl1pPr>
+            <a:lvl2pPr eaLnBrk="1" hangingPunct="1">
+              <a:defRPr>
+                <a:solidFill>
+                  <a:schemeClr val="tx2"/>
+                </a:solidFill>
+              </a:defRPr>
+            </a:lvl2pPr>
+            <a:lvl3pPr eaLnBrk="1" hangingPunct="1">
+              <a:defRPr>
+                <a:solidFill>
+                  <a:schemeClr val="tx2"/>
+                </a:solidFill>
+              </a:defRPr>
+            </a:lvl3pPr>
+            <a:lvl4pPr eaLnBrk="1" hangingPunct="1">
+              <a:defRPr>
+                <a:solidFill>
+                  <a:schemeClr val="tx2"/>
+                </a:solidFill>
+              </a:defRPr>
+            </a:lvl4pPr>
+            <a:lvl5pPr eaLnBrk="1" hangingPunct="1">
+              <a:defRPr>
+                <a:solidFill>
+                  <a:schemeClr val="tx2"/>
+                </a:solidFill>
+              </a:defRPr>
+            </a:lvl5pPr>
+            <a:lvl6pPr eaLnBrk="1" hangingPunct="1">
+              <a:defRPr>
+                <a:solidFill>
+                  <a:schemeClr val="tx2"/>
+                </a:solidFill>
+              </a:defRPr>
+            </a:lvl6pPr>
+            <a:lvl7pPr eaLnBrk="1" hangingPunct="1">
+              <a:defRPr>
+                <a:solidFill>
+                  <a:schemeClr val="tx2"/>
+                </a:solidFill>
+              </a:defRPr>
+            </a:lvl7pPr>
+            <a:lvl8pPr eaLnBrk="1" hangingPunct="1">
+              <a:defRPr>
+                <a:solidFill>
+                  <a:schemeClr val="tx2"/>
+                </a:solidFill>
+              </a:defRPr>
+            </a:lvl8pPr>
+            <a:lvl9pPr eaLnBrk="1" hangingPunct="1">
+              <a:defRPr>
+                <a:solidFill>
+                  <a:schemeClr val="tx2"/>
+                </a:solidFill>
+              </a:defRPr>
+            </a:lvl9pPr>
+          </a:lstStyle>
+          <a:p>
+            <a:r>
+              <a:rPr lang="es-ES" sz="3600" dirty="0"/>
+              <a:t>Casos de Uso</a:t>
+            </a:r>
+          </a:p>
+        </p:txBody>
+      </p:sp>
+      <p:pic>
+        <p:nvPicPr>
+          <p:cNvPr id="4" name="Imagen 3"/>
+          <p:cNvPicPr>
+            <a:picLocks noChangeAspect="1"/>
+          </p:cNvPicPr>
+          <p:nvPr/>
+        </p:nvPicPr>
+        <p:blipFill>
+          <a:blip r:embed="rId3"/>
+          <a:stretch>
+            <a:fillRect/>
+          </a:stretch>
+        </p:blipFill>
+        <p:spPr>
+          <a:xfrm>
+            <a:off x="3511596" y="1823946"/>
+            <a:ext cx="5168808" cy="3629027"/>
+          </a:xfrm>
+          <a:prstGeom prst="rect">
+            <a:avLst/>
+          </a:prstGeom>
+        </p:spPr>
+      </p:pic>
     </p:spTree>
     <p:extLst>
       <p:ext uri="{BB962C8B-B14F-4D97-AF65-F5344CB8AC3E}">
-        <p14:creationId xmlns:p14="http://schemas.microsoft.com/office/powerpoint/2010/main" val="621600529"/>
+        <p14:creationId xmlns:p14="http://schemas.microsoft.com/office/powerpoint/2010/main" val="249498252"/>
       </p:ext>
     </p:extLst>
   </p:cSld>
@@ -8980,7 +11723,7 @@
                   <a:schemeClr val="bg1"/>
                 </a:solidFill>
               </a:rPr>
-              <a:t>Conclusiones</a:t>
+              <a:t>Gestión del proyecto</a:t>
             </a:r>
           </a:p>
         </p:txBody>
@@ -8997,48 +11740,24 @@
         </p:nvSpPr>
         <p:spPr>
           <a:xfrm>
-            <a:off x="1427160" y="1047751"/>
-            <a:ext cx="10455278" cy="4848225"/>
+            <a:off x="1427160" y="1797934"/>
+            <a:ext cx="10455278" cy="3653742"/>
           </a:xfrm>
         </p:spPr>
         <p:txBody>
           <a:bodyPr/>
           <a:lstStyle/>
           <a:p>
-            <a:endParaRPr lang="es-ES" dirty="0"/>
-          </a:p>
-          <a:p>
             <a:r>
               <a:rPr lang="es-ES" dirty="0"/>
-              <a:t>La sintaxis de Perl es inmensa</a:t>
+              <a:t>18 Requisitos Funcionales</a:t>
             </a:r>
           </a:p>
           <a:p>
             <a:r>
               <a:rPr lang="es-ES" dirty="0"/>
-              <a:t>Su ambigüedad dificulta una traducción</a:t>
-            </a:r>
-          </a:p>
-          <a:p>
-            <a:r>
-              <a:rPr lang="es-ES" dirty="0"/>
-              <a:t>El tiempo es un limitante muy importante</a:t>
-            </a:r>
-          </a:p>
-          <a:p>
-            <a:endParaRPr lang="es-ES" dirty="0"/>
-          </a:p>
-          <a:p>
-            <a:endParaRPr lang="es-ES" dirty="0"/>
-          </a:p>
-          <a:p>
-            <a:endParaRPr lang="es-ES" dirty="0"/>
-          </a:p>
-          <a:p>
-            <a:endParaRPr lang="es-ES" dirty="0"/>
-          </a:p>
-          <a:p>
-            <a:endParaRPr lang="es-ES" dirty="0"/>
+              <a:t>4 Requisitos no Funcionales</a:t>
+            </a:r>
           </a:p>
         </p:txBody>
       </p:sp>
@@ -9078,10 +11797,116 @@
           </a:p>
         </p:txBody>
       </p:sp>
+      <p:sp>
+        <p:nvSpPr>
+          <p:cNvPr id="6" name="Título 1"/>
+          <p:cNvSpPr txBox="1">
+            <a:spLocks/>
+          </p:cNvSpPr>
+          <p:nvPr/>
+        </p:nvSpPr>
+        <p:spPr>
+          <a:xfrm>
+            <a:off x="0" y="823913"/>
+            <a:ext cx="12192000" cy="823914"/>
+          </a:xfrm>
+          <a:prstGeom prst="rect">
+            <a:avLst/>
+          </a:prstGeom>
+          <a:effectLst/>
+        </p:spPr>
+        <p:txBody>
+          <a:bodyPr vert="horz" lIns="91440" tIns="45720" rIns="91440" bIns="45720" rtlCol="0" anchor="ctr">
+            <a:normAutofit/>
+          </a:bodyPr>
+          <a:lstStyle>
+            <a:lvl1pPr algn="ctr" defTabSz="457200" rtl="0" eaLnBrk="1" latinLnBrk="0" hangingPunct="1">
+              <a:spcBef>
+                <a:spcPct val="0"/>
+              </a:spcBef>
+              <a:buNone/>
+              <a:defRPr sz="4000" kern="1200" cap="none">
+                <a:ln w="3175" cmpd="sng">
+                  <a:noFill/>
+                </a:ln>
+                <a:solidFill>
+                  <a:schemeClr val="tx1"/>
+                </a:solidFill>
+                <a:effectLst/>
+                <a:latin typeface="+mj-lt"/>
+                <a:ea typeface="+mj-ea"/>
+                <a:cs typeface="+mj-cs"/>
+              </a:defRPr>
+            </a:lvl1pPr>
+            <a:lvl2pPr eaLnBrk="1" hangingPunct="1">
+              <a:defRPr>
+                <a:solidFill>
+                  <a:schemeClr val="tx2"/>
+                </a:solidFill>
+              </a:defRPr>
+            </a:lvl2pPr>
+            <a:lvl3pPr eaLnBrk="1" hangingPunct="1">
+              <a:defRPr>
+                <a:solidFill>
+                  <a:schemeClr val="tx2"/>
+                </a:solidFill>
+              </a:defRPr>
+            </a:lvl3pPr>
+            <a:lvl4pPr eaLnBrk="1" hangingPunct="1">
+              <a:defRPr>
+                <a:solidFill>
+                  <a:schemeClr val="tx2"/>
+                </a:solidFill>
+              </a:defRPr>
+            </a:lvl4pPr>
+            <a:lvl5pPr eaLnBrk="1" hangingPunct="1">
+              <a:defRPr>
+                <a:solidFill>
+                  <a:schemeClr val="tx2"/>
+                </a:solidFill>
+              </a:defRPr>
+            </a:lvl5pPr>
+            <a:lvl6pPr eaLnBrk="1" hangingPunct="1">
+              <a:defRPr>
+                <a:solidFill>
+                  <a:schemeClr val="tx2"/>
+                </a:solidFill>
+              </a:defRPr>
+            </a:lvl6pPr>
+            <a:lvl7pPr eaLnBrk="1" hangingPunct="1">
+              <a:defRPr>
+                <a:solidFill>
+                  <a:schemeClr val="tx2"/>
+                </a:solidFill>
+              </a:defRPr>
+            </a:lvl7pPr>
+            <a:lvl8pPr eaLnBrk="1" hangingPunct="1">
+              <a:defRPr>
+                <a:solidFill>
+                  <a:schemeClr val="tx2"/>
+                </a:solidFill>
+              </a:defRPr>
+            </a:lvl8pPr>
+            <a:lvl9pPr eaLnBrk="1" hangingPunct="1">
+              <a:defRPr>
+                <a:solidFill>
+                  <a:schemeClr val="tx2"/>
+                </a:solidFill>
+              </a:defRPr>
+            </a:lvl9pPr>
+          </a:lstStyle>
+          <a:p>
+            <a:r>
+              <a:rPr lang="es-ES" sz="3600" dirty="0"/>
+              <a:t>Análisis de Requisitos</a:t>
+            </a:r>
+          </a:p>
+        </p:txBody>
+      </p:sp>
     </p:spTree>
     <p:extLst>
       <p:ext uri="{BB962C8B-B14F-4D97-AF65-F5344CB8AC3E}">
-        <p14:creationId xmlns:p14="http://schemas.microsoft.com/office/powerpoint/2010/main" val="1552365097"/>
+        <p14:creationId xmlns:p14="http://schemas.microsoft.com/office/powerpoint/2010/main" val="979298410"/>
       </p:ext>
     </p:extLst>
   </p:cSld>

</xml_diff>

<commit_message>
Presentación Definitiva en dos formatos.
</commit_message>
<xml_diff>
--- a/doc/Presentacion.pptx
+++ b/doc/Presentacion.pptx
@@ -5,38 +5,39 @@
     <p:sldMasterId id="2147483648" r:id="rId1"/>
   </p:sldMasterIdLst>
   <p:notesMasterIdLst>
-    <p:notesMasterId r:id="rId31"/>
+    <p:notesMasterId r:id="rId32"/>
   </p:notesMasterIdLst>
   <p:sldIdLst>
     <p:sldId id="256" r:id="rId2"/>
-    <p:sldId id="259" r:id="rId3"/>
-    <p:sldId id="258" r:id="rId4"/>
-    <p:sldId id="260" r:id="rId5"/>
-    <p:sldId id="268" r:id="rId6"/>
-    <p:sldId id="269" r:id="rId7"/>
-    <p:sldId id="270" r:id="rId8"/>
-    <p:sldId id="271" r:id="rId9"/>
-    <p:sldId id="261" r:id="rId10"/>
-    <p:sldId id="272" r:id="rId11"/>
-    <p:sldId id="286" r:id="rId12"/>
-    <p:sldId id="273" r:id="rId13"/>
-    <p:sldId id="274" r:id="rId14"/>
-    <p:sldId id="275" r:id="rId15"/>
-    <p:sldId id="287" r:id="rId16"/>
-    <p:sldId id="288" r:id="rId17"/>
-    <p:sldId id="276" r:id="rId18"/>
-    <p:sldId id="266" r:id="rId19"/>
-    <p:sldId id="277" r:id="rId20"/>
-    <p:sldId id="281" r:id="rId21"/>
-    <p:sldId id="278" r:id="rId22"/>
-    <p:sldId id="279" r:id="rId23"/>
-    <p:sldId id="280" r:id="rId24"/>
-    <p:sldId id="283" r:id="rId25"/>
-    <p:sldId id="284" r:id="rId26"/>
-    <p:sldId id="282" r:id="rId27"/>
-    <p:sldId id="285" r:id="rId28"/>
-    <p:sldId id="264" r:id="rId29"/>
-    <p:sldId id="265" r:id="rId30"/>
+    <p:sldId id="289" r:id="rId3"/>
+    <p:sldId id="259" r:id="rId4"/>
+    <p:sldId id="258" r:id="rId5"/>
+    <p:sldId id="260" r:id="rId6"/>
+    <p:sldId id="268" r:id="rId7"/>
+    <p:sldId id="269" r:id="rId8"/>
+    <p:sldId id="270" r:id="rId9"/>
+    <p:sldId id="271" r:id="rId10"/>
+    <p:sldId id="261" r:id="rId11"/>
+    <p:sldId id="272" r:id="rId12"/>
+    <p:sldId id="286" r:id="rId13"/>
+    <p:sldId id="273" r:id="rId14"/>
+    <p:sldId id="274" r:id="rId15"/>
+    <p:sldId id="275" r:id="rId16"/>
+    <p:sldId id="287" r:id="rId17"/>
+    <p:sldId id="288" r:id="rId18"/>
+    <p:sldId id="276" r:id="rId19"/>
+    <p:sldId id="266" r:id="rId20"/>
+    <p:sldId id="277" r:id="rId21"/>
+    <p:sldId id="281" r:id="rId22"/>
+    <p:sldId id="278" r:id="rId23"/>
+    <p:sldId id="279" r:id="rId24"/>
+    <p:sldId id="280" r:id="rId25"/>
+    <p:sldId id="283" r:id="rId26"/>
+    <p:sldId id="284" r:id="rId27"/>
+    <p:sldId id="282" r:id="rId28"/>
+    <p:sldId id="285" r:id="rId29"/>
+    <p:sldId id="264" r:id="rId30"/>
+    <p:sldId id="265" r:id="rId31"/>
   </p:sldIdLst>
   <p:sldSz cx="12192000" cy="6858000"/>
   <p:notesSz cx="6858000" cy="9144000"/>
@@ -225,7 +226,7 @@
           <a:p>
             <a:fld id="{C050F663-5086-4E39-9826-D7C6E1DB3D57}" type="datetimeFigureOut">
               <a:rPr lang="es-ES" smtClean="0"/>
-              <a:t>19/07/2016</a:t>
+              <a:t>20/07/2016</a:t>
             </a:fld>
             <a:endParaRPr lang="es-ES"/>
           </a:p>
@@ -994,7 +995,7 @@
           <a:p>
             <a:fld id="{7C41326C-D4E0-4FF2-BE25-FFB86F82BB4F}" type="datetime1">
               <a:rPr lang="en-US" smtClean="0"/>
-              <a:t>7/19/2016</a:t>
+              <a:t>7/20/2016</a:t>
             </a:fld>
             <a:endParaRPr lang="en-US" dirty="0"/>
           </a:p>
@@ -1290,7 +1291,7 @@
           <a:p>
             <a:fld id="{8C412564-EA2E-419F-9751-2C16FE949658}" type="datetime1">
               <a:rPr lang="en-US" smtClean="0"/>
-              <a:t>7/19/2016</a:t>
+              <a:t>7/20/2016</a:t>
             </a:fld>
             <a:endParaRPr lang="en-US" dirty="0"/>
           </a:p>
@@ -1538,7 +1539,7 @@
           <a:p>
             <a:fld id="{4814D2AE-2120-4254-AA55-F1866FEA8026}" type="datetime1">
               <a:rPr lang="en-US" smtClean="0"/>
-              <a:t>7/19/2016</a:t>
+              <a:t>7/20/2016</a:t>
             </a:fld>
             <a:endParaRPr lang="en-US" dirty="0"/>
           </a:p>
@@ -2078,7 +2079,7 @@
           <a:p>
             <a:fld id="{27DE6ADE-A95F-470A-AAEF-2C0EF39C5D65}" type="datetime1">
               <a:rPr lang="en-US" smtClean="0"/>
-              <a:t>7/19/2016</a:t>
+              <a:t>7/20/2016</a:t>
             </a:fld>
             <a:endParaRPr lang="en-US" dirty="0"/>
           </a:p>
@@ -2326,7 +2327,7 @@
           <a:p>
             <a:fld id="{BE025187-CA2F-4F61-A1FB-A6E21DE97F4F}" type="datetime1">
               <a:rPr lang="en-US" smtClean="0"/>
-              <a:t>7/19/2016</a:t>
+              <a:t>7/20/2016</a:t>
             </a:fld>
             <a:endParaRPr lang="en-US" dirty="0"/>
           </a:p>
@@ -2858,7 +2859,7 @@
           <a:p>
             <a:fld id="{061914C6-7DD0-4C0B-AFD1-155929352D7E}" type="datetime1">
               <a:rPr lang="en-US" smtClean="0"/>
-              <a:t>7/19/2016</a:t>
+              <a:t>7/20/2016</a:t>
             </a:fld>
             <a:endParaRPr lang="en-US" dirty="0"/>
           </a:p>
@@ -3155,7 +3156,7 @@
           <a:p>
             <a:fld id="{F603C00C-2D03-4EF5-83ED-91FF8AA0099B}" type="datetime1">
               <a:rPr lang="en-US" smtClean="0"/>
-              <a:t>7/19/2016</a:t>
+              <a:t>7/20/2016</a:t>
             </a:fld>
             <a:endParaRPr lang="en-US" dirty="0"/>
           </a:p>
@@ -3329,7 +3330,7 @@
           <a:p>
             <a:fld id="{26C6CC50-35E5-4485-9E9D-1106FC53FB32}" type="datetime1">
               <a:rPr lang="en-US" smtClean="0"/>
-              <a:t>7/19/2016</a:t>
+              <a:t>7/20/2016</a:t>
             </a:fld>
             <a:endParaRPr lang="en-US" dirty="0"/>
           </a:p>
@@ -3509,7 +3510,7 @@
           <a:p>
             <a:fld id="{219A9AD5-7E51-4F4D-A7E8-AA5D85EBB50A}" type="datetime1">
               <a:rPr lang="en-US" smtClean="0"/>
-              <a:t>7/19/2016</a:t>
+              <a:t>7/20/2016</a:t>
             </a:fld>
             <a:endParaRPr lang="en-US" dirty="0"/>
           </a:p>
@@ -3679,7 +3680,7 @@
           <a:p>
             <a:fld id="{2F7827E7-A69F-49F2-A59A-A9543F42666B}" type="datetime1">
               <a:rPr lang="en-US" smtClean="0"/>
-              <a:t>7/19/2016</a:t>
+              <a:t>7/20/2016</a:t>
             </a:fld>
             <a:endParaRPr lang="en-US" dirty="0"/>
           </a:p>
@@ -3930,7 +3931,7 @@
           <a:p>
             <a:fld id="{AFC5F1FF-6ABF-4078-96D0-3A27E09551EA}" type="datetime1">
               <a:rPr lang="en-US" smtClean="0"/>
-              <a:t>7/19/2016</a:t>
+              <a:t>7/20/2016</a:t>
             </a:fld>
             <a:endParaRPr lang="en-US" dirty="0"/>
           </a:p>
@@ -4227,7 +4228,7 @@
           <a:p>
             <a:fld id="{8CEA4913-3991-4E1E-B015-839F7FBDA270}" type="datetime1">
               <a:rPr lang="en-US" smtClean="0"/>
-              <a:t>7/19/2016</a:t>
+              <a:t>7/20/2016</a:t>
             </a:fld>
             <a:endParaRPr lang="en-US" dirty="0"/>
           </a:p>
@@ -4669,7 +4670,7 @@
           <a:p>
             <a:fld id="{E02DC85B-7D16-4A29-A657-FEA73E695E07}" type="datetime1">
               <a:rPr lang="en-US" smtClean="0"/>
-              <a:t>7/19/2016</a:t>
+              <a:t>7/20/2016</a:t>
             </a:fld>
             <a:endParaRPr lang="en-US" dirty="0"/>
           </a:p>
@@ -4787,7 +4788,7 @@
           <a:p>
             <a:fld id="{9C02F5C0-313B-4EA8-AD51-9C65343ED5AC}" type="datetime1">
               <a:rPr lang="en-US" smtClean="0"/>
-              <a:t>7/19/2016</a:t>
+              <a:t>7/20/2016</a:t>
             </a:fld>
             <a:endParaRPr lang="en-US" dirty="0"/>
           </a:p>
@@ -4882,7 +4883,7 @@
           <a:p>
             <a:fld id="{0743B5D3-B772-4F21-871D-4E8B1C62B640}" type="datetime1">
               <a:rPr lang="en-US" smtClean="0"/>
-              <a:t>7/19/2016</a:t>
+              <a:t>7/20/2016</a:t>
             </a:fld>
             <a:endParaRPr lang="en-US" dirty="0"/>
           </a:p>
@@ -5165,7 +5166,7 @@
           <a:p>
             <a:fld id="{84113CC3-71B9-4CFE-B9F1-EBA936A22224}" type="datetime1">
               <a:rPr lang="en-US" smtClean="0"/>
-              <a:t>7/19/2016</a:t>
+              <a:t>7/20/2016</a:t>
             </a:fld>
             <a:endParaRPr lang="en-US" dirty="0"/>
           </a:p>
@@ -5456,7 +5457,7 @@
           <a:p>
             <a:fld id="{2D76E9C1-D474-4CF4-B9A9-8B1C85643E85}" type="datetime1">
               <a:rPr lang="en-US" smtClean="0"/>
-              <a:t>7/19/2016</a:t>
+              <a:t>7/20/2016</a:t>
             </a:fld>
             <a:endParaRPr lang="en-US" dirty="0"/>
           </a:p>
@@ -5986,7 +5987,7 @@
           <a:p>
             <a:fld id="{F9A37B9F-C454-4B10-97BB-D02914E79D82}" type="datetime1">
               <a:rPr lang="en-US" smtClean="0"/>
-              <a:t>7/19/2016</a:t>
+              <a:t>7/20/2016</a:t>
             </a:fld>
             <a:endParaRPr lang="en-US" dirty="0"/>
           </a:p>
@@ -6530,18 +6531,28 @@
         </p:nvSpPr>
         <p:spPr>
           <a:xfrm>
-            <a:off x="5020782" y="252360"/>
-            <a:ext cx="4552461" cy="1146480"/>
-          </a:xfrm>
-        </p:spPr>
-        <p:txBody>
-          <a:bodyPr/>
+            <a:off x="0" y="252360"/>
+            <a:ext cx="12192000" cy="1146480"/>
+          </a:xfrm>
+        </p:spPr>
+        <p:txBody>
+          <a:bodyPr>
+            <a:normAutofit fontScale="90000"/>
+          </a:bodyPr>
           <a:lstStyle/>
           <a:p>
-            <a:r>
-              <a:rPr lang="es-ES" dirty="0"/>
+            <a:pPr algn="ctr"/>
+            <a:r>
+              <a:rPr lang="es-ES" sz="5400" dirty="0"/>
               <a:t>Perldoop 2.0</a:t>
             </a:r>
+            <a:br>
+              <a:rPr lang="es-ES" sz="5400" dirty="0"/>
+            </a:br>
+            <a:r>
+              <a:rPr lang="es-ES" sz="3600" dirty="0"/>
+              <a:t>Un compilador fuente-a-fuente Perl-Java</a:t>
+            </a:r>
           </a:p>
         </p:txBody>
       </p:sp>
@@ -6557,7 +6568,7 @@
         </p:nvSpPr>
         <p:spPr>
           <a:xfrm>
-            <a:off x="3881822" y="1396031"/>
+            <a:off x="3850446" y="2068384"/>
             <a:ext cx="6987645" cy="1097446"/>
           </a:xfrm>
         </p:spPr>
@@ -6576,7 +6587,7 @@
               </a:spcAft>
             </a:pPr>
             <a:r>
-              <a:rPr lang="es-ES" sz="3200" dirty="0"/>
+              <a:rPr lang="es-ES" sz="2800" dirty="0"/>
               <a:t>Grado en Ingeniería Informática</a:t>
             </a:r>
           </a:p>
@@ -6590,7 +6601,7 @@
               </a:spcAft>
             </a:pPr>
             <a:r>
-              <a:rPr lang="es-ES" sz="3200" dirty="0"/>
+              <a:rPr lang="es-ES" sz="2800" dirty="0"/>
               <a:t>Universidad de Santiago de Compostela</a:t>
             </a:r>
           </a:p>
@@ -6864,7 +6875,7 @@
             <a:pPr algn="l"/>
             <a:r>
               <a:rPr lang="es-ES" dirty="0"/>
-              <a:t>Directores:</a:t>
+              <a:t>Tutores:</a:t>
             </a:r>
           </a:p>
           <a:p>
@@ -7526,8 +7537,8 @@
         </p:nvSpPr>
         <p:spPr>
           <a:xfrm>
-            <a:off x="1427160" y="1489276"/>
-            <a:ext cx="10455278" cy="4811210"/>
+            <a:off x="1427160" y="1797934"/>
+            <a:ext cx="10455278" cy="4347596"/>
           </a:xfrm>
         </p:spPr>
         <p:txBody>
@@ -7538,69 +7549,67 @@
           <a:p>
             <a:r>
               <a:rPr lang="es-ES" dirty="0"/>
-              <a:t>Estructura descomposición de tareas (EDT)</a:t>
+              <a:t>Características del proyecto</a:t>
             </a:r>
           </a:p>
           <a:p>
             <a:pPr lvl="1"/>
             <a:r>
               <a:rPr lang="es-ES" dirty="0"/>
-              <a:t>Planificación y alcance</a:t>
+              <a:t>Proyecto individual</a:t>
             </a:r>
           </a:p>
           <a:p>
             <a:pPr lvl="1"/>
             <a:r>
               <a:rPr lang="es-ES" dirty="0"/>
-              <a:t>Formación</a:t>
+              <a:t>Componente de investigación</a:t>
             </a:r>
           </a:p>
           <a:p>
             <a:pPr lvl="1"/>
             <a:r>
               <a:rPr lang="es-ES" dirty="0"/>
-              <a:t>Análisis</a:t>
+              <a:t>Requisitos Fijos</a:t>
             </a:r>
           </a:p>
           <a:p>
             <a:pPr lvl="1"/>
             <a:r>
               <a:rPr lang="es-ES" dirty="0"/>
-              <a:t>Diseño</a:t>
+              <a:t>Fecha de entrega inamovible</a:t>
+            </a:r>
+          </a:p>
+          <a:p>
+            <a:r>
+              <a:rPr lang="es-ES" dirty="0"/>
+              <a:t>Programación Extrema</a:t>
             </a:r>
           </a:p>
           <a:p>
             <a:pPr lvl="1"/>
             <a:r>
               <a:rPr lang="es-ES" dirty="0"/>
-              <a:t>Implementación</a:t>
+              <a:t>Metodología Ágil</a:t>
             </a:r>
           </a:p>
           <a:p>
             <a:pPr lvl="1"/>
             <a:r>
               <a:rPr lang="es-ES" dirty="0"/>
-              <a:t>Pruebas</a:t>
+              <a:t>Ciclo de desarrollo continuo</a:t>
             </a:r>
           </a:p>
           <a:p>
             <a:pPr lvl="1"/>
             <a:r>
               <a:rPr lang="es-ES" dirty="0"/>
-              <a:t>Documentación</a:t>
-            </a:r>
-          </a:p>
-          <a:p>
-            <a:r>
-              <a:rPr lang="es-ES" dirty="0"/>
-              <a:t>Cronograma</a:t>
-            </a:r>
-          </a:p>
-          <a:p>
-            <a:r>
-              <a:rPr lang="es-ES" dirty="0"/>
-              <a:t>Diagrama Gantt</a:t>
-            </a:r>
+              <a:t>Código fuente como documentación</a:t>
+            </a:r>
+          </a:p>
+          <a:p>
+            <a:pPr lvl="1"/>
+            <a:endParaRPr lang="es-ES" dirty="0"/>
           </a:p>
         </p:txBody>
       </p:sp>
@@ -7741,7 +7750,7 @@
           <a:p>
             <a:r>
               <a:rPr lang="es-ES" sz="3600" dirty="0"/>
-              <a:t>Planificación temporal</a:t>
+              <a:t>Metodología</a:t>
             </a:r>
           </a:p>
         </p:txBody>
@@ -7749,7 +7758,7 @@
     </p:spTree>
     <p:extLst>
       <p:ext uri="{BB962C8B-B14F-4D97-AF65-F5344CB8AC3E}">
-        <p14:creationId xmlns:p14="http://schemas.microsoft.com/office/powerpoint/2010/main" val="4048517418"/>
+        <p14:creationId xmlns:p14="http://schemas.microsoft.com/office/powerpoint/2010/main" val="3571979615"/>
       </p:ext>
     </p:extLst>
   </p:cSld>
@@ -7847,75 +7856,69 @@
           <a:p>
             <a:r>
               <a:rPr lang="es-ES" dirty="0"/>
-              <a:t>Estimación</a:t>
+              <a:t>Estructura descomposición de tareas (EDT)</a:t>
             </a:r>
           </a:p>
           <a:p>
             <a:pPr lvl="1"/>
             <a:r>
               <a:rPr lang="es-ES" dirty="0"/>
-              <a:t>Estación de trabajo</a:t>
-            </a:r>
-          </a:p>
-          <a:p>
-            <a:pPr lvl="2"/>
-            <a:r>
-              <a:rPr lang="es-ES"/>
-              <a:t>Ordenador Portátil</a:t>
-            </a:r>
-            <a:endParaRPr lang="es-ES" dirty="0"/>
+              <a:t>Planificación y alcance: 1 semana</a:t>
+            </a:r>
           </a:p>
           <a:p>
             <a:pPr lvl="1"/>
             <a:r>
               <a:rPr lang="es-ES" dirty="0"/>
-              <a:t>Software utilizado</a:t>
-            </a:r>
-          </a:p>
-          <a:p>
-            <a:pPr lvl="2"/>
-            <a:r>
-              <a:rPr lang="es-ES" dirty="0"/>
-              <a:t>Software libre</a:t>
+              <a:t>Formación: 1 semana</a:t>
             </a:r>
           </a:p>
           <a:p>
             <a:pPr lvl="1"/>
             <a:r>
               <a:rPr lang="es-ES" dirty="0"/>
-              <a:t>Repositorio Web</a:t>
-            </a:r>
-          </a:p>
-          <a:p>
-            <a:pPr lvl="2"/>
-            <a:r>
-              <a:rPr lang="es-ES" dirty="0" err="1"/>
-              <a:t>Bitbucket</a:t>
-            </a:r>
-            <a:endParaRPr lang="es-ES" dirty="0"/>
+              <a:t>Análisis: 1 semana</a:t>
+            </a:r>
           </a:p>
           <a:p>
             <a:pPr lvl="1"/>
             <a:r>
               <a:rPr lang="es-ES" dirty="0"/>
-              <a:t>Mano de Obra</a:t>
-            </a:r>
-          </a:p>
-          <a:p>
-            <a:pPr lvl="2"/>
-            <a:r>
-              <a:rPr lang="es-ES" dirty="0"/>
-              <a:t>17,2 €/h sueldo medio ingeniero informático</a:t>
-            </a:r>
-          </a:p>
-          <a:p>
-            <a:r>
-              <a:rPr lang="es-ES" dirty="0"/>
-              <a:t>Total: 8.701,5€</a:t>
-            </a:r>
-          </a:p>
-          <a:p>
-            <a:endParaRPr lang="es-ES" dirty="0"/>
+              <a:t>Diseño: 1 semana y media</a:t>
+            </a:r>
+          </a:p>
+          <a:p>
+            <a:pPr lvl="1"/>
+            <a:r>
+              <a:rPr lang="es-ES" dirty="0"/>
+              <a:t>Implementación: 7 semanas</a:t>
+            </a:r>
+          </a:p>
+          <a:p>
+            <a:pPr lvl="1"/>
+            <a:r>
+              <a:rPr lang="es-ES" dirty="0"/>
+              <a:t>Pruebas: 1 semana y media</a:t>
+            </a:r>
+          </a:p>
+          <a:p>
+            <a:pPr lvl="1"/>
+            <a:r>
+              <a:rPr lang="es-ES" dirty="0"/>
+              <a:t>Documentación: 1 semana y media</a:t>
+            </a:r>
+          </a:p>
+          <a:p>
+            <a:r>
+              <a:rPr lang="es-ES" dirty="0"/>
+              <a:t>Cronograma</a:t>
+            </a:r>
+          </a:p>
+          <a:p>
+            <a:r>
+              <a:rPr lang="es-ES" dirty="0"/>
+              <a:t>Diagrama Gantt</a:t>
+            </a:r>
           </a:p>
         </p:txBody>
       </p:sp>
@@ -8056,7 +8059,7 @@
           <a:p>
             <a:r>
               <a:rPr lang="es-ES" sz="3600" dirty="0"/>
-              <a:t>Análisis de coste</a:t>
+              <a:t>Planificación temporal</a:t>
             </a:r>
           </a:p>
         </p:txBody>
@@ -8064,7 +8067,7 @@
     </p:spTree>
     <p:extLst>
       <p:ext uri="{BB962C8B-B14F-4D97-AF65-F5344CB8AC3E}">
-        <p14:creationId xmlns:p14="http://schemas.microsoft.com/office/powerpoint/2010/main" val="2078832322"/>
+        <p14:creationId xmlns:p14="http://schemas.microsoft.com/office/powerpoint/2010/main" val="4048517418"/>
       </p:ext>
     </p:extLst>
   </p:cSld>
@@ -8133,7 +8136,7 @@
                   <a:schemeClr val="bg1"/>
                 </a:solidFill>
               </a:rPr>
-              <a:t>Diseño</a:t>
+              <a:t>Gestión del proyecto</a:t>
             </a:r>
           </a:p>
         </p:txBody>
@@ -8150,102 +8153,85 @@
         </p:nvSpPr>
         <p:spPr>
           <a:xfrm>
-            <a:off x="1427160" y="1797934"/>
-            <a:ext cx="10455278" cy="4416176"/>
+            <a:off x="1427160" y="1489276"/>
+            <a:ext cx="10455278" cy="4811210"/>
           </a:xfrm>
         </p:spPr>
         <p:txBody>
           <a:bodyPr>
-            <a:normAutofit fontScale="85000" lnSpcReduction="20000"/>
+            <a:normAutofit/>
           </a:bodyPr>
           <a:lstStyle/>
           <a:p>
             <a:r>
               <a:rPr lang="es-ES" dirty="0"/>
-              <a:t>Importancia</a:t>
+              <a:t>Estimación</a:t>
             </a:r>
           </a:p>
           <a:p>
             <a:pPr lvl="1"/>
             <a:r>
               <a:rPr lang="es-ES" dirty="0"/>
-              <a:t>Eliminar barreras entre Perl y Java</a:t>
+              <a:t>Estación de trabajo</a:t>
+            </a:r>
+          </a:p>
+          <a:p>
+            <a:pPr lvl="2"/>
+            <a:r>
+              <a:rPr lang="es-ES" dirty="0"/>
+              <a:t>Ordenador Portátil: 1.800€</a:t>
             </a:r>
           </a:p>
           <a:p>
             <a:pPr lvl="1"/>
             <a:r>
               <a:rPr lang="es-ES" dirty="0"/>
-              <a:t>Evitar acciones por defecto</a:t>
+              <a:t>Software utilizado</a:t>
+            </a:r>
+          </a:p>
+          <a:p>
+            <a:pPr lvl="2"/>
+            <a:r>
+              <a:rPr lang="es-ES" dirty="0"/>
+              <a:t>Software libre: 0€</a:t>
             </a:r>
           </a:p>
           <a:p>
             <a:pPr lvl="1"/>
             <a:r>
               <a:rPr lang="es-ES" dirty="0"/>
-              <a:t>Aplicar transformaciones</a:t>
-            </a:r>
-          </a:p>
-          <a:p>
-            <a:r>
-              <a:rPr lang="es-ES" dirty="0"/>
-              <a:t>Definición</a:t>
+              <a:t>Repositorio Web</a:t>
+            </a:r>
+          </a:p>
+          <a:p>
+            <a:pPr lvl="2"/>
+            <a:r>
+              <a:rPr lang="es-ES" dirty="0" err="1"/>
+              <a:t>Bitbucket</a:t>
+            </a:r>
+            <a:r>
+              <a:rPr lang="es-ES" dirty="0"/>
+              <a:t>: 0€</a:t>
             </a:r>
           </a:p>
           <a:p>
             <a:pPr lvl="1"/>
             <a:r>
               <a:rPr lang="es-ES" dirty="0"/>
-              <a:t>Dentro de comentarios</a:t>
-            </a:r>
-          </a:p>
-          <a:p>
-            <a:pPr lvl="1"/>
-            <a:r>
-              <a:rPr lang="es-ES" dirty="0"/>
-              <a:t>Encerrados entre &lt; y &gt;, ejemplo: &lt;</a:t>
-            </a:r>
-            <a:r>
-              <a:rPr lang="es-ES" dirty="0" err="1"/>
-              <a:t>string</a:t>
-            </a:r>
-            <a:r>
-              <a:rPr lang="es-ES" dirty="0"/>
-              <a:t>&gt; </a:t>
-            </a:r>
-          </a:p>
-          <a:p>
-            <a:r>
-              <a:rPr lang="es-ES" dirty="0"/>
-              <a:t>Usos</a:t>
-            </a:r>
-          </a:p>
-          <a:p>
-            <a:pPr lvl="1"/>
-            <a:r>
-              <a:rPr lang="es-ES" dirty="0"/>
-              <a:t>Añadir tipo a variables y funciones</a:t>
-            </a:r>
-          </a:p>
-          <a:p>
-            <a:pPr lvl="1"/>
-            <a:r>
-              <a:rPr lang="es-ES" dirty="0"/>
-              <a:t>Definir tamaño en las colecciones</a:t>
-            </a:r>
-          </a:p>
-          <a:p>
-            <a:pPr lvl="1"/>
-            <a:r>
-              <a:rPr lang="es-ES" dirty="0"/>
-              <a:t>Acotar código para ser paralelizado</a:t>
-            </a:r>
-          </a:p>
-          <a:p>
-            <a:pPr lvl="1"/>
-            <a:r>
-              <a:rPr lang="es-ES" dirty="0"/>
-              <a:t>Comportamiento léxicos</a:t>
+              <a:t>Mano de Obra</a:t>
+            </a:r>
+          </a:p>
+          <a:p>
+            <a:pPr lvl="2"/>
+            <a:r>
+              <a:rPr lang="es-ES" dirty="0"/>
+              <a:t>17,2 €/h sueldo medio ingeniero informático: 6.901,50€</a:t>
+            </a:r>
+          </a:p>
+          <a:p>
+            <a:r>
+              <a:rPr lang="es-ES" dirty="0"/>
+              <a:t>Total: 8.701,5€</a:t>
             </a:r>
           </a:p>
           <a:p>
@@ -8390,7 +8376,7 @@
           <a:p>
             <a:r>
               <a:rPr lang="es-ES" sz="3600" dirty="0"/>
-              <a:t>Etiquetas</a:t>
+              <a:t>Análisis de coste</a:t>
             </a:r>
           </a:p>
         </p:txBody>
@@ -8398,7 +8384,7 @@
     </p:spTree>
     <p:extLst>
       <p:ext uri="{BB962C8B-B14F-4D97-AF65-F5344CB8AC3E}">
-        <p14:creationId xmlns:p14="http://schemas.microsoft.com/office/powerpoint/2010/main" val="3919469227"/>
+        <p14:creationId xmlns:p14="http://schemas.microsoft.com/office/powerpoint/2010/main" val="2078832322"/>
       </p:ext>
     </p:extLst>
   </p:cSld>
@@ -8485,60 +8471,102 @@
         <p:spPr>
           <a:xfrm>
             <a:off x="1427160" y="1797934"/>
-            <a:ext cx="10455278" cy="4621916"/>
-          </a:xfrm>
-        </p:spPr>
-        <p:txBody>
-          <a:bodyPr/>
+            <a:ext cx="10455278" cy="4416176"/>
+          </a:xfrm>
+        </p:spPr>
+        <p:txBody>
+          <a:bodyPr>
+            <a:normAutofit fontScale="85000" lnSpcReduction="20000"/>
+          </a:bodyPr>
           <a:lstStyle/>
           <a:p>
             <a:r>
               <a:rPr lang="es-ES" dirty="0"/>
-              <a:t>Léxico</a:t>
+              <a:t>Importancia</a:t>
             </a:r>
           </a:p>
           <a:p>
             <a:pPr lvl="1"/>
             <a:r>
               <a:rPr lang="es-ES" dirty="0"/>
-              <a:t>Definición de </a:t>
+              <a:t>Eliminar barreras entre Perl y Java</a:t>
+            </a:r>
+          </a:p>
+          <a:p>
+            <a:pPr lvl="1"/>
+            <a:r>
+              <a:rPr lang="es-ES" dirty="0"/>
+              <a:t>Evitar acciones por defecto</a:t>
+            </a:r>
+          </a:p>
+          <a:p>
+            <a:pPr lvl="1"/>
+            <a:r>
+              <a:rPr lang="es-ES" dirty="0"/>
+              <a:t>Aplicar transformaciones</a:t>
+            </a:r>
+          </a:p>
+          <a:p>
+            <a:r>
+              <a:rPr lang="es-ES" dirty="0"/>
+              <a:t>Definición</a:t>
+            </a:r>
+          </a:p>
+          <a:p>
+            <a:pPr lvl="1"/>
+            <a:r>
+              <a:rPr lang="es-ES" dirty="0"/>
+              <a:t>Dentro de comentarios</a:t>
+            </a:r>
+          </a:p>
+          <a:p>
+            <a:pPr lvl="1"/>
+            <a:r>
+              <a:rPr lang="es-ES" dirty="0"/>
+              <a:t>Encerrados entre &lt; y &gt;, ejemplo: &lt;</a:t>
             </a:r>
             <a:r>
               <a:rPr lang="es-ES" dirty="0" err="1"/>
-              <a:t>tokens</a:t>
-            </a:r>
-            <a:endParaRPr lang="es-ES" dirty="0"/>
+              <a:t>string</a:t>
+            </a:r>
+            <a:r>
+              <a:rPr lang="es-ES" dirty="0"/>
+              <a:t>&gt; </a:t>
+            </a:r>
+          </a:p>
+          <a:p>
+            <a:r>
+              <a:rPr lang="es-ES" dirty="0"/>
+              <a:t>Usos</a:t>
+            </a:r>
           </a:p>
           <a:p>
             <a:pPr lvl="1"/>
             <a:r>
               <a:rPr lang="es-ES" dirty="0"/>
-              <a:t>Validar y ordenar de etiquetas</a:t>
-            </a:r>
-          </a:p>
-          <a:p>
-            <a:r>
-              <a:rPr lang="es-ES" dirty="0"/>
-              <a:t>Sintáctico</a:t>
+              <a:t>Añadir tipo a variables y funciones</a:t>
             </a:r>
           </a:p>
           <a:p>
             <a:pPr lvl="1"/>
             <a:r>
               <a:rPr lang="es-ES" dirty="0"/>
-              <a:t>Ascendente</a:t>
+              <a:t>Definir tamaño en las colecciones</a:t>
             </a:r>
           </a:p>
           <a:p>
             <a:pPr lvl="1"/>
             <a:r>
               <a:rPr lang="es-ES" dirty="0"/>
-              <a:t>Gramática LALR(1)</a:t>
+              <a:t>Acotar código para ser paralelizado</a:t>
             </a:r>
           </a:p>
           <a:p>
             <a:pPr lvl="1"/>
-            <a:endParaRPr lang="es-ES" dirty="0"/>
+            <a:r>
+              <a:rPr lang="es-ES" dirty="0"/>
+              <a:t>Comportamiento léxicos</a:t>
+            </a:r>
           </a:p>
           <a:p>
             <a:endParaRPr lang="es-ES" dirty="0"/>
@@ -8682,7 +8710,7 @@
           <a:p>
             <a:r>
               <a:rPr lang="es-ES" sz="3600" dirty="0"/>
-              <a:t>Analizador Léxico y Sintáctico</a:t>
+              <a:t>Etiquetas</a:t>
             </a:r>
           </a:p>
         </p:txBody>
@@ -8690,7 +8718,7 @@
     </p:spTree>
     <p:extLst>
       <p:ext uri="{BB962C8B-B14F-4D97-AF65-F5344CB8AC3E}">
-        <p14:creationId xmlns:p14="http://schemas.microsoft.com/office/powerpoint/2010/main" val="1743927632"/>
+        <p14:creationId xmlns:p14="http://schemas.microsoft.com/office/powerpoint/2010/main" val="3919469227"/>
       </p:ext>
     </p:extLst>
   </p:cSld>
@@ -8777,87 +8805,60 @@
         <p:spPr>
           <a:xfrm>
             <a:off x="1427160" y="1797934"/>
-            <a:ext cx="10455278" cy="4507616"/>
-          </a:xfrm>
-        </p:spPr>
-        <p:txBody>
-          <a:bodyPr>
-            <a:normAutofit fontScale="92500" lnSpcReduction="20000"/>
-          </a:bodyPr>
+            <a:ext cx="10455278" cy="4621916"/>
+          </a:xfrm>
+        </p:spPr>
+        <p:txBody>
+          <a:bodyPr/>
           <a:lstStyle/>
           <a:p>
             <a:r>
               <a:rPr lang="es-ES" dirty="0"/>
-              <a:t>Comprobación y generación de código</a:t>
+              <a:t>Léxico</a:t>
             </a:r>
           </a:p>
           <a:p>
             <a:pPr lvl="1"/>
             <a:r>
               <a:rPr lang="es-ES" dirty="0"/>
-              <a:t>Una función por reducción sintáctica</a:t>
-            </a:r>
+              <a:t>Definición de </a:t>
+            </a:r>
+            <a:r>
+              <a:rPr lang="es-ES" dirty="0" err="1"/>
+              <a:t>tokens</a:t>
+            </a:r>
+            <a:endParaRPr lang="es-ES" dirty="0"/>
           </a:p>
           <a:p>
             <a:pPr lvl="1"/>
             <a:r>
               <a:rPr lang="es-ES" dirty="0"/>
-              <a:t>Lanzan los errores</a:t>
-            </a:r>
-          </a:p>
-          <a:p>
-            <a:r>
-              <a:rPr lang="es-ES" dirty="0"/>
-              <a:t>Utilidades</a:t>
+              <a:t>Validar y ordenar de etiquetas</a:t>
+            </a:r>
+          </a:p>
+          <a:p>
+            <a:r>
+              <a:rPr lang="es-ES" dirty="0"/>
+              <a:t>Sintáctico</a:t>
             </a:r>
           </a:p>
           <a:p>
             <a:pPr lvl="1"/>
             <a:r>
               <a:rPr lang="es-ES" dirty="0"/>
-              <a:t>Tipos de dato</a:t>
+              <a:t>Ascendente</a:t>
             </a:r>
           </a:p>
           <a:p>
             <a:pPr lvl="1"/>
             <a:r>
               <a:rPr lang="es-ES" dirty="0"/>
-              <a:t>Funciones de casting</a:t>
+              <a:t>Gramática LALR(1)</a:t>
             </a:r>
           </a:p>
           <a:p>
             <a:pPr lvl="1"/>
-            <a:r>
-              <a:rPr lang="es-ES" dirty="0"/>
-              <a:t>Clases de almacenamiento</a:t>
-            </a:r>
-          </a:p>
-          <a:p>
-            <a:pPr lvl="1"/>
-            <a:r>
-              <a:rPr lang="es-ES" dirty="0"/>
-              <a:t>Funciones auxiliares</a:t>
-            </a:r>
-          </a:p>
-          <a:p>
-            <a:r>
-              <a:rPr lang="es-ES" dirty="0"/>
-              <a:t>Sistema de gestión de errores</a:t>
-            </a:r>
-          </a:p>
-          <a:p>
-            <a:pPr lvl="1"/>
-            <a:r>
-              <a:rPr lang="es-ES" dirty="0"/>
-              <a:t>Almacena los mensajes de error</a:t>
-            </a:r>
-          </a:p>
-          <a:p>
-            <a:pPr lvl="1"/>
-            <a:r>
-              <a:rPr lang="es-ES" dirty="0"/>
-              <a:t>Imprime el error por pantalla</a:t>
-            </a:r>
+            <a:endParaRPr lang="es-ES" dirty="0"/>
           </a:p>
           <a:p>
             <a:endParaRPr lang="es-ES" dirty="0"/>
@@ -9001,7 +9002,7 @@
           <a:p>
             <a:r>
               <a:rPr lang="es-ES" sz="3600" dirty="0"/>
-              <a:t>Módulos</a:t>
+              <a:t>Analizador Léxico y Sintáctico</a:t>
             </a:r>
           </a:p>
         </p:txBody>
@@ -9009,7 +9010,7 @@
     </p:spTree>
     <p:extLst>
       <p:ext uri="{BB962C8B-B14F-4D97-AF65-F5344CB8AC3E}">
-        <p14:creationId xmlns:p14="http://schemas.microsoft.com/office/powerpoint/2010/main" val="515090135"/>
+        <p14:creationId xmlns:p14="http://schemas.microsoft.com/office/powerpoint/2010/main" val="1743927632"/>
       </p:ext>
     </p:extLst>
   </p:cSld>
@@ -9085,6 +9086,106 @@
       </p:sp>
       <p:sp>
         <p:nvSpPr>
+          <p:cNvPr id="3" name="Marcador de contenido 2"/>
+          <p:cNvSpPr>
+            <a:spLocks noGrp="1"/>
+          </p:cNvSpPr>
+          <p:nvPr>
+            <p:ph idx="1"/>
+          </p:nvPr>
+        </p:nvSpPr>
+        <p:spPr>
+          <a:xfrm>
+            <a:off x="1427160" y="1797934"/>
+            <a:ext cx="10455278" cy="4507616"/>
+          </a:xfrm>
+        </p:spPr>
+        <p:txBody>
+          <a:bodyPr>
+            <a:normAutofit fontScale="92500" lnSpcReduction="20000"/>
+          </a:bodyPr>
+          <a:lstStyle/>
+          <a:p>
+            <a:r>
+              <a:rPr lang="es-ES" dirty="0"/>
+              <a:t>Comprobación y generación de código</a:t>
+            </a:r>
+          </a:p>
+          <a:p>
+            <a:pPr lvl="1"/>
+            <a:r>
+              <a:rPr lang="es-ES" dirty="0"/>
+              <a:t>Una función por reducción sintáctica</a:t>
+            </a:r>
+          </a:p>
+          <a:p>
+            <a:pPr lvl="1"/>
+            <a:r>
+              <a:rPr lang="es-ES" dirty="0"/>
+              <a:t>Lanzan los errores</a:t>
+            </a:r>
+          </a:p>
+          <a:p>
+            <a:r>
+              <a:rPr lang="es-ES" dirty="0"/>
+              <a:t>Utilidades</a:t>
+            </a:r>
+          </a:p>
+          <a:p>
+            <a:pPr lvl="1"/>
+            <a:r>
+              <a:rPr lang="es-ES" dirty="0"/>
+              <a:t>Tipos de dato</a:t>
+            </a:r>
+          </a:p>
+          <a:p>
+            <a:pPr lvl="1"/>
+            <a:r>
+              <a:rPr lang="es-ES" dirty="0"/>
+              <a:t>Funciones de casting</a:t>
+            </a:r>
+          </a:p>
+          <a:p>
+            <a:pPr lvl="1"/>
+            <a:r>
+              <a:rPr lang="es-ES" dirty="0"/>
+              <a:t>Clases de almacenamiento</a:t>
+            </a:r>
+          </a:p>
+          <a:p>
+            <a:pPr lvl="1"/>
+            <a:r>
+              <a:rPr lang="es-ES" dirty="0"/>
+              <a:t>Funciones auxiliares</a:t>
+            </a:r>
+          </a:p>
+          <a:p>
+            <a:r>
+              <a:rPr lang="es-ES" dirty="0"/>
+              <a:t>Sistema de gestión de errores</a:t>
+            </a:r>
+          </a:p>
+          <a:p>
+            <a:pPr lvl="1"/>
+            <a:r>
+              <a:rPr lang="es-ES" dirty="0"/>
+              <a:t>Almacena los mensajes de error</a:t>
+            </a:r>
+          </a:p>
+          <a:p>
+            <a:pPr lvl="1"/>
+            <a:r>
+              <a:rPr lang="es-ES" dirty="0"/>
+              <a:t>Imprime el error por pantalla</a:t>
+            </a:r>
+          </a:p>
+          <a:p>
+            <a:endParaRPr lang="es-ES" dirty="0"/>
+          </a:p>
+        </p:txBody>
+      </p:sp>
+      <p:sp>
+        <p:nvSpPr>
           <p:cNvPr id="5" name="Marcador de pie de página 4"/>
           <p:cNvSpPr>
             <a:spLocks noGrp="1"/>
@@ -9220,39 +9321,15 @@
           <a:p>
             <a:r>
               <a:rPr lang="es-ES" sz="3600" dirty="0"/>
-              <a:t>Diagrama de clases</a:t>
-            </a:r>
-          </a:p>
-        </p:txBody>
-      </p:sp>
-      <p:pic>
-        <p:nvPicPr>
-          <p:cNvPr id="7" name="Imagen 6"/>
-          <p:cNvPicPr>
-            <a:picLocks noChangeAspect="1"/>
-          </p:cNvPicPr>
-          <p:nvPr/>
-        </p:nvPicPr>
-        <p:blipFill>
-          <a:blip r:embed="rId3"/>
-          <a:stretch>
-            <a:fillRect/>
-          </a:stretch>
-        </p:blipFill>
-        <p:spPr>
-          <a:xfrm>
-            <a:off x="3263545" y="1717274"/>
-            <a:ext cx="5664909" cy="4600573"/>
-          </a:xfrm>
-          <a:prstGeom prst="rect">
-            <a:avLst/>
-          </a:prstGeom>
-        </p:spPr>
-      </p:pic>
+              <a:t>Módulos</a:t>
+            </a:r>
+          </a:p>
+        </p:txBody>
+      </p:sp>
     </p:spTree>
     <p:extLst>
       <p:ext uri="{BB962C8B-B14F-4D97-AF65-F5344CB8AC3E}">
-        <p14:creationId xmlns:p14="http://schemas.microsoft.com/office/powerpoint/2010/main" val="957187658"/>
+        <p14:creationId xmlns:p14="http://schemas.microsoft.com/office/powerpoint/2010/main" val="515090135"/>
       </p:ext>
     </p:extLst>
   </p:cSld>
@@ -9373,7 +9450,7 @@
         <p:spPr>
           <a:xfrm>
             <a:off x="0" y="823913"/>
-            <a:ext cx="12192000" cy="669607"/>
+            <a:ext cx="12192000" cy="823914"/>
           </a:xfrm>
           <a:prstGeom prst="rect">
             <a:avLst/>
@@ -9463,14 +9540,14 @@
           <a:p>
             <a:r>
               <a:rPr lang="es-ES" sz="3600" dirty="0"/>
-              <a:t>Iteración durante un error</a:t>
+              <a:t>Diagrama de clases</a:t>
             </a:r>
           </a:p>
         </p:txBody>
       </p:sp>
       <p:pic>
         <p:nvPicPr>
-          <p:cNvPr id="4" name="Imagen 3"/>
+          <p:cNvPr id="7" name="Imagen 6"/>
           <p:cNvPicPr>
             <a:picLocks noChangeAspect="1"/>
           </p:cNvPicPr>
@@ -9484,8 +9561,8 @@
         </p:blipFill>
         <p:spPr>
           <a:xfrm>
-            <a:off x="2008290" y="1493520"/>
-            <a:ext cx="8175420" cy="4638673"/>
+            <a:off x="3263545" y="1717274"/>
+            <a:ext cx="5664909" cy="4600573"/>
           </a:xfrm>
           <a:prstGeom prst="rect">
             <a:avLst/>
@@ -9495,7 +9572,7 @@
     </p:spTree>
     <p:extLst>
       <p:ext uri="{BB962C8B-B14F-4D97-AF65-F5344CB8AC3E}">
-        <p14:creationId xmlns:p14="http://schemas.microsoft.com/office/powerpoint/2010/main" val="802936"/>
+        <p14:creationId xmlns:p14="http://schemas.microsoft.com/office/powerpoint/2010/main" val="957187658"/>
       </p:ext>
     </p:extLst>
   </p:cSld>
@@ -9571,56 +9648,6 @@
       </p:sp>
       <p:sp>
         <p:nvSpPr>
-          <p:cNvPr id="3" name="Marcador de contenido 2"/>
-          <p:cNvSpPr>
-            <a:spLocks noGrp="1"/>
-          </p:cNvSpPr>
-          <p:nvPr>
-            <p:ph idx="1"/>
-          </p:nvPr>
-        </p:nvSpPr>
-        <p:spPr>
-          <a:xfrm>
-            <a:off x="1427160" y="1797934"/>
-            <a:ext cx="10455278" cy="4294256"/>
-          </a:xfrm>
-        </p:spPr>
-        <p:txBody>
-          <a:bodyPr>
-            <a:normAutofit/>
-          </a:bodyPr>
-          <a:lstStyle/>
-          <a:p>
-            <a:r>
-              <a:rPr lang="es-ES" dirty="0"/>
-              <a:t>Nivel de abstracción</a:t>
-            </a:r>
-          </a:p>
-          <a:p>
-            <a:r>
-              <a:rPr lang="es-ES" dirty="0"/>
-              <a:t>Simplificar traducción</a:t>
-            </a:r>
-          </a:p>
-          <a:p>
-            <a:r>
-              <a:rPr lang="es-ES" dirty="0"/>
-              <a:t>Tareas en tiempo de ejecución</a:t>
-            </a:r>
-          </a:p>
-          <a:p>
-            <a:r>
-              <a:rPr lang="es-ES" dirty="0"/>
-              <a:t>Funciones nativas</a:t>
-            </a:r>
-          </a:p>
-          <a:p>
-            <a:endParaRPr lang="es-ES" dirty="0"/>
-          </a:p>
-        </p:txBody>
-      </p:sp>
-      <p:sp>
-        <p:nvSpPr>
           <p:cNvPr id="5" name="Marcador de pie de página 4"/>
           <p:cNvSpPr>
             <a:spLocks noGrp="1"/>
@@ -9666,7 +9693,7 @@
         <p:spPr>
           <a:xfrm>
             <a:off x="0" y="823913"/>
-            <a:ext cx="12192000" cy="823914"/>
+            <a:ext cx="12192000" cy="669607"/>
           </a:xfrm>
           <a:prstGeom prst="rect">
             <a:avLst/>
@@ -9756,15 +9783,39 @@
           <a:p>
             <a:r>
               <a:rPr lang="es-ES" sz="3600" dirty="0"/>
-              <a:t>Librería java</a:t>
-            </a:r>
-          </a:p>
-        </p:txBody>
-      </p:sp>
+              <a:t>Iteración durante un error</a:t>
+            </a:r>
+          </a:p>
+        </p:txBody>
+      </p:sp>
+      <p:pic>
+        <p:nvPicPr>
+          <p:cNvPr id="4" name="Imagen 3"/>
+          <p:cNvPicPr>
+            <a:picLocks noChangeAspect="1"/>
+          </p:cNvPicPr>
+          <p:nvPr/>
+        </p:nvPicPr>
+        <p:blipFill>
+          <a:blip r:embed="rId3"/>
+          <a:stretch>
+            <a:fillRect/>
+          </a:stretch>
+        </p:blipFill>
+        <p:spPr>
+          <a:xfrm>
+            <a:off x="2008290" y="1493520"/>
+            <a:ext cx="8175420" cy="4638673"/>
+          </a:xfrm>
+          <a:prstGeom prst="rect">
+            <a:avLst/>
+          </a:prstGeom>
+        </p:spPr>
+      </p:pic>
     </p:spTree>
     <p:extLst>
       <p:ext uri="{BB962C8B-B14F-4D97-AF65-F5344CB8AC3E}">
-        <p14:creationId xmlns:p14="http://schemas.microsoft.com/office/powerpoint/2010/main" val="1193518467"/>
+        <p14:creationId xmlns:p14="http://schemas.microsoft.com/office/powerpoint/2010/main" val="802936"/>
       </p:ext>
     </p:extLst>
   </p:cSld>
@@ -9833,7 +9884,7 @@
                   <a:schemeClr val="bg1"/>
                 </a:solidFill>
               </a:rPr>
-              <a:t>Demostración</a:t>
+              <a:t>Diseño</a:t>
             </a:r>
           </a:p>
         </p:txBody>
@@ -9850,8 +9901,8 @@
         </p:nvSpPr>
         <p:spPr>
           <a:xfrm>
-            <a:off x="1427160" y="1047751"/>
-            <a:ext cx="10277160" cy="4937759"/>
+            <a:off x="1427160" y="1797934"/>
+            <a:ext cx="10455278" cy="4294256"/>
           </a:xfrm>
         </p:spPr>
         <p:txBody>
@@ -9862,20 +9913,29 @@
           <a:p>
             <a:r>
               <a:rPr lang="es-ES" dirty="0"/>
-              <a:t>Interfaz consola</a:t>
-            </a:r>
-          </a:p>
-          <a:p>
-            <a:r>
-              <a:rPr lang="es-ES" dirty="0"/>
-              <a:t>Código Sumatorio</a:t>
-            </a:r>
-          </a:p>
-          <a:p>
-            <a:r>
-              <a:rPr lang="es-ES" dirty="0"/>
-              <a:t>Salida de error</a:t>
-            </a:r>
+              <a:t>Nivel de abstracción</a:t>
+            </a:r>
+          </a:p>
+          <a:p>
+            <a:r>
+              <a:rPr lang="es-ES" dirty="0"/>
+              <a:t>Simplificar traducción</a:t>
+            </a:r>
+          </a:p>
+          <a:p>
+            <a:r>
+              <a:rPr lang="es-ES" dirty="0"/>
+              <a:t>Tareas en tiempo de ejecución</a:t>
+            </a:r>
+          </a:p>
+          <a:p>
+            <a:r>
+              <a:rPr lang="es-ES" dirty="0"/>
+              <a:t>Funciones nativas</a:t>
+            </a:r>
+          </a:p>
+          <a:p>
+            <a:endParaRPr lang="es-ES" dirty="0"/>
           </a:p>
         </p:txBody>
       </p:sp>
@@ -9915,10 +9975,116 @@
           </a:p>
         </p:txBody>
       </p:sp>
+      <p:sp>
+        <p:nvSpPr>
+          <p:cNvPr id="6" name="Título 1"/>
+          <p:cNvSpPr txBox="1">
+            <a:spLocks/>
+          </p:cNvSpPr>
+          <p:nvPr/>
+        </p:nvSpPr>
+        <p:spPr>
+          <a:xfrm>
+            <a:off x="0" y="823913"/>
+            <a:ext cx="12192000" cy="823914"/>
+          </a:xfrm>
+          <a:prstGeom prst="rect">
+            <a:avLst/>
+          </a:prstGeom>
+          <a:effectLst/>
+        </p:spPr>
+        <p:txBody>
+          <a:bodyPr vert="horz" lIns="91440" tIns="45720" rIns="91440" bIns="45720" rtlCol="0" anchor="ctr">
+            <a:normAutofit/>
+          </a:bodyPr>
+          <a:lstStyle>
+            <a:lvl1pPr algn="ctr" defTabSz="457200" rtl="0" eaLnBrk="1" latinLnBrk="0" hangingPunct="1">
+              <a:spcBef>
+                <a:spcPct val="0"/>
+              </a:spcBef>
+              <a:buNone/>
+              <a:defRPr sz="4000" kern="1200" cap="none">
+                <a:ln w="3175" cmpd="sng">
+                  <a:noFill/>
+                </a:ln>
+                <a:solidFill>
+                  <a:schemeClr val="tx1"/>
+                </a:solidFill>
+                <a:effectLst/>
+                <a:latin typeface="+mj-lt"/>
+                <a:ea typeface="+mj-ea"/>
+                <a:cs typeface="+mj-cs"/>
+              </a:defRPr>
+            </a:lvl1pPr>
+            <a:lvl2pPr eaLnBrk="1" hangingPunct="1">
+              <a:defRPr>
+                <a:solidFill>
+                  <a:schemeClr val="tx2"/>
+                </a:solidFill>
+              </a:defRPr>
+            </a:lvl2pPr>
+            <a:lvl3pPr eaLnBrk="1" hangingPunct="1">
+              <a:defRPr>
+                <a:solidFill>
+                  <a:schemeClr val="tx2"/>
+                </a:solidFill>
+              </a:defRPr>
+            </a:lvl3pPr>
+            <a:lvl4pPr eaLnBrk="1" hangingPunct="1">
+              <a:defRPr>
+                <a:solidFill>
+                  <a:schemeClr val="tx2"/>
+                </a:solidFill>
+              </a:defRPr>
+            </a:lvl4pPr>
+            <a:lvl5pPr eaLnBrk="1" hangingPunct="1">
+              <a:defRPr>
+                <a:solidFill>
+                  <a:schemeClr val="tx2"/>
+                </a:solidFill>
+              </a:defRPr>
+            </a:lvl5pPr>
+            <a:lvl6pPr eaLnBrk="1" hangingPunct="1">
+              <a:defRPr>
+                <a:solidFill>
+                  <a:schemeClr val="tx2"/>
+                </a:solidFill>
+              </a:defRPr>
+            </a:lvl6pPr>
+            <a:lvl7pPr eaLnBrk="1" hangingPunct="1">
+              <a:defRPr>
+                <a:solidFill>
+                  <a:schemeClr val="tx2"/>
+                </a:solidFill>
+              </a:defRPr>
+            </a:lvl7pPr>
+            <a:lvl8pPr eaLnBrk="1" hangingPunct="1">
+              <a:defRPr>
+                <a:solidFill>
+                  <a:schemeClr val="tx2"/>
+                </a:solidFill>
+              </a:defRPr>
+            </a:lvl8pPr>
+            <a:lvl9pPr eaLnBrk="1" hangingPunct="1">
+              <a:defRPr>
+                <a:solidFill>
+                  <a:schemeClr val="tx2"/>
+                </a:solidFill>
+              </a:defRPr>
+            </a:lvl9pPr>
+          </a:lstStyle>
+          <a:p>
+            <a:r>
+              <a:rPr lang="es-ES" sz="3600" dirty="0"/>
+              <a:t>Librería java</a:t>
+            </a:r>
+          </a:p>
+        </p:txBody>
+      </p:sp>
     </p:spTree>
     <p:extLst>
       <p:ext uri="{BB962C8B-B14F-4D97-AF65-F5344CB8AC3E}">
-        <p14:creationId xmlns:p14="http://schemas.microsoft.com/office/powerpoint/2010/main" val="2865075747"/>
+        <p14:creationId xmlns:p14="http://schemas.microsoft.com/office/powerpoint/2010/main" val="1193518467"/>
       </p:ext>
     </p:extLst>
   </p:cSld>
@@ -9929,8 +10095,22 @@
 </file>
 
 <file path=ppt/slides/slide19.xml><?xml version="1.0" encoding="utf-8"?>
-<p:sld xmlns:a="http://schemas.openxmlformats.org/drawingml/2006/main" xmlns:r="http://schemas.openxmlformats.org/officeDocument/2006/relationships" xmlns:p="http://schemas.openxmlformats.org/presentationml/2006/main">
+<p:sld xmlns:a="http://schemas.openxmlformats.org/drawingml/2006/main" xmlns:r="http://schemas.openxmlformats.org/officeDocument/2006/relationships" xmlns:p="http://schemas.openxmlformats.org/presentationml/2006/main" showMasterSp="0">
   <p:cSld>
+    <p:bg>
+      <p:bgPr>
+        <a:blipFill dpi="0" rotWithShape="1">
+          <a:blip r:embed="rId2">
+            <a:lum/>
+          </a:blip>
+          <a:srcRect/>
+          <a:stretch>
+            <a:fillRect/>
+          </a:stretch>
+        </a:blipFill>
+        <a:effectLst/>
+      </p:bgPr>
+    </p:bg>
     <p:spTree>
       <p:nvGrpSpPr>
         <p:cNvPr id="1" name=""/>
@@ -9945,34 +10125,120 @@
           <a:chExt cx="0" cy="0"/>
         </a:xfrm>
       </p:grpSpPr>
-      <p:pic>
-        <p:nvPicPr>
-          <p:cNvPr id="2" name="Imagen 1"/>
-          <p:cNvPicPr>
-            <a:picLocks noChangeAspect="1"/>
-          </p:cNvPicPr>
-          <p:nvPr/>
-        </p:nvPicPr>
-        <p:blipFill>
-          <a:blip r:embed="rId2"/>
-          <a:stretch>
-            <a:fillRect/>
-          </a:stretch>
-        </p:blipFill>
-        <p:spPr>
-          <a:xfrm>
-            <a:off x="0" y="0"/>
-            <a:ext cx="12192000" cy="6858000"/>
-          </a:xfrm>
-          <a:prstGeom prst="rect">
-            <a:avLst/>
-          </a:prstGeom>
-        </p:spPr>
-      </p:pic>
+      <p:sp>
+        <p:nvSpPr>
+          <p:cNvPr id="2" name="Título 1"/>
+          <p:cNvSpPr>
+            <a:spLocks noGrp="1"/>
+          </p:cNvSpPr>
+          <p:nvPr>
+            <p:ph type="title"/>
+          </p:nvPr>
+        </p:nvSpPr>
+        <p:spPr>
+          <a:xfrm>
+            <a:off x="0" y="-1"/>
+            <a:ext cx="12192000" cy="823914"/>
+          </a:xfrm>
+        </p:spPr>
+        <p:txBody>
+          <a:bodyPr>
+            <a:normAutofit/>
+          </a:bodyPr>
+          <a:lstStyle/>
+          <a:p>
+            <a:r>
+              <a:rPr lang="es-ES" dirty="0">
+                <a:solidFill>
+                  <a:schemeClr val="bg1"/>
+                </a:solidFill>
+              </a:rPr>
+              <a:t>Demostración</a:t>
+            </a:r>
+          </a:p>
+        </p:txBody>
+      </p:sp>
+      <p:sp>
+        <p:nvSpPr>
+          <p:cNvPr id="3" name="Marcador de contenido 2"/>
+          <p:cNvSpPr>
+            <a:spLocks noGrp="1"/>
+          </p:cNvSpPr>
+          <p:nvPr>
+            <p:ph idx="1"/>
+          </p:nvPr>
+        </p:nvSpPr>
+        <p:spPr>
+          <a:xfrm>
+            <a:off x="1427160" y="1047751"/>
+            <a:ext cx="10277160" cy="4937759"/>
+          </a:xfrm>
+        </p:spPr>
+        <p:txBody>
+          <a:bodyPr>
+            <a:normAutofit/>
+          </a:bodyPr>
+          <a:lstStyle/>
+          <a:p>
+            <a:r>
+              <a:rPr lang="es-ES" dirty="0"/>
+              <a:t>Interfaz consola</a:t>
+            </a:r>
+          </a:p>
+          <a:p>
+            <a:r>
+              <a:rPr lang="es-ES" dirty="0"/>
+              <a:t>Código Sumatorio</a:t>
+            </a:r>
+          </a:p>
+          <a:p>
+            <a:r>
+              <a:rPr lang="es-ES" dirty="0"/>
+              <a:t>Salida de error</a:t>
+            </a:r>
+          </a:p>
+        </p:txBody>
+      </p:sp>
+      <p:sp>
+        <p:nvSpPr>
+          <p:cNvPr id="5" name="Marcador de pie de página 4"/>
+          <p:cNvSpPr>
+            <a:spLocks noGrp="1"/>
+          </p:cNvSpPr>
+          <p:nvPr>
+            <p:ph type="ftr" sz="quarter" idx="11"/>
+          </p:nvPr>
+        </p:nvSpPr>
+        <p:spPr>
+          <a:xfrm>
+            <a:off x="2079585" y="6605588"/>
+            <a:ext cx="10112415" cy="252412"/>
+          </a:xfrm>
+        </p:spPr>
+        <p:txBody>
+          <a:bodyPr/>
+          <a:lstStyle/>
+          <a:p>
+            <a:r>
+              <a:rPr lang="es-ES" dirty="0">
+                <a:solidFill>
+                  <a:schemeClr val="bg1"/>
+                </a:solidFill>
+              </a:rPr>
+              <a:t>Autor: César Piñeiro Pomar                                                                                                                                                                                  Perldoop 2.0: Un compilador fuente-a-fuente</a:t>
+            </a:r>
+            <a:endParaRPr lang="en-US" dirty="0">
+              <a:solidFill>
+                <a:schemeClr val="bg1"/>
+              </a:solidFill>
+            </a:endParaRPr>
+          </a:p>
+        </p:txBody>
+      </p:sp>
     </p:spTree>
     <p:extLst>
       <p:ext uri="{BB962C8B-B14F-4D97-AF65-F5344CB8AC3E}">
-        <p14:creationId xmlns:p14="http://schemas.microsoft.com/office/powerpoint/2010/main" val="3079231749"/>
+        <p14:creationId xmlns:p14="http://schemas.microsoft.com/office/powerpoint/2010/main" val="2865075747"/>
       </p:ext>
     </p:extLst>
   </p:cSld>
@@ -10041,7 +10307,7 @@
                   <a:schemeClr val="bg1"/>
                 </a:solidFill>
               </a:rPr>
-              <a:t>Motivación</a:t>
+              <a:t>Índice</a:t>
             </a:r>
           </a:p>
         </p:txBody>
@@ -10058,8 +10324,8 @@
         </p:nvSpPr>
         <p:spPr>
           <a:xfrm>
-            <a:off x="1427160" y="1047751"/>
-            <a:ext cx="10455278" cy="4848225"/>
+            <a:off x="1427160" y="899161"/>
+            <a:ext cx="10455278" cy="5435600"/>
           </a:xfrm>
         </p:spPr>
         <p:txBody>
@@ -10068,25 +10334,49 @@
           <a:p>
             <a:r>
               <a:rPr lang="es-ES" dirty="0"/>
-              <a:t>Desarrollar un proyecto con una alta complejidad</a:t>
-            </a:r>
-          </a:p>
-          <a:p>
-            <a:r>
-              <a:rPr lang="es-ES" dirty="0"/>
-              <a:t>Complementar los conocimiento adquiridos en la asignatura de compiladores</a:t>
-            </a:r>
-          </a:p>
-          <a:p>
-            <a:r>
-              <a:rPr lang="es-ES" dirty="0"/>
-              <a:t>Traducir scripts Perl a Java de forma directa</a:t>
-            </a:r>
-          </a:p>
-          <a:p>
-            <a:r>
-              <a:rPr lang="es-ES" dirty="0"/>
-              <a:t>Mejorar la experiencia de usuario</a:t>
+              <a:t>Motivación</a:t>
+            </a:r>
+          </a:p>
+          <a:p>
+            <a:r>
+              <a:rPr lang="es-ES" dirty="0"/>
+              <a:t>Introducción</a:t>
+            </a:r>
+          </a:p>
+          <a:p>
+            <a:r>
+              <a:rPr lang="es-ES" dirty="0"/>
+              <a:t>Objetivos</a:t>
+            </a:r>
+          </a:p>
+          <a:p>
+            <a:r>
+              <a:rPr lang="es-ES" dirty="0"/>
+              <a:t>Gestión del Proyecto</a:t>
+            </a:r>
+          </a:p>
+          <a:p>
+            <a:r>
+              <a:rPr lang="es-ES" dirty="0"/>
+              <a:t>Diseño</a:t>
+            </a:r>
+          </a:p>
+          <a:p>
+            <a:r>
+              <a:rPr lang="es-ES" dirty="0"/>
+              <a:t>Demostración</a:t>
+            </a:r>
+          </a:p>
+          <a:p>
+            <a:r>
+              <a:rPr lang="es-ES" dirty="0"/>
+              <a:t>Conclusiones</a:t>
+            </a:r>
+          </a:p>
+          <a:p>
+            <a:r>
+              <a:rPr lang="es-ES" dirty="0"/>
+              <a:t>Conocimiento Adquirido</a:t>
             </a:r>
           </a:p>
         </p:txBody>
@@ -10130,7 +10420,7 @@
     </p:spTree>
     <p:extLst>
       <p:ext uri="{BB962C8B-B14F-4D97-AF65-F5344CB8AC3E}">
-        <p14:creationId xmlns:p14="http://schemas.microsoft.com/office/powerpoint/2010/main" val="2103857669"/>
+        <p14:creationId xmlns:p14="http://schemas.microsoft.com/office/powerpoint/2010/main" val="3733323988"/>
       </p:ext>
     </p:extLst>
   </p:cSld>
@@ -10159,7 +10449,7 @@
       </p:grpSpPr>
       <p:pic>
         <p:nvPicPr>
-          <p:cNvPr id="3" name="Imagen 2"/>
+          <p:cNvPr id="2" name="Imagen 1"/>
           <p:cNvPicPr>
             <a:picLocks noChangeAspect="1"/>
           </p:cNvPicPr>
@@ -10184,7 +10474,7 @@
     </p:spTree>
     <p:extLst>
       <p:ext uri="{BB962C8B-B14F-4D97-AF65-F5344CB8AC3E}">
-        <p14:creationId xmlns:p14="http://schemas.microsoft.com/office/powerpoint/2010/main" val="1350742096"/>
+        <p14:creationId xmlns:p14="http://schemas.microsoft.com/office/powerpoint/2010/main" val="3079231749"/>
       </p:ext>
     </p:extLst>
   </p:cSld>
@@ -10238,6 +10528,60 @@
     </p:spTree>
     <p:extLst>
       <p:ext uri="{BB962C8B-B14F-4D97-AF65-F5344CB8AC3E}">
+        <p14:creationId xmlns:p14="http://schemas.microsoft.com/office/powerpoint/2010/main" val="1350742096"/>
+      </p:ext>
+    </p:extLst>
+  </p:cSld>
+  <p:clrMapOvr>
+    <a:masterClrMapping/>
+  </p:clrMapOvr>
+</p:sld>
+</file>
+
+<file path=ppt/slides/slide22.xml><?xml version="1.0" encoding="utf-8"?>
+<p:sld xmlns:a="http://schemas.openxmlformats.org/drawingml/2006/main" xmlns:r="http://schemas.openxmlformats.org/officeDocument/2006/relationships" xmlns:p="http://schemas.openxmlformats.org/presentationml/2006/main">
+  <p:cSld>
+    <p:spTree>
+      <p:nvGrpSpPr>
+        <p:cNvPr id="1" name=""/>
+        <p:cNvGrpSpPr/>
+        <p:nvPr/>
+      </p:nvGrpSpPr>
+      <p:grpSpPr>
+        <a:xfrm>
+          <a:off x="0" y="0"/>
+          <a:ext cx="0" cy="0"/>
+          <a:chOff x="0" y="0"/>
+          <a:chExt cx="0" cy="0"/>
+        </a:xfrm>
+      </p:grpSpPr>
+      <p:pic>
+        <p:nvPicPr>
+          <p:cNvPr id="3" name="Imagen 2"/>
+          <p:cNvPicPr>
+            <a:picLocks noChangeAspect="1"/>
+          </p:cNvPicPr>
+          <p:nvPr/>
+        </p:nvPicPr>
+        <p:blipFill>
+          <a:blip r:embed="rId2"/>
+          <a:stretch>
+            <a:fillRect/>
+          </a:stretch>
+        </p:blipFill>
+        <p:spPr>
+          <a:xfrm>
+            <a:off x="0" y="0"/>
+            <a:ext cx="12192000" cy="6858000"/>
+          </a:xfrm>
+          <a:prstGeom prst="rect">
+            <a:avLst/>
+          </a:prstGeom>
+        </p:spPr>
+      </p:pic>
+    </p:spTree>
+    <p:extLst>
+      <p:ext uri="{BB962C8B-B14F-4D97-AF65-F5344CB8AC3E}">
         <p14:creationId xmlns:p14="http://schemas.microsoft.com/office/powerpoint/2010/main" val="2395445603"/>
       </p:ext>
     </p:extLst>
@@ -10248,7 +10592,7 @@
 </p:sld>
 </file>
 
-<file path=ppt/slides/slide22.xml><?xml version="1.0" encoding="utf-8"?>
+<file path=ppt/slides/slide23.xml><?xml version="1.0" encoding="utf-8"?>
 <p:sld xmlns:a="http://schemas.openxmlformats.org/drawingml/2006/main" xmlns:r="http://schemas.openxmlformats.org/officeDocument/2006/relationships" xmlns:p="http://schemas.openxmlformats.org/presentationml/2006/main">
   <p:cSld>
     <p:spTree>
@@ -10293,60 +10637,6 @@
     <p:extLst>
       <p:ext uri="{BB962C8B-B14F-4D97-AF65-F5344CB8AC3E}">
         <p14:creationId xmlns:p14="http://schemas.microsoft.com/office/powerpoint/2010/main" val="996485059"/>
-      </p:ext>
-    </p:extLst>
-  </p:cSld>
-  <p:clrMapOvr>
-    <a:masterClrMapping/>
-  </p:clrMapOvr>
-</p:sld>
-</file>
-
-<file path=ppt/slides/slide23.xml><?xml version="1.0" encoding="utf-8"?>
-<p:sld xmlns:a="http://schemas.openxmlformats.org/drawingml/2006/main" xmlns:r="http://schemas.openxmlformats.org/officeDocument/2006/relationships" xmlns:p="http://schemas.openxmlformats.org/presentationml/2006/main">
-  <p:cSld>
-    <p:spTree>
-      <p:nvGrpSpPr>
-        <p:cNvPr id="1" name=""/>
-        <p:cNvGrpSpPr/>
-        <p:nvPr/>
-      </p:nvGrpSpPr>
-      <p:grpSpPr>
-        <a:xfrm>
-          <a:off x="0" y="0"/>
-          <a:ext cx="0" cy="0"/>
-          <a:chOff x="0" y="0"/>
-          <a:chExt cx="0" cy="0"/>
-        </a:xfrm>
-      </p:grpSpPr>
-      <p:pic>
-        <p:nvPicPr>
-          <p:cNvPr id="3" name="Imagen 2"/>
-          <p:cNvPicPr>
-            <a:picLocks noChangeAspect="1"/>
-          </p:cNvPicPr>
-          <p:nvPr/>
-        </p:nvPicPr>
-        <p:blipFill>
-          <a:blip r:embed="rId2"/>
-          <a:stretch>
-            <a:fillRect/>
-          </a:stretch>
-        </p:blipFill>
-        <p:spPr>
-          <a:xfrm>
-            <a:off x="0" y="0"/>
-            <a:ext cx="12192000" cy="6858000"/>
-          </a:xfrm>
-          <a:prstGeom prst="rect">
-            <a:avLst/>
-          </a:prstGeom>
-        </p:spPr>
-      </p:pic>
-    </p:spTree>
-    <p:extLst>
-      <p:ext uri="{BB962C8B-B14F-4D97-AF65-F5344CB8AC3E}">
-        <p14:creationId xmlns:p14="http://schemas.microsoft.com/office/powerpoint/2010/main" val="720213660"/>
       </p:ext>
     </p:extLst>
   </p:cSld>
@@ -10400,7 +10690,7 @@
     </p:spTree>
     <p:extLst>
       <p:ext uri="{BB962C8B-B14F-4D97-AF65-F5344CB8AC3E}">
-        <p14:creationId xmlns:p14="http://schemas.microsoft.com/office/powerpoint/2010/main" val="2798500312"/>
+        <p14:creationId xmlns:p14="http://schemas.microsoft.com/office/powerpoint/2010/main" val="720213660"/>
       </p:ext>
     </p:extLst>
   </p:cSld>
@@ -10454,7 +10744,7 @@
     </p:spTree>
     <p:extLst>
       <p:ext uri="{BB962C8B-B14F-4D97-AF65-F5344CB8AC3E}">
-        <p14:creationId xmlns:p14="http://schemas.microsoft.com/office/powerpoint/2010/main" val="2377187970"/>
+        <p14:creationId xmlns:p14="http://schemas.microsoft.com/office/powerpoint/2010/main" val="2798500312"/>
       </p:ext>
     </p:extLst>
   </p:cSld>
@@ -10498,7 +10788,7 @@
         <p:spPr>
           <a:xfrm>
             <a:off x="0" y="0"/>
-            <a:ext cx="12191999" cy="6858000"/>
+            <a:ext cx="12192000" cy="6858000"/>
           </a:xfrm>
           <a:prstGeom prst="rect">
             <a:avLst/>
@@ -10508,7 +10798,7 @@
     </p:spTree>
     <p:extLst>
       <p:ext uri="{BB962C8B-B14F-4D97-AF65-F5344CB8AC3E}">
-        <p14:creationId xmlns:p14="http://schemas.microsoft.com/office/powerpoint/2010/main" val="540884787"/>
+        <p14:creationId xmlns:p14="http://schemas.microsoft.com/office/powerpoint/2010/main" val="2377187970"/>
       </p:ext>
     </p:extLst>
   </p:cSld>
@@ -10552,7 +10842,7 @@
         <p:spPr>
           <a:xfrm>
             <a:off x="0" y="0"/>
-            <a:ext cx="12192001" cy="6858000"/>
+            <a:ext cx="12191999" cy="6858000"/>
           </a:xfrm>
           <a:prstGeom prst="rect">
             <a:avLst/>
@@ -10562,7 +10852,7 @@
     </p:spTree>
     <p:extLst>
       <p:ext uri="{BB962C8B-B14F-4D97-AF65-F5344CB8AC3E}">
-        <p14:creationId xmlns:p14="http://schemas.microsoft.com/office/powerpoint/2010/main" val="1681546175"/>
+        <p14:creationId xmlns:p14="http://schemas.microsoft.com/office/powerpoint/2010/main" val="540884787"/>
       </p:ext>
     </p:extLst>
   </p:cSld>
@@ -10573,22 +10863,8 @@
 </file>
 
 <file path=ppt/slides/slide28.xml><?xml version="1.0" encoding="utf-8"?>
-<p:sld xmlns:a="http://schemas.openxmlformats.org/drawingml/2006/main" xmlns:r="http://schemas.openxmlformats.org/officeDocument/2006/relationships" xmlns:p="http://schemas.openxmlformats.org/presentationml/2006/main" showMasterSp="0">
+<p:sld xmlns:a="http://schemas.openxmlformats.org/drawingml/2006/main" xmlns:r="http://schemas.openxmlformats.org/officeDocument/2006/relationships" xmlns:p="http://schemas.openxmlformats.org/presentationml/2006/main">
   <p:cSld>
-    <p:bg>
-      <p:bgPr>
-        <a:blipFill dpi="0" rotWithShape="1">
-          <a:blip r:embed="rId2">
-            <a:lum/>
-          </a:blip>
-          <a:srcRect/>
-          <a:stretch>
-            <a:fillRect/>
-          </a:stretch>
-        </a:blipFill>
-        <a:effectLst/>
-      </p:bgPr>
-    </p:bg>
     <p:spTree>
       <p:nvGrpSpPr>
         <p:cNvPr id="1" name=""/>
@@ -10603,165 +10879,34 @@
           <a:chExt cx="0" cy="0"/>
         </a:xfrm>
       </p:grpSpPr>
-      <p:sp>
-        <p:nvSpPr>
-          <p:cNvPr id="2" name="Título 1"/>
-          <p:cNvSpPr>
-            <a:spLocks noGrp="1"/>
-          </p:cNvSpPr>
-          <p:nvPr>
-            <p:ph type="title"/>
-          </p:nvPr>
-        </p:nvSpPr>
-        <p:spPr>
-          <a:xfrm>
-            <a:off x="0" y="-1"/>
-            <a:ext cx="12192000" cy="823914"/>
-          </a:xfrm>
-        </p:spPr>
-        <p:txBody>
-          <a:bodyPr>
-            <a:normAutofit/>
-          </a:bodyPr>
-          <a:lstStyle/>
-          <a:p>
-            <a:r>
-              <a:rPr lang="es-ES" dirty="0">
-                <a:solidFill>
-                  <a:schemeClr val="bg1"/>
-                </a:solidFill>
-              </a:rPr>
-              <a:t>Conclusiones</a:t>
-            </a:r>
-          </a:p>
-        </p:txBody>
-      </p:sp>
-      <p:sp>
-        <p:nvSpPr>
-          <p:cNvPr id="3" name="Marcador de contenido 2"/>
-          <p:cNvSpPr>
-            <a:spLocks noGrp="1"/>
-          </p:cNvSpPr>
-          <p:nvPr>
-            <p:ph idx="1"/>
-          </p:nvPr>
-        </p:nvSpPr>
-        <p:spPr>
-          <a:xfrm>
-            <a:off x="1427160" y="1512425"/>
-            <a:ext cx="10455278" cy="3600433"/>
-          </a:xfrm>
-        </p:spPr>
-        <p:txBody>
-          <a:bodyPr>
-            <a:normAutofit fontScale="92500" lnSpcReduction="10000"/>
-          </a:bodyPr>
-          <a:lstStyle/>
-          <a:p>
-            <a:r>
-              <a:rPr lang="es-ES" dirty="0"/>
-              <a:t>La sintaxis de Perl es inmensa</a:t>
-            </a:r>
-          </a:p>
-          <a:p>
-            <a:r>
-              <a:rPr lang="es-ES" dirty="0"/>
-              <a:t>Su ambigüedad dificulta una traducción</a:t>
-            </a:r>
-          </a:p>
-          <a:p>
-            <a:r>
-              <a:rPr lang="es-ES" dirty="0"/>
-              <a:t>El tiempo es un limitante muy importante</a:t>
-            </a:r>
-          </a:p>
-          <a:p>
-            <a:r>
-              <a:rPr lang="es-ES" dirty="0"/>
-              <a:t>Nuevas características pueden ser añadidas</a:t>
-            </a:r>
-          </a:p>
-          <a:p>
-            <a:pPr lvl="1"/>
-            <a:r>
-              <a:rPr lang="es-ES" dirty="0"/>
-              <a:t>Ampliar la sintaxis</a:t>
-            </a:r>
-          </a:p>
-          <a:p>
-            <a:pPr lvl="1"/>
-            <a:r>
-              <a:rPr lang="es-ES" dirty="0"/>
-              <a:t>Eliminar mas limitaciones</a:t>
-            </a:r>
-          </a:p>
-          <a:p>
-            <a:pPr lvl="1"/>
-            <a:r>
-              <a:rPr lang="es-ES" dirty="0"/>
-              <a:t>Mas funciones nativas</a:t>
-            </a:r>
-          </a:p>
-          <a:p>
-            <a:pPr lvl="1"/>
-            <a:r>
-              <a:rPr lang="es-ES" dirty="0"/>
-              <a:t>Nuevas tecnologías Big Data como Apache </a:t>
-            </a:r>
-            <a:r>
-              <a:rPr lang="es-ES" dirty="0" err="1"/>
-              <a:t>Spark</a:t>
-            </a:r>
-            <a:endParaRPr lang="es-ES" dirty="0"/>
-          </a:p>
-          <a:p>
-            <a:endParaRPr lang="es-ES" dirty="0"/>
-          </a:p>
-          <a:p>
-            <a:endParaRPr lang="es-ES" dirty="0"/>
-          </a:p>
-        </p:txBody>
-      </p:sp>
-      <p:sp>
-        <p:nvSpPr>
-          <p:cNvPr id="5" name="Marcador de pie de página 4"/>
-          <p:cNvSpPr>
-            <a:spLocks noGrp="1"/>
-          </p:cNvSpPr>
-          <p:nvPr>
-            <p:ph type="ftr" sz="quarter" idx="11"/>
-          </p:nvPr>
-        </p:nvSpPr>
-        <p:spPr>
-          <a:xfrm>
-            <a:off x="2079585" y="6605588"/>
-            <a:ext cx="10112415" cy="252412"/>
-          </a:xfrm>
-        </p:spPr>
-        <p:txBody>
-          <a:bodyPr/>
-          <a:lstStyle/>
-          <a:p>
-            <a:r>
-              <a:rPr lang="es-ES" dirty="0">
-                <a:solidFill>
-                  <a:schemeClr val="bg1"/>
-                </a:solidFill>
-              </a:rPr>
-              <a:t>Autor: César Piñeiro Pomar                                                                                                                                                                                  Perldoop 2.0: Un compilador fuente-a-fuente</a:t>
-            </a:r>
-            <a:endParaRPr lang="en-US" dirty="0">
-              <a:solidFill>
-                <a:schemeClr val="bg1"/>
-              </a:solidFill>
-            </a:endParaRPr>
-          </a:p>
-        </p:txBody>
-      </p:sp>
+      <p:pic>
+        <p:nvPicPr>
+          <p:cNvPr id="3" name="Imagen 2"/>
+          <p:cNvPicPr>
+            <a:picLocks noChangeAspect="1"/>
+          </p:cNvPicPr>
+          <p:nvPr/>
+        </p:nvPicPr>
+        <p:blipFill>
+          <a:blip r:embed="rId2"/>
+          <a:stretch>
+            <a:fillRect/>
+          </a:stretch>
+        </p:blipFill>
+        <p:spPr>
+          <a:xfrm>
+            <a:off x="0" y="0"/>
+            <a:ext cx="12192001" cy="6858000"/>
+          </a:xfrm>
+          <a:prstGeom prst="rect">
+            <a:avLst/>
+          </a:prstGeom>
+        </p:spPr>
+      </p:pic>
     </p:spTree>
     <p:extLst>
       <p:ext uri="{BB962C8B-B14F-4D97-AF65-F5344CB8AC3E}">
-        <p14:creationId xmlns:p14="http://schemas.microsoft.com/office/powerpoint/2010/main" val="1552365097"/>
+        <p14:creationId xmlns:p14="http://schemas.microsoft.com/office/powerpoint/2010/main" val="1681546175"/>
       </p:ext>
     </p:extLst>
   </p:cSld>
@@ -10830,7 +10975,7 @@
                   <a:schemeClr val="bg1"/>
                 </a:solidFill>
               </a:rPr>
-              <a:t>Conocimiento Adquirido</a:t>
+              <a:t>Conclusiones</a:t>
             </a:r>
           </a:p>
         </p:txBody>
@@ -10847,38 +10992,105 @@
         </p:nvSpPr>
         <p:spPr>
           <a:xfrm>
-            <a:off x="1427160" y="1983129"/>
-            <a:ext cx="10455278" cy="3912847"/>
-          </a:xfrm>
-        </p:spPr>
-        <p:txBody>
-          <a:bodyPr/>
+            <a:off x="1427160" y="1512425"/>
+            <a:ext cx="10455278" cy="5093163"/>
+          </a:xfrm>
+        </p:spPr>
+        <p:txBody>
+          <a:bodyPr>
+            <a:normAutofit fontScale="92500" lnSpcReduction="20000"/>
+          </a:bodyPr>
           <a:lstStyle/>
           <a:p>
             <a:r>
               <a:rPr lang="es-ES" dirty="0"/>
-              <a:t>Conocimiento y soltura con Python y Perl</a:t>
-            </a:r>
-          </a:p>
-          <a:p>
-            <a:r>
-              <a:rPr lang="es-ES" dirty="0"/>
-              <a:t>Manejo mas profundo de la creación de gramáticas</a:t>
-            </a:r>
-          </a:p>
-          <a:p>
-            <a:r>
-              <a:rPr lang="es-ES" dirty="0"/>
-              <a:t>Diseño de un compilador con todas sus fases</a:t>
-            </a:r>
-          </a:p>
-          <a:p>
-            <a:r>
-              <a:rPr lang="es-ES" dirty="0"/>
-              <a:t>Experiencia en tecnologías Big Data con Hadoop</a:t>
-            </a:r>
-          </a:p>
-          <a:p>
+              <a:t>La sintaxis de Perl es inmensa</a:t>
+            </a:r>
+          </a:p>
+          <a:p>
+            <a:r>
+              <a:rPr lang="es-ES" dirty="0"/>
+              <a:t>Su ambigüedad dificulta una traducción</a:t>
+            </a:r>
+          </a:p>
+          <a:p>
+            <a:r>
+              <a:rPr lang="es-ES" dirty="0"/>
+              <a:t>El tiempo es un limitante muy importante</a:t>
+            </a:r>
+          </a:p>
+          <a:p>
+            <a:r>
+              <a:rPr lang="es-ES"/>
+              <a:t>Características</a:t>
+            </a:r>
+            <a:endParaRPr lang="es-ES" dirty="0"/>
+          </a:p>
+          <a:p>
+            <a:pPr lvl="1"/>
+            <a:r>
+              <a:rPr lang="es-ES" dirty="0"/>
+              <a:t>Ficheros</a:t>
+            </a:r>
+          </a:p>
+          <a:p>
+            <a:pPr lvl="1"/>
+            <a:r>
+              <a:rPr lang="es-ES" dirty="0"/>
+              <a:t>Expresiones regulares</a:t>
+            </a:r>
+          </a:p>
+          <a:p>
+            <a:pPr lvl="1"/>
+            <a:r>
+              <a:rPr lang="es-ES" dirty="0"/>
+              <a:t>Módulos</a:t>
+            </a:r>
+          </a:p>
+          <a:p>
+            <a:pPr lvl="1"/>
+            <a:r>
+              <a:rPr lang="es-ES" dirty="0"/>
+              <a:t>Etc.</a:t>
+            </a:r>
+          </a:p>
+          <a:p>
+            <a:r>
+              <a:rPr lang="es-ES" dirty="0"/>
+              <a:t>Nuevas características pueden ser añadidas</a:t>
+            </a:r>
+          </a:p>
+          <a:p>
+            <a:pPr lvl="1"/>
+            <a:r>
+              <a:rPr lang="es-ES" dirty="0"/>
+              <a:t>Ampliar la sintaxis</a:t>
+            </a:r>
+          </a:p>
+          <a:p>
+            <a:pPr lvl="1"/>
+            <a:r>
+              <a:rPr lang="es-ES" dirty="0"/>
+              <a:t>Eliminar mas limitaciones</a:t>
+            </a:r>
+          </a:p>
+          <a:p>
+            <a:pPr lvl="1"/>
+            <a:r>
+              <a:rPr lang="es-ES" dirty="0"/>
+              <a:t>Mas funciones nativas</a:t>
+            </a:r>
+          </a:p>
+          <a:p>
+            <a:pPr lvl="1"/>
+            <a:r>
+              <a:rPr lang="es-ES" dirty="0"/>
+              <a:t>Nuevas tecnologías Big Data como Apache </a:t>
+            </a:r>
+            <a:r>
+              <a:rPr lang="es-ES" dirty="0" err="1"/>
+              <a:t>Spark</a:t>
+            </a:r>
             <a:endParaRPr lang="es-ES" dirty="0"/>
           </a:p>
           <a:p>
@@ -10928,7 +11140,7 @@
     </p:spTree>
     <p:extLst>
       <p:ext uri="{BB962C8B-B14F-4D97-AF65-F5344CB8AC3E}">
-        <p14:creationId xmlns:p14="http://schemas.microsoft.com/office/powerpoint/2010/main" val="4078897029"/>
+        <p14:creationId xmlns:p14="http://schemas.microsoft.com/office/powerpoint/2010/main" val="1552365097"/>
       </p:ext>
     </p:extLst>
   </p:cSld>
@@ -10997,7 +11209,7 @@
                   <a:schemeClr val="bg1"/>
                 </a:solidFill>
               </a:rPr>
-              <a:t>Introducción</a:t>
+              <a:t>Motivación</a:t>
             </a:r>
           </a:p>
         </p:txBody>
@@ -11019,82 +11231,36 @@
           </a:xfrm>
         </p:spPr>
         <p:txBody>
-          <a:bodyPr>
-            <a:normAutofit lnSpcReduction="10000"/>
-          </a:bodyPr>
+          <a:bodyPr/>
           <a:lstStyle/>
           <a:p>
             <a:r>
               <a:rPr lang="es-ES" dirty="0"/>
-              <a:t>Perldoop </a:t>
-            </a:r>
-          </a:p>
-          <a:p>
-            <a:pPr lvl="1"/>
-            <a:r>
-              <a:rPr lang="es-ES" dirty="0"/>
-              <a:t>Compilador fuente-a-fuente Perl-Java</a:t>
-            </a:r>
-          </a:p>
-          <a:p>
-            <a:pPr lvl="1"/>
-            <a:r>
-              <a:rPr lang="es-ES" dirty="0"/>
-              <a:t>Programado en Python</a:t>
-            </a:r>
-          </a:p>
-          <a:p>
-            <a:r>
-              <a:rPr lang="es-ES" dirty="0"/>
-              <a:t>Etiquetas</a:t>
-            </a:r>
-          </a:p>
-          <a:p>
-            <a:pPr lvl="1"/>
-            <a:r>
-              <a:rPr lang="es-ES" dirty="0"/>
-              <a:t>Especificadas en comentarios</a:t>
-            </a:r>
-          </a:p>
-          <a:p>
-            <a:pPr lvl="1"/>
-            <a:r>
-              <a:rPr lang="es-ES" dirty="0"/>
-              <a:t>Añaden valor semántico</a:t>
-            </a:r>
-          </a:p>
-          <a:p>
-            <a:pPr lvl="1"/>
-            <a:r>
-              <a:rPr lang="es-ES" dirty="0"/>
-              <a:t>Aplican transformaciones</a:t>
-            </a:r>
-          </a:p>
-          <a:p>
-            <a:r>
-              <a:rPr lang="es-ES" dirty="0"/>
-              <a:t>Mejoras de la Versión 2.0</a:t>
-            </a:r>
-          </a:p>
-          <a:p>
-            <a:pPr lvl="1"/>
-            <a:r>
-              <a:rPr lang="es-ES" dirty="0"/>
-              <a:t>Herramientas para la construcción de compiladores</a:t>
-            </a:r>
-          </a:p>
-          <a:p>
-            <a:pPr lvl="1"/>
-            <a:r>
-              <a:rPr lang="es-ES" dirty="0"/>
-              <a:t>Simplificación de Etiquetas</a:t>
-            </a:r>
-          </a:p>
-          <a:p>
-            <a:pPr lvl="1"/>
-            <a:r>
-              <a:rPr lang="es-ES" dirty="0"/>
-              <a:t>Detección y gestión de errores</a:t>
+              <a:t>Desarrollar un proyecto con una alta complejidad</a:t>
+            </a:r>
+          </a:p>
+          <a:p>
+            <a:r>
+              <a:rPr lang="es-ES" dirty="0"/>
+              <a:t>Complementar los conocimiento adquiridos en la asignatura de compiladores</a:t>
+            </a:r>
+          </a:p>
+          <a:p>
+            <a:r>
+              <a:rPr lang="es-ES" dirty="0"/>
+              <a:t>Traducir scripts Perl a Java de forma directa</a:t>
+            </a:r>
+          </a:p>
+          <a:p>
+            <a:r>
+              <a:rPr lang="es-ES" dirty="0"/>
+              <a:t>Generar código compatible con tecnologías Big Data</a:t>
+            </a:r>
+          </a:p>
+          <a:p>
+            <a:r>
+              <a:rPr lang="es-ES" dirty="0"/>
+              <a:t>Mejorar la experiencia de usuario</a:t>
             </a:r>
           </a:p>
         </p:txBody>
@@ -11138,7 +11304,174 @@
     </p:spTree>
     <p:extLst>
       <p:ext uri="{BB962C8B-B14F-4D97-AF65-F5344CB8AC3E}">
-        <p14:creationId xmlns:p14="http://schemas.microsoft.com/office/powerpoint/2010/main" val="2041438776"/>
+        <p14:creationId xmlns:p14="http://schemas.microsoft.com/office/powerpoint/2010/main" val="2103857669"/>
+      </p:ext>
+    </p:extLst>
+  </p:cSld>
+  <p:clrMapOvr>
+    <a:masterClrMapping/>
+  </p:clrMapOvr>
+</p:sld>
+</file>
+
+<file path=ppt/slides/slide30.xml><?xml version="1.0" encoding="utf-8"?>
+<p:sld xmlns:a="http://schemas.openxmlformats.org/drawingml/2006/main" xmlns:r="http://schemas.openxmlformats.org/officeDocument/2006/relationships" xmlns:p="http://schemas.openxmlformats.org/presentationml/2006/main" showMasterSp="0">
+  <p:cSld>
+    <p:bg>
+      <p:bgPr>
+        <a:blipFill dpi="0" rotWithShape="1">
+          <a:blip r:embed="rId2">
+            <a:lum/>
+          </a:blip>
+          <a:srcRect/>
+          <a:stretch>
+            <a:fillRect/>
+          </a:stretch>
+        </a:blipFill>
+        <a:effectLst/>
+      </p:bgPr>
+    </p:bg>
+    <p:spTree>
+      <p:nvGrpSpPr>
+        <p:cNvPr id="1" name=""/>
+        <p:cNvGrpSpPr/>
+        <p:nvPr/>
+      </p:nvGrpSpPr>
+      <p:grpSpPr>
+        <a:xfrm>
+          <a:off x="0" y="0"/>
+          <a:ext cx="0" cy="0"/>
+          <a:chOff x="0" y="0"/>
+          <a:chExt cx="0" cy="0"/>
+        </a:xfrm>
+      </p:grpSpPr>
+      <p:sp>
+        <p:nvSpPr>
+          <p:cNvPr id="2" name="Título 1"/>
+          <p:cNvSpPr>
+            <a:spLocks noGrp="1"/>
+          </p:cNvSpPr>
+          <p:nvPr>
+            <p:ph type="title"/>
+          </p:nvPr>
+        </p:nvSpPr>
+        <p:spPr>
+          <a:xfrm>
+            <a:off x="0" y="-1"/>
+            <a:ext cx="12192000" cy="823914"/>
+          </a:xfrm>
+        </p:spPr>
+        <p:txBody>
+          <a:bodyPr>
+            <a:normAutofit/>
+          </a:bodyPr>
+          <a:lstStyle/>
+          <a:p>
+            <a:r>
+              <a:rPr lang="es-ES" dirty="0">
+                <a:solidFill>
+                  <a:schemeClr val="bg1"/>
+                </a:solidFill>
+              </a:rPr>
+              <a:t>Conocimiento Adquirido</a:t>
+            </a:r>
+          </a:p>
+        </p:txBody>
+      </p:sp>
+      <p:sp>
+        <p:nvSpPr>
+          <p:cNvPr id="3" name="Marcador de contenido 2"/>
+          <p:cNvSpPr>
+            <a:spLocks noGrp="1"/>
+          </p:cNvSpPr>
+          <p:nvPr>
+            <p:ph idx="1"/>
+          </p:nvPr>
+        </p:nvSpPr>
+        <p:spPr>
+          <a:xfrm>
+            <a:off x="1427160" y="1983129"/>
+            <a:ext cx="10455278" cy="3912847"/>
+          </a:xfrm>
+        </p:spPr>
+        <p:txBody>
+          <a:bodyPr/>
+          <a:lstStyle/>
+          <a:p>
+            <a:r>
+              <a:rPr lang="es-ES" dirty="0"/>
+              <a:t>Conocimiento y soltura con Python y Perl</a:t>
+            </a:r>
+          </a:p>
+          <a:p>
+            <a:r>
+              <a:rPr lang="es-ES" dirty="0"/>
+              <a:t>Manejo mas profundo de la creación de gramáticas</a:t>
+            </a:r>
+          </a:p>
+          <a:p>
+            <a:r>
+              <a:rPr lang="es-ES" dirty="0"/>
+              <a:t>Diseño de un compilador con todas sus fases</a:t>
+            </a:r>
+          </a:p>
+          <a:p>
+            <a:r>
+              <a:rPr lang="es-ES" dirty="0"/>
+              <a:t>Experiencia en tecnologías Big Data con Hadoop</a:t>
+            </a:r>
+          </a:p>
+          <a:p>
+            <a:endParaRPr lang="es-ES" dirty="0"/>
+          </a:p>
+          <a:p>
+            <a:endParaRPr lang="es-ES" dirty="0"/>
+          </a:p>
+          <a:p>
+            <a:endParaRPr lang="es-ES" dirty="0"/>
+          </a:p>
+        </p:txBody>
+      </p:sp>
+      <p:sp>
+        <p:nvSpPr>
+          <p:cNvPr id="5" name="Marcador de pie de página 4"/>
+          <p:cNvSpPr>
+            <a:spLocks noGrp="1"/>
+          </p:cNvSpPr>
+          <p:nvPr>
+            <p:ph type="ftr" sz="quarter" idx="11"/>
+          </p:nvPr>
+        </p:nvSpPr>
+        <p:spPr>
+          <a:xfrm>
+            <a:off x="2079585" y="6605588"/>
+            <a:ext cx="10112415" cy="252412"/>
+          </a:xfrm>
+        </p:spPr>
+        <p:txBody>
+          <a:bodyPr/>
+          <a:lstStyle/>
+          <a:p>
+            <a:r>
+              <a:rPr lang="es-ES" dirty="0">
+                <a:solidFill>
+                  <a:schemeClr val="bg1"/>
+                </a:solidFill>
+              </a:rPr>
+              <a:t>Autor: César Piñeiro Pomar                                                                                                                                                                                  Perldoop 2.0: Un compilador fuente-a-fuente</a:t>
+            </a:r>
+            <a:endParaRPr lang="en-US" dirty="0">
+              <a:solidFill>
+                <a:schemeClr val="bg1"/>
+              </a:solidFill>
+            </a:endParaRPr>
+          </a:p>
+        </p:txBody>
+      </p:sp>
+    </p:spTree>
+    <p:extLst>
+      <p:ext uri="{BB962C8B-B14F-4D97-AF65-F5344CB8AC3E}">
+        <p14:creationId xmlns:p14="http://schemas.microsoft.com/office/powerpoint/2010/main" val="4078897029"/>
       </p:ext>
     </p:extLst>
   </p:cSld>
@@ -11207,7 +11540,7 @@
                   <a:schemeClr val="bg1"/>
                 </a:solidFill>
               </a:rPr>
-              <a:t>Objetivos</a:t>
+              <a:t>Introducción</a:t>
             </a:r>
           </a:p>
         </p:txBody>
@@ -11229,42 +11562,82 @@
           </a:xfrm>
         </p:spPr>
         <p:txBody>
-          <a:bodyPr/>
+          <a:bodyPr>
+            <a:normAutofit lnSpcReduction="10000"/>
+          </a:bodyPr>
           <a:lstStyle/>
           <a:p>
             <a:r>
               <a:rPr lang="es-ES" dirty="0"/>
-              <a:t>Soporte para un subconjunto acotado de la sintaxis de Perl</a:t>
-            </a:r>
-          </a:p>
-          <a:p>
-            <a:r>
-              <a:rPr lang="es-ES" dirty="0"/>
-              <a:t>Conversión automática entre tipos de dato</a:t>
-            </a:r>
-          </a:p>
-          <a:p>
-            <a:r>
-              <a:rPr lang="es-ES" dirty="0"/>
-              <a:t>Traducir funciones personalizadas</a:t>
-            </a:r>
-          </a:p>
-          <a:p>
-            <a:r>
-              <a:rPr lang="es-ES" dirty="0"/>
-              <a:t>Funciones nativas implementadas</a:t>
-            </a:r>
-          </a:p>
-          <a:p>
-            <a:r>
-              <a:rPr lang="es-ES" dirty="0"/>
-              <a:t>Generar código paralelo compatible con Hadoop</a:t>
-            </a:r>
-          </a:p>
-          <a:p>
-            <a:r>
-              <a:rPr lang="es-ES" dirty="0"/>
-              <a:t>Gestión de errores</a:t>
+              <a:t>Perldoop </a:t>
+            </a:r>
+          </a:p>
+          <a:p>
+            <a:pPr lvl="1"/>
+            <a:r>
+              <a:rPr lang="es-ES" dirty="0"/>
+              <a:t>Compilador fuente-a-fuente Perl-Java</a:t>
+            </a:r>
+          </a:p>
+          <a:p>
+            <a:pPr lvl="1"/>
+            <a:r>
+              <a:rPr lang="es-ES" dirty="0"/>
+              <a:t>Programado en Python</a:t>
+            </a:r>
+          </a:p>
+          <a:p>
+            <a:r>
+              <a:rPr lang="es-ES" dirty="0"/>
+              <a:t>Etiquetas</a:t>
+            </a:r>
+          </a:p>
+          <a:p>
+            <a:pPr lvl="1"/>
+            <a:r>
+              <a:rPr lang="es-ES" dirty="0"/>
+              <a:t>Especificadas en comentarios</a:t>
+            </a:r>
+          </a:p>
+          <a:p>
+            <a:pPr lvl="1"/>
+            <a:r>
+              <a:rPr lang="es-ES" dirty="0"/>
+              <a:t>Añaden valor semántico</a:t>
+            </a:r>
+          </a:p>
+          <a:p>
+            <a:pPr lvl="1"/>
+            <a:r>
+              <a:rPr lang="es-ES" dirty="0"/>
+              <a:t>Aplican transformaciones</a:t>
+            </a:r>
+          </a:p>
+          <a:p>
+            <a:r>
+              <a:rPr lang="es-ES" dirty="0"/>
+              <a:t>Mejoras de la Versión 2.0</a:t>
+            </a:r>
+          </a:p>
+          <a:p>
+            <a:pPr lvl="1"/>
+            <a:r>
+              <a:rPr lang="es-ES" dirty="0"/>
+              <a:t>Herramientas para la construcción de compiladores</a:t>
+            </a:r>
+          </a:p>
+          <a:p>
+            <a:pPr lvl="1"/>
+            <a:r>
+              <a:rPr lang="es-ES" dirty="0"/>
+              <a:t>Simplificación de Etiquetas</a:t>
+            </a:r>
+          </a:p>
+          <a:p>
+            <a:pPr lvl="1"/>
+            <a:r>
+              <a:rPr lang="es-ES" dirty="0"/>
+              <a:t>Detección y gestión de errores</a:t>
             </a:r>
           </a:p>
         </p:txBody>
@@ -11308,7 +11681,7 @@
     </p:spTree>
     <p:extLst>
       <p:ext uri="{BB962C8B-B14F-4D97-AF65-F5344CB8AC3E}">
-        <p14:creationId xmlns:p14="http://schemas.microsoft.com/office/powerpoint/2010/main" val="4180998111"/>
+        <p14:creationId xmlns:p14="http://schemas.microsoft.com/office/powerpoint/2010/main" val="2041438776"/>
       </p:ext>
     </p:extLst>
   </p:cSld>
@@ -11377,7 +11750,7 @@
                   <a:schemeClr val="bg1"/>
                 </a:solidFill>
               </a:rPr>
-              <a:t>Gestión del proyecto</a:t>
+              <a:t>Objetivos</a:t>
             </a:r>
           </a:p>
         </p:txBody>
@@ -11394,90 +11767,48 @@
         </p:nvSpPr>
         <p:spPr>
           <a:xfrm>
-            <a:off x="1427160" y="1797934"/>
-            <a:ext cx="10455278" cy="4511426"/>
-          </a:xfrm>
-        </p:spPr>
-        <p:txBody>
-          <a:bodyPr>
-            <a:normAutofit fontScale="92500" lnSpcReduction="20000"/>
-          </a:bodyPr>
+            <a:off x="1427160" y="1047751"/>
+            <a:ext cx="10455278" cy="4848225"/>
+          </a:xfrm>
+        </p:spPr>
+        <p:txBody>
+          <a:bodyPr/>
           <a:lstStyle/>
           <a:p>
             <a:r>
               <a:rPr lang="es-ES" dirty="0"/>
-              <a:t>Criterios de aceptación</a:t>
-            </a:r>
-          </a:p>
-          <a:p>
-            <a:pPr lvl="1"/>
-            <a:r>
-              <a:rPr lang="es-ES" dirty="0"/>
-              <a:t>Cumplir objetivos y requisitos</a:t>
-            </a:r>
-          </a:p>
-          <a:p>
-            <a:pPr lvl="1"/>
-            <a:r>
-              <a:rPr lang="es-ES" dirty="0"/>
-              <a:t>Aceptación por parte de los tutores</a:t>
-            </a:r>
-          </a:p>
-          <a:p>
-            <a:r>
-              <a:rPr lang="es-ES" dirty="0"/>
-              <a:t>Restricciones</a:t>
-            </a:r>
-          </a:p>
-          <a:p>
-            <a:pPr lvl="1"/>
-            <a:r>
-              <a:rPr lang="es-ES" dirty="0"/>
-              <a:t>El código debe contener etiquetas.</a:t>
-            </a:r>
-          </a:p>
-          <a:p>
-            <a:r>
-              <a:rPr lang="es-ES" dirty="0"/>
-              <a:t>Exclusiones</a:t>
-            </a:r>
-          </a:p>
-          <a:p>
-            <a:pPr lvl="1"/>
-            <a:r>
-              <a:rPr lang="es-ES" dirty="0"/>
-              <a:t>No es un traductor completo de Perl</a:t>
-            </a:r>
-          </a:p>
-          <a:p>
-            <a:pPr lvl="1"/>
-            <a:r>
-              <a:rPr lang="es-ES" dirty="0"/>
-              <a:t>No se incluye soporte para objetos</a:t>
-            </a:r>
-          </a:p>
-          <a:p>
-            <a:r>
-              <a:rPr lang="es-ES" dirty="0"/>
-              <a:t>Supuestos</a:t>
-            </a:r>
-          </a:p>
-          <a:p>
-            <a:pPr lvl="1"/>
-            <a:r>
-              <a:rPr lang="es-ES" dirty="0"/>
-              <a:t>Sintácticamente correcto</a:t>
-            </a:r>
-          </a:p>
-          <a:p>
-            <a:pPr lvl="1"/>
-            <a:r>
-              <a:rPr lang="es-ES" dirty="0"/>
-              <a:t>Semánticamente correcto</a:t>
-            </a:r>
-          </a:p>
-          <a:p>
-            <a:endParaRPr lang="es-ES" dirty="0"/>
+              <a:t>Soporte para un subconjunto acotado de la sintaxis de Perl</a:t>
+            </a:r>
+          </a:p>
+          <a:p>
+            <a:r>
+              <a:rPr lang="es-ES" dirty="0"/>
+              <a:t>Conversión automática entre tipos de dato</a:t>
+            </a:r>
+          </a:p>
+          <a:p>
+            <a:r>
+              <a:rPr lang="es-ES" dirty="0"/>
+              <a:t>Traducir funciones personalizadas</a:t>
+            </a:r>
+          </a:p>
+          <a:p>
+            <a:r>
+              <a:rPr lang="es-ES" dirty="0"/>
+              <a:t>Funciones nativas implementadas</a:t>
+            </a:r>
+          </a:p>
+          <a:p>
+            <a:r>
+              <a:rPr lang="es-ES" dirty="0"/>
+              <a:t>Generar código paralelo compatible con Hadoop</a:t>
+            </a:r>
+          </a:p>
+          <a:p>
+            <a:r>
+              <a:rPr lang="es-ES" dirty="0"/>
+              <a:t>Gestión de errores</a:t>
+            </a:r>
           </a:p>
         </p:txBody>
       </p:sp>
@@ -11517,116 +11848,10 @@
           </a:p>
         </p:txBody>
       </p:sp>
-      <p:sp>
-        <p:nvSpPr>
-          <p:cNvPr id="6" name="Título 1"/>
-          <p:cNvSpPr txBox="1">
-            <a:spLocks/>
-          </p:cNvSpPr>
-          <p:nvPr/>
-        </p:nvSpPr>
-        <p:spPr>
-          <a:xfrm>
-            <a:off x="0" y="823913"/>
-            <a:ext cx="12192000" cy="823914"/>
-          </a:xfrm>
-          <a:prstGeom prst="rect">
-            <a:avLst/>
-          </a:prstGeom>
-          <a:effectLst/>
-        </p:spPr>
-        <p:txBody>
-          <a:bodyPr vert="horz" lIns="91440" tIns="45720" rIns="91440" bIns="45720" rtlCol="0" anchor="ctr">
-            <a:normAutofit/>
-          </a:bodyPr>
-          <a:lstStyle>
-            <a:lvl1pPr algn="ctr" defTabSz="457200" rtl="0" eaLnBrk="1" latinLnBrk="0" hangingPunct="1">
-              <a:spcBef>
-                <a:spcPct val="0"/>
-              </a:spcBef>
-              <a:buNone/>
-              <a:defRPr sz="4000" kern="1200" cap="none">
-                <a:ln w="3175" cmpd="sng">
-                  <a:noFill/>
-                </a:ln>
-                <a:solidFill>
-                  <a:schemeClr val="tx1"/>
-                </a:solidFill>
-                <a:effectLst/>
-                <a:latin typeface="+mj-lt"/>
-                <a:ea typeface="+mj-ea"/>
-                <a:cs typeface="+mj-cs"/>
-              </a:defRPr>
-            </a:lvl1pPr>
-            <a:lvl2pPr eaLnBrk="1" hangingPunct="1">
-              <a:defRPr>
-                <a:solidFill>
-                  <a:schemeClr val="tx2"/>
-                </a:solidFill>
-              </a:defRPr>
-            </a:lvl2pPr>
-            <a:lvl3pPr eaLnBrk="1" hangingPunct="1">
-              <a:defRPr>
-                <a:solidFill>
-                  <a:schemeClr val="tx2"/>
-                </a:solidFill>
-              </a:defRPr>
-            </a:lvl3pPr>
-            <a:lvl4pPr eaLnBrk="1" hangingPunct="1">
-              <a:defRPr>
-                <a:solidFill>
-                  <a:schemeClr val="tx2"/>
-                </a:solidFill>
-              </a:defRPr>
-            </a:lvl4pPr>
-            <a:lvl5pPr eaLnBrk="1" hangingPunct="1">
-              <a:defRPr>
-                <a:solidFill>
-                  <a:schemeClr val="tx2"/>
-                </a:solidFill>
-              </a:defRPr>
-            </a:lvl5pPr>
-            <a:lvl6pPr eaLnBrk="1" hangingPunct="1">
-              <a:defRPr>
-                <a:solidFill>
-                  <a:schemeClr val="tx2"/>
-                </a:solidFill>
-              </a:defRPr>
-            </a:lvl6pPr>
-            <a:lvl7pPr eaLnBrk="1" hangingPunct="1">
-              <a:defRPr>
-                <a:solidFill>
-                  <a:schemeClr val="tx2"/>
-                </a:solidFill>
-              </a:defRPr>
-            </a:lvl7pPr>
-            <a:lvl8pPr eaLnBrk="1" hangingPunct="1">
-              <a:defRPr>
-                <a:solidFill>
-                  <a:schemeClr val="tx2"/>
-                </a:solidFill>
-              </a:defRPr>
-            </a:lvl8pPr>
-            <a:lvl9pPr eaLnBrk="1" hangingPunct="1">
-              <a:defRPr>
-                <a:solidFill>
-                  <a:schemeClr val="tx2"/>
-                </a:solidFill>
-              </a:defRPr>
-            </a:lvl9pPr>
-          </a:lstStyle>
-          <a:p>
-            <a:r>
-              <a:rPr lang="es-ES" sz="3600" dirty="0"/>
-              <a:t>Gestión del Alcance</a:t>
-            </a:r>
-          </a:p>
-        </p:txBody>
-      </p:sp>
     </p:spTree>
     <p:extLst>
       <p:ext uri="{BB962C8B-B14F-4D97-AF65-F5344CB8AC3E}">
-        <p14:creationId xmlns:p14="http://schemas.microsoft.com/office/powerpoint/2010/main" val="2021625253"/>
+        <p14:creationId xmlns:p14="http://schemas.microsoft.com/office/powerpoint/2010/main" val="4180998111"/>
       </p:ext>
     </p:extLst>
   </p:cSld>
@@ -11702,6 +11927,105 @@
       </p:sp>
       <p:sp>
         <p:nvSpPr>
+          <p:cNvPr id="3" name="Marcador de contenido 2"/>
+          <p:cNvSpPr>
+            <a:spLocks noGrp="1"/>
+          </p:cNvSpPr>
+          <p:nvPr>
+            <p:ph idx="1"/>
+          </p:nvPr>
+        </p:nvSpPr>
+        <p:spPr>
+          <a:xfrm>
+            <a:off x="1427160" y="1797934"/>
+            <a:ext cx="10455278" cy="4511426"/>
+          </a:xfrm>
+        </p:spPr>
+        <p:txBody>
+          <a:bodyPr>
+            <a:normAutofit fontScale="92500" lnSpcReduction="20000"/>
+          </a:bodyPr>
+          <a:lstStyle/>
+          <a:p>
+            <a:r>
+              <a:rPr lang="es-ES" dirty="0"/>
+              <a:t>Criterios de aceptación</a:t>
+            </a:r>
+          </a:p>
+          <a:p>
+            <a:pPr lvl="1"/>
+            <a:r>
+              <a:rPr lang="es-ES" dirty="0"/>
+              <a:t>Cumplir objetivos y requisitos</a:t>
+            </a:r>
+          </a:p>
+          <a:p>
+            <a:pPr lvl="1"/>
+            <a:r>
+              <a:rPr lang="es-ES" dirty="0"/>
+              <a:t>Aceptación por parte de los tutores</a:t>
+            </a:r>
+          </a:p>
+          <a:p>
+            <a:r>
+              <a:rPr lang="es-ES" dirty="0"/>
+              <a:t>Restricciones</a:t>
+            </a:r>
+          </a:p>
+          <a:p>
+            <a:pPr lvl="1"/>
+            <a:r>
+              <a:rPr lang="es-ES" dirty="0"/>
+              <a:t>El código debe contener etiquetas.</a:t>
+            </a:r>
+          </a:p>
+          <a:p>
+            <a:r>
+              <a:rPr lang="es-ES" dirty="0"/>
+              <a:t>Exclusiones</a:t>
+            </a:r>
+          </a:p>
+          <a:p>
+            <a:pPr lvl="1"/>
+            <a:r>
+              <a:rPr lang="es-ES" dirty="0"/>
+              <a:t>No es un traductor completo de Perl</a:t>
+            </a:r>
+          </a:p>
+          <a:p>
+            <a:pPr lvl="1"/>
+            <a:r>
+              <a:rPr lang="es-ES" dirty="0"/>
+              <a:t>No se incluye soporte para objetos</a:t>
+            </a:r>
+          </a:p>
+          <a:p>
+            <a:r>
+              <a:rPr lang="es-ES" dirty="0"/>
+              <a:t>Supuestos</a:t>
+            </a:r>
+          </a:p>
+          <a:p>
+            <a:pPr lvl="1"/>
+            <a:r>
+              <a:rPr lang="es-ES" dirty="0"/>
+              <a:t>Sintácticamente correcto</a:t>
+            </a:r>
+          </a:p>
+          <a:p>
+            <a:pPr lvl="1"/>
+            <a:r>
+              <a:rPr lang="es-ES" dirty="0"/>
+              <a:t>Semánticamente correcto</a:t>
+            </a:r>
+          </a:p>
+          <a:p>
+            <a:endParaRPr lang="es-ES" dirty="0"/>
+          </a:p>
+        </p:txBody>
+      </p:sp>
+      <p:sp>
+        <p:nvSpPr>
           <p:cNvPr id="5" name="Marcador de pie de página 4"/>
           <p:cNvSpPr>
             <a:spLocks noGrp="1"/>
@@ -11837,60 +12161,7 @@
           <a:p>
             <a:r>
               <a:rPr lang="es-ES" sz="3600" dirty="0"/>
-              <a:t>Casos de Uso</a:t>
-            </a:r>
-          </a:p>
-        </p:txBody>
-      </p:sp>
-      <p:pic>
-        <p:nvPicPr>
-          <p:cNvPr id="4" name="Imagen 3"/>
-          <p:cNvPicPr>
-            <a:picLocks noChangeAspect="1"/>
-          </p:cNvPicPr>
-          <p:nvPr/>
-        </p:nvPicPr>
-        <p:blipFill>
-          <a:blip r:embed="rId3"/>
-          <a:stretch>
-            <a:fillRect/>
-          </a:stretch>
-        </p:blipFill>
-        <p:spPr>
-          <a:xfrm>
-            <a:off x="3511596" y="2312194"/>
-            <a:ext cx="5168808" cy="3629027"/>
-          </a:xfrm>
-          <a:prstGeom prst="rect">
-            <a:avLst/>
-          </a:prstGeom>
-        </p:spPr>
-      </p:pic>
-      <p:sp>
-        <p:nvSpPr>
-          <p:cNvPr id="8" name="Marcador de contenido 2"/>
-          <p:cNvSpPr>
-            <a:spLocks noGrp="1"/>
-          </p:cNvSpPr>
-          <p:nvPr>
-            <p:ph idx="1"/>
-          </p:nvPr>
-        </p:nvSpPr>
-        <p:spPr>
-          <a:xfrm>
-            <a:off x="1427160" y="1592194"/>
-            <a:ext cx="10455278" cy="423296"/>
-          </a:xfrm>
-        </p:spPr>
-        <p:txBody>
-          <a:bodyPr>
-            <a:normAutofit lnSpcReduction="10000"/>
-          </a:bodyPr>
-          <a:lstStyle/>
-          <a:p>
-            <a:r>
-              <a:rPr lang="es-ES" dirty="0"/>
-              <a:t>Clasificados por importancia: Alta, Media, Baja.</a:t>
+              <a:t>Gestión del Alcance</a:t>
             </a:r>
           </a:p>
         </p:txBody>
@@ -11898,7 +12169,7 @@
     </p:spTree>
     <p:extLst>
       <p:ext uri="{BB962C8B-B14F-4D97-AF65-F5344CB8AC3E}">
-        <p14:creationId xmlns:p14="http://schemas.microsoft.com/office/powerpoint/2010/main" val="249498252"/>
+        <p14:creationId xmlns:p14="http://schemas.microsoft.com/office/powerpoint/2010/main" val="2021625253"/>
       </p:ext>
     </p:extLst>
   </p:cSld>
@@ -11974,74 +12245,6 @@
       </p:sp>
       <p:sp>
         <p:nvSpPr>
-          <p:cNvPr id="3" name="Marcador de contenido 2"/>
-          <p:cNvSpPr>
-            <a:spLocks noGrp="1"/>
-          </p:cNvSpPr>
-          <p:nvPr>
-            <p:ph idx="1"/>
-          </p:nvPr>
-        </p:nvSpPr>
-        <p:spPr>
-          <a:xfrm>
-            <a:off x="1427160" y="1797934"/>
-            <a:ext cx="10455278" cy="3653742"/>
-          </a:xfrm>
-        </p:spPr>
-        <p:txBody>
-          <a:bodyPr/>
-          <a:lstStyle/>
-          <a:p>
-            <a:r>
-              <a:rPr lang="es-ES" dirty="0"/>
-              <a:t>Identificados</a:t>
-            </a:r>
-          </a:p>
-          <a:p>
-            <a:pPr lvl="1"/>
-            <a:r>
-              <a:rPr lang="es-ES" dirty="0"/>
-              <a:t>18 Requisitos Funcionales</a:t>
-            </a:r>
-          </a:p>
-          <a:p>
-            <a:pPr lvl="1"/>
-            <a:r>
-              <a:rPr lang="es-ES" dirty="0"/>
-              <a:t>4 Requisitos no Funcionales</a:t>
-            </a:r>
-          </a:p>
-          <a:p>
-            <a:r>
-              <a:rPr lang="es-ES" dirty="0"/>
-              <a:t>Clasificados</a:t>
-            </a:r>
-          </a:p>
-          <a:p>
-            <a:pPr lvl="1"/>
-            <a:r>
-              <a:rPr lang="es-ES" dirty="0"/>
-              <a:t>Vitales</a:t>
-            </a:r>
-          </a:p>
-          <a:p>
-            <a:pPr lvl="1"/>
-            <a:r>
-              <a:rPr lang="es-ES" dirty="0"/>
-              <a:t>Importantes</a:t>
-            </a:r>
-          </a:p>
-          <a:p>
-            <a:pPr lvl="1"/>
-            <a:r>
-              <a:rPr lang="es-ES" dirty="0"/>
-              <a:t>Deseables</a:t>
-            </a:r>
-          </a:p>
-        </p:txBody>
-      </p:sp>
-      <p:sp>
-        <p:nvSpPr>
           <p:cNvPr id="5" name="Marcador de pie de página 4"/>
           <p:cNvSpPr>
             <a:spLocks noGrp="1"/>
@@ -12177,7 +12380,60 @@
           <a:p>
             <a:r>
               <a:rPr lang="es-ES" sz="3600" dirty="0"/>
-              <a:t>Análisis de Requisitos</a:t>
+              <a:t>Casos de Uso</a:t>
+            </a:r>
+          </a:p>
+        </p:txBody>
+      </p:sp>
+      <p:pic>
+        <p:nvPicPr>
+          <p:cNvPr id="4" name="Imagen 3"/>
+          <p:cNvPicPr>
+            <a:picLocks noChangeAspect="1"/>
+          </p:cNvPicPr>
+          <p:nvPr/>
+        </p:nvPicPr>
+        <p:blipFill>
+          <a:blip r:embed="rId3"/>
+          <a:stretch>
+            <a:fillRect/>
+          </a:stretch>
+        </p:blipFill>
+        <p:spPr>
+          <a:xfrm>
+            <a:off x="3511596" y="2312194"/>
+            <a:ext cx="5168808" cy="3629027"/>
+          </a:xfrm>
+          <a:prstGeom prst="rect">
+            <a:avLst/>
+          </a:prstGeom>
+        </p:spPr>
+      </p:pic>
+      <p:sp>
+        <p:nvSpPr>
+          <p:cNvPr id="8" name="Marcador de contenido 2"/>
+          <p:cNvSpPr>
+            <a:spLocks noGrp="1"/>
+          </p:cNvSpPr>
+          <p:nvPr>
+            <p:ph idx="1"/>
+          </p:nvPr>
+        </p:nvSpPr>
+        <p:spPr>
+          <a:xfrm>
+            <a:off x="1427160" y="1592194"/>
+            <a:ext cx="10455278" cy="423296"/>
+          </a:xfrm>
+        </p:spPr>
+        <p:txBody>
+          <a:bodyPr>
+            <a:normAutofit lnSpcReduction="10000"/>
+          </a:bodyPr>
+          <a:lstStyle/>
+          <a:p>
+            <a:r>
+              <a:rPr lang="es-ES" dirty="0"/>
+              <a:t>Clasificados por importancia: Alta, Media, Baja.</a:t>
             </a:r>
           </a:p>
         </p:txBody>
@@ -12185,7 +12441,7 @@
     </p:spTree>
     <p:extLst>
       <p:ext uri="{BB962C8B-B14F-4D97-AF65-F5344CB8AC3E}">
-        <p14:creationId xmlns:p14="http://schemas.microsoft.com/office/powerpoint/2010/main" val="979298410"/>
+        <p14:creationId xmlns:p14="http://schemas.microsoft.com/office/powerpoint/2010/main" val="249498252"/>
       </p:ext>
     </p:extLst>
   </p:cSld>
@@ -12272,13 +12528,11 @@
         <p:spPr>
           <a:xfrm>
             <a:off x="1427160" y="1797934"/>
-            <a:ext cx="10455278" cy="4736216"/>
-          </a:xfrm>
-        </p:spPr>
-        <p:txBody>
-          <a:bodyPr>
-            <a:normAutofit fontScale="92500" lnSpcReduction="10000"/>
-          </a:bodyPr>
+            <a:ext cx="10455278" cy="3653742"/>
+          </a:xfrm>
+        </p:spPr>
+        <p:txBody>
+          <a:bodyPr/>
           <a:lstStyle/>
           <a:p>
             <a:r>
@@ -12290,72 +12544,50 @@
             <a:pPr lvl="1"/>
             <a:r>
               <a:rPr lang="es-ES" dirty="0"/>
-              <a:t>3 Riegos en gestión de proyecto</a:t>
+              <a:t>18 Requisitos Funcionales: Interfaz por consola, Casting </a:t>
+            </a:r>
+            <a:r>
+              <a:rPr lang="es-ES" dirty="0" err="1"/>
+              <a:t>automatico</a:t>
+            </a:r>
+            <a:r>
+              <a:rPr lang="es-ES" dirty="0"/>
+              <a:t>…</a:t>
             </a:r>
           </a:p>
           <a:p>
             <a:pPr lvl="1"/>
             <a:r>
               <a:rPr lang="es-ES" dirty="0"/>
-              <a:t>7 Riegos técnicos</a:t>
-            </a:r>
-          </a:p>
-          <a:p>
-            <a:r>
-              <a:rPr lang="es-ES" dirty="0"/>
-              <a:t>Escala impacto</a:t>
+              <a:t>4 Requisitos no Funcionales: Portabilidad, Extensibilidad…</a:t>
+            </a:r>
+          </a:p>
+          <a:p>
+            <a:r>
+              <a:rPr lang="es-ES" dirty="0"/>
+              <a:t>Clasificados</a:t>
             </a:r>
           </a:p>
           <a:p>
             <a:pPr lvl="1"/>
             <a:r>
               <a:rPr lang="es-ES" dirty="0"/>
-              <a:t>Alto -&gt; Impacto grave en la calidad y retraso importante planificación</a:t>
+              <a:t>Vitales: Generar código Hadoop</a:t>
             </a:r>
           </a:p>
           <a:p>
             <a:pPr lvl="1"/>
             <a:r>
               <a:rPr lang="es-ES" dirty="0"/>
-              <a:t>Medio -&gt; Impacto leve en la calidad y retraso leve planificación</a:t>
+              <a:t>Importantes: Definir carpeta salida</a:t>
             </a:r>
           </a:p>
           <a:p>
             <a:pPr lvl="1"/>
             <a:r>
               <a:rPr lang="es-ES" dirty="0"/>
-              <a:t>Bajo -&gt; Afecta a la planificación pero no retrasa la fecha de entrega</a:t>
-            </a:r>
-          </a:p>
-          <a:p>
-            <a:r>
-              <a:rPr lang="es-ES" dirty="0"/>
-              <a:t>Escala probabilidad</a:t>
-            </a:r>
-          </a:p>
-          <a:p>
-            <a:pPr lvl="1"/>
-            <a:r>
-              <a:rPr lang="es-ES" dirty="0"/>
-              <a:t>Alta -&gt; Mayor o igual  70%</a:t>
-            </a:r>
-          </a:p>
-          <a:p>
-            <a:pPr lvl="1"/>
-            <a:r>
-              <a:rPr lang="es-ES" dirty="0"/>
-              <a:t>Media -&gt; Entre 30% y 70%</a:t>
-            </a:r>
-          </a:p>
-          <a:p>
-            <a:pPr lvl="1"/>
-            <a:r>
-              <a:rPr lang="es-ES" dirty="0"/>
-              <a:t>Baja -&gt; Menor o igual 30% </a:t>
-            </a:r>
-          </a:p>
-          <a:p>
-            <a:endParaRPr lang="es-ES" dirty="0"/>
+              <a:t>Deseables: Traducir comentarios</a:t>
+            </a:r>
           </a:p>
         </p:txBody>
       </p:sp>
@@ -12496,7 +12728,7 @@
           <a:p>
             <a:r>
               <a:rPr lang="es-ES" sz="3600" dirty="0"/>
-              <a:t>Gestión de Riesgos</a:t>
+              <a:t>Análisis de Requisitos</a:t>
             </a:r>
           </a:p>
         </p:txBody>
@@ -12504,7 +12736,7 @@
     </p:spTree>
     <p:extLst>
       <p:ext uri="{BB962C8B-B14F-4D97-AF65-F5344CB8AC3E}">
-        <p14:creationId xmlns:p14="http://schemas.microsoft.com/office/powerpoint/2010/main" val="981504825"/>
+        <p14:creationId xmlns:p14="http://schemas.microsoft.com/office/powerpoint/2010/main" val="979298410"/>
       </p:ext>
     </p:extLst>
   </p:cSld>
@@ -12591,77 +12823,89 @@
         <p:spPr>
           <a:xfrm>
             <a:off x="1427160" y="1797934"/>
-            <a:ext cx="10455278" cy="4347596"/>
+            <a:ext cx="10455278" cy="4736216"/>
           </a:xfrm>
         </p:spPr>
         <p:txBody>
           <a:bodyPr>
-            <a:normAutofit/>
+            <a:normAutofit fontScale="92500" lnSpcReduction="10000"/>
           </a:bodyPr>
           <a:lstStyle/>
           <a:p>
             <a:r>
               <a:rPr lang="es-ES" dirty="0"/>
-              <a:t>Características del proyecto</a:t>
+              <a:t>Identificados</a:t>
             </a:r>
           </a:p>
           <a:p>
             <a:pPr lvl="1"/>
             <a:r>
               <a:rPr lang="es-ES" dirty="0"/>
-              <a:t>Proyecto individual</a:t>
+              <a:t>3 Riegos en gestión de proyecto: Retraso en la planificación</a:t>
             </a:r>
           </a:p>
           <a:p>
             <a:pPr lvl="1"/>
             <a:r>
               <a:rPr lang="es-ES" dirty="0"/>
-              <a:t>Componente de investigación</a:t>
+              <a:t>7 Riegos técnicos: Traducción incorrecta</a:t>
+            </a:r>
+          </a:p>
+          <a:p>
+            <a:r>
+              <a:rPr lang="es-ES" dirty="0"/>
+              <a:t>Escala impacto</a:t>
             </a:r>
           </a:p>
           <a:p>
             <a:pPr lvl="1"/>
             <a:r>
               <a:rPr lang="es-ES" dirty="0"/>
-              <a:t>Requisitos Fijos</a:t>
+              <a:t>Alto -&gt; Impacto grave en la calidad y retraso importante planificación</a:t>
             </a:r>
           </a:p>
           <a:p>
             <a:pPr lvl="1"/>
             <a:r>
               <a:rPr lang="es-ES" dirty="0"/>
-              <a:t>Fecha de entrega inamovible</a:t>
-            </a:r>
-          </a:p>
-          <a:p>
-            <a:r>
-              <a:rPr lang="es-ES" dirty="0"/>
-              <a:t>Programación Extrema</a:t>
+              <a:t>Medio -&gt; Impacto leve en la calidad y retraso leve planificación</a:t>
             </a:r>
           </a:p>
           <a:p>
             <a:pPr lvl="1"/>
             <a:r>
               <a:rPr lang="es-ES" dirty="0"/>
-              <a:t>Metodología Ágil</a:t>
+              <a:t>Bajo -&gt; Afecta a la planificación pero no retrasa la fecha de entrega</a:t>
+            </a:r>
+          </a:p>
+          <a:p>
+            <a:r>
+              <a:rPr lang="es-ES" dirty="0"/>
+              <a:t>Escala probabilidad</a:t>
             </a:r>
           </a:p>
           <a:p>
             <a:pPr lvl="1"/>
             <a:r>
               <a:rPr lang="es-ES" dirty="0"/>
-              <a:t>Ciclo de desarrollo continuo</a:t>
+              <a:t>Alta -&gt; Mayor o igual  70%</a:t>
             </a:r>
           </a:p>
           <a:p>
             <a:pPr lvl="1"/>
             <a:r>
               <a:rPr lang="es-ES" dirty="0"/>
-              <a:t>Código fuente como documentación</a:t>
+              <a:t>Media -&gt; Entre 30% y 70%</a:t>
             </a:r>
           </a:p>
           <a:p>
             <a:pPr lvl="1"/>
+            <a:r>
+              <a:rPr lang="es-ES" dirty="0"/>
+              <a:t>Baja -&gt; Menor o igual 30% </a:t>
+            </a:r>
+          </a:p>
+          <a:p>
             <a:endParaRPr lang="es-ES" dirty="0"/>
           </a:p>
         </p:txBody>
@@ -12803,7 +13047,7 @@
           <a:p>
             <a:r>
               <a:rPr lang="es-ES" sz="3600" dirty="0"/>
-              <a:t>Metodología</a:t>
+              <a:t>Gestión de Riesgos</a:t>
             </a:r>
           </a:p>
         </p:txBody>
@@ -12811,7 +13055,7 @@
     </p:spTree>
     <p:extLst>
       <p:ext uri="{BB962C8B-B14F-4D97-AF65-F5344CB8AC3E}">
-        <p14:creationId xmlns:p14="http://schemas.microsoft.com/office/powerpoint/2010/main" val="3571979615"/>
+        <p14:creationId xmlns:p14="http://schemas.microsoft.com/office/powerpoint/2010/main" val="981504825"/>
       </p:ext>
     </p:extLst>
   </p:cSld>

</xml_diff>